<commit_message>
Erstellung Releaseabbildung und Einarbeitung weiterer Zitat zu Grundlagen
</commit_message>
<xml_diff>
--- a/Abbildungen/Abbildungen.pptx
+++ b/Abbildungen/Abbildungen.pptx
@@ -7,6 +7,7 @@
   <p:sldIdLst>
     <p:sldId id="256" r:id="rId2"/>
     <p:sldId id="257" r:id="rId3"/>
+    <p:sldId id="258" r:id="rId4"/>
   </p:sldIdLst>
   <p:sldSz cx="12192000" cy="6858000"/>
   <p:notesSz cx="6858000" cy="9144000"/>
@@ -244,7 +245,7 @@
           <a:p>
             <a:fld id="{45C635BA-7AD8-E44A-B5F4-33C1482C67A6}" type="datetimeFigureOut">
               <a:rPr lang="de-DE" smtClean="0"/>
-              <a:t>05.03.16</a:t>
+              <a:t>06.03.16</a:t>
             </a:fld>
             <a:endParaRPr lang="de-DE"/>
           </a:p>
@@ -414,7 +415,7 @@
           <a:p>
             <a:fld id="{45C635BA-7AD8-E44A-B5F4-33C1482C67A6}" type="datetimeFigureOut">
               <a:rPr lang="de-DE" smtClean="0"/>
-              <a:t>05.03.16</a:t>
+              <a:t>06.03.16</a:t>
             </a:fld>
             <a:endParaRPr lang="de-DE"/>
           </a:p>
@@ -594,7 +595,7 @@
           <a:p>
             <a:fld id="{45C635BA-7AD8-E44A-B5F4-33C1482C67A6}" type="datetimeFigureOut">
               <a:rPr lang="de-DE" smtClean="0"/>
-              <a:t>05.03.16</a:t>
+              <a:t>06.03.16</a:t>
             </a:fld>
             <a:endParaRPr lang="de-DE"/>
           </a:p>
@@ -764,7 +765,7 @@
           <a:p>
             <a:fld id="{45C635BA-7AD8-E44A-B5F4-33C1482C67A6}" type="datetimeFigureOut">
               <a:rPr lang="de-DE" smtClean="0"/>
-              <a:t>05.03.16</a:t>
+              <a:t>06.03.16</a:t>
             </a:fld>
             <a:endParaRPr lang="de-DE"/>
           </a:p>
@@ -1010,7 +1011,7 @@
           <a:p>
             <a:fld id="{45C635BA-7AD8-E44A-B5F4-33C1482C67A6}" type="datetimeFigureOut">
               <a:rPr lang="de-DE" smtClean="0"/>
-              <a:t>05.03.16</a:t>
+              <a:t>06.03.16</a:t>
             </a:fld>
             <a:endParaRPr lang="de-DE"/>
           </a:p>
@@ -1242,7 +1243,7 @@
           <a:p>
             <a:fld id="{45C635BA-7AD8-E44A-B5F4-33C1482C67A6}" type="datetimeFigureOut">
               <a:rPr lang="de-DE" smtClean="0"/>
-              <a:t>05.03.16</a:t>
+              <a:t>06.03.16</a:t>
             </a:fld>
             <a:endParaRPr lang="de-DE"/>
           </a:p>
@@ -1609,7 +1610,7 @@
           <a:p>
             <a:fld id="{45C635BA-7AD8-E44A-B5F4-33C1482C67A6}" type="datetimeFigureOut">
               <a:rPr lang="de-DE" smtClean="0"/>
-              <a:t>05.03.16</a:t>
+              <a:t>06.03.16</a:t>
             </a:fld>
             <a:endParaRPr lang="de-DE"/>
           </a:p>
@@ -1727,7 +1728,7 @@
           <a:p>
             <a:fld id="{45C635BA-7AD8-E44A-B5F4-33C1482C67A6}" type="datetimeFigureOut">
               <a:rPr lang="de-DE" smtClean="0"/>
-              <a:t>05.03.16</a:t>
+              <a:t>06.03.16</a:t>
             </a:fld>
             <a:endParaRPr lang="de-DE"/>
           </a:p>
@@ -1822,7 +1823,7 @@
           <a:p>
             <a:fld id="{45C635BA-7AD8-E44A-B5F4-33C1482C67A6}" type="datetimeFigureOut">
               <a:rPr lang="de-DE" smtClean="0"/>
-              <a:t>05.03.16</a:t>
+              <a:t>06.03.16</a:t>
             </a:fld>
             <a:endParaRPr lang="de-DE"/>
           </a:p>
@@ -2099,7 +2100,7 @@
           <a:p>
             <a:fld id="{45C635BA-7AD8-E44A-B5F4-33C1482C67A6}" type="datetimeFigureOut">
               <a:rPr lang="de-DE" smtClean="0"/>
-              <a:t>05.03.16</a:t>
+              <a:t>06.03.16</a:t>
             </a:fld>
             <a:endParaRPr lang="de-DE"/>
           </a:p>
@@ -2352,7 +2353,7 @@
           <a:p>
             <a:fld id="{45C635BA-7AD8-E44A-B5F4-33C1482C67A6}" type="datetimeFigureOut">
               <a:rPr lang="de-DE" smtClean="0"/>
-              <a:t>05.03.16</a:t>
+              <a:t>06.03.16</a:t>
             </a:fld>
             <a:endParaRPr lang="de-DE"/>
           </a:p>
@@ -2565,7 +2566,7 @@
           <a:p>
             <a:fld id="{45C635BA-7AD8-E44A-B5F4-33C1482C67A6}" type="datetimeFigureOut">
               <a:rPr lang="de-DE" smtClean="0"/>
-              <a:t>05.03.16</a:t>
+              <a:t>06.03.16</a:t>
             </a:fld>
             <a:endParaRPr lang="de-DE"/>
           </a:p>
@@ -3530,6 +3531,694 @@
           <a:chExt cx="0" cy="0"/>
         </a:xfrm>
       </p:grpSpPr>
+      <p:grpSp>
+        <p:nvGrpSpPr>
+          <p:cNvPr id="23" name="Gruppierung 22"/>
+          <p:cNvGrpSpPr/>
+          <p:nvPr/>
+        </p:nvGrpSpPr>
+        <p:grpSpPr>
+          <a:xfrm>
+            <a:off x="1518554" y="1724023"/>
+            <a:ext cx="5040088" cy="1888972"/>
+            <a:chOff x="1518554" y="1724023"/>
+            <a:chExt cx="5040088" cy="1888972"/>
+          </a:xfrm>
+        </p:grpSpPr>
+        <p:sp>
+          <p:nvSpPr>
+            <p:cNvPr id="13" name="Abgerundetes Rechteck 12"/>
+            <p:cNvSpPr/>
+            <p:nvPr/>
+          </p:nvSpPr>
+          <p:spPr>
+            <a:xfrm>
+              <a:off x="1518559" y="1724023"/>
+              <a:ext cx="1229756" cy="1888972"/>
+            </a:xfrm>
+            <a:prstGeom prst="roundRect">
+              <a:avLst/>
+            </a:prstGeom>
+            <a:solidFill>
+              <a:schemeClr val="bg1">
+                <a:lumMod val="75000"/>
+              </a:schemeClr>
+            </a:solidFill>
+            <a:ln>
+              <a:noFill/>
+            </a:ln>
+          </p:spPr>
+          <p:style>
+            <a:lnRef idx="2">
+              <a:schemeClr val="accent1">
+                <a:shade val="50000"/>
+              </a:schemeClr>
+            </a:lnRef>
+            <a:fillRef idx="1">
+              <a:schemeClr val="accent1"/>
+            </a:fillRef>
+            <a:effectRef idx="0">
+              <a:schemeClr val="accent1"/>
+            </a:effectRef>
+            <a:fontRef idx="minor">
+              <a:schemeClr val="lt1"/>
+            </a:fontRef>
+          </p:style>
+          <p:txBody>
+            <a:bodyPr rtlCol="0" anchor="t"/>
+            <a:lstStyle/>
+            <a:p>
+              <a:r>
+                <a:rPr lang="de-DE" sz="1400" b="1" dirty="0" smtClean="0">
+                  <a:solidFill>
+                    <a:schemeClr val="tx1"/>
+                  </a:solidFill>
+                  <a:latin typeface="Verdana" charset="0"/>
+                  <a:ea typeface="Verdana" charset="0"/>
+                  <a:cs typeface="Verdana" charset="0"/>
+                </a:rPr>
+                <a:t>Kunde</a:t>
+              </a:r>
+              <a:endParaRPr lang="de-DE" sz="1400" b="1" dirty="0">
+                <a:solidFill>
+                  <a:schemeClr val="tx1"/>
+                </a:solidFill>
+                <a:latin typeface="Verdana" charset="0"/>
+                <a:ea typeface="Verdana" charset="0"/>
+                <a:cs typeface="Verdana" charset="0"/>
+              </a:endParaRPr>
+            </a:p>
+          </p:txBody>
+        </p:sp>
+        <p:sp>
+          <p:nvSpPr>
+            <p:cNvPr id="14" name="Abgerundetes Rechteck 13"/>
+            <p:cNvSpPr/>
+            <p:nvPr/>
+          </p:nvSpPr>
+          <p:spPr>
+            <a:xfrm>
+              <a:off x="1518554" y="2096860"/>
+              <a:ext cx="1121758" cy="1398814"/>
+            </a:xfrm>
+            <a:prstGeom prst="roundRect">
+              <a:avLst/>
+            </a:prstGeom>
+            <a:solidFill>
+              <a:srgbClr val="FFC000"/>
+            </a:solidFill>
+            <a:ln>
+              <a:noFill/>
+            </a:ln>
+          </p:spPr>
+          <p:style>
+            <a:lnRef idx="2">
+              <a:schemeClr val="accent1">
+                <a:shade val="50000"/>
+              </a:schemeClr>
+            </a:lnRef>
+            <a:fillRef idx="1">
+              <a:schemeClr val="accent1"/>
+            </a:fillRef>
+            <a:effectRef idx="0">
+              <a:schemeClr val="accent1"/>
+            </a:effectRef>
+            <a:fontRef idx="minor">
+              <a:schemeClr val="lt1"/>
+            </a:fontRef>
+          </p:style>
+          <p:txBody>
+            <a:bodyPr rtlCol="0" anchor="ctr"/>
+            <a:lstStyle/>
+            <a:p>
+              <a:pPr algn="ctr"/>
+              <a:r>
+                <a:rPr lang="de-DE" sz="1200" b="1" dirty="0" smtClean="0">
+                  <a:solidFill>
+                    <a:sysClr val="windowText" lastClr="000000"/>
+                  </a:solidFill>
+                  <a:latin typeface="Verdana" charset="0"/>
+                  <a:ea typeface="Verdana" charset="0"/>
+                  <a:cs typeface="Verdana" charset="0"/>
+                </a:rPr>
+                <a:t>Bedürfnis</a:t>
+              </a:r>
+              <a:endParaRPr lang="de-DE" sz="1200" b="1" dirty="0">
+                <a:solidFill>
+                  <a:sysClr val="windowText" lastClr="000000"/>
+                </a:solidFill>
+                <a:latin typeface="Verdana" charset="0"/>
+                <a:ea typeface="Verdana" charset="0"/>
+                <a:cs typeface="Verdana" charset="0"/>
+              </a:endParaRPr>
+            </a:p>
+          </p:txBody>
+        </p:sp>
+        <p:sp>
+          <p:nvSpPr>
+            <p:cNvPr id="15" name="Abgerundetes Rechteck 14"/>
+            <p:cNvSpPr/>
+            <p:nvPr/>
+          </p:nvSpPr>
+          <p:spPr>
+            <a:xfrm>
+              <a:off x="3445324" y="1724024"/>
+              <a:ext cx="3113318" cy="1888971"/>
+            </a:xfrm>
+            <a:prstGeom prst="roundRect">
+              <a:avLst>
+                <a:gd name="adj" fmla="val 6996"/>
+              </a:avLst>
+            </a:prstGeom>
+            <a:solidFill>
+              <a:schemeClr val="tx1">
+                <a:lumMod val="75000"/>
+                <a:lumOff val="25000"/>
+              </a:schemeClr>
+            </a:solidFill>
+            <a:ln>
+              <a:noFill/>
+            </a:ln>
+          </p:spPr>
+          <p:style>
+            <a:lnRef idx="2">
+              <a:schemeClr val="accent1">
+                <a:shade val="50000"/>
+              </a:schemeClr>
+            </a:lnRef>
+            <a:fillRef idx="1">
+              <a:schemeClr val="accent1"/>
+            </a:fillRef>
+            <a:effectRef idx="0">
+              <a:schemeClr val="accent1"/>
+            </a:effectRef>
+            <a:fontRef idx="minor">
+              <a:schemeClr val="lt1"/>
+            </a:fontRef>
+          </p:style>
+          <p:txBody>
+            <a:bodyPr rtlCol="0" anchor="t"/>
+            <a:lstStyle/>
+            <a:p>
+              <a:r>
+                <a:rPr lang="de-DE" sz="1400" b="1" dirty="0" smtClean="0">
+                  <a:latin typeface="Verdana" charset="0"/>
+                  <a:ea typeface="Verdana" charset="0"/>
+                  <a:cs typeface="Verdana" charset="0"/>
+                </a:rPr>
+                <a:t>Produkt</a:t>
+              </a:r>
+              <a:endParaRPr lang="de-DE" sz="1400" b="1" dirty="0">
+                <a:latin typeface="Verdana" charset="0"/>
+                <a:ea typeface="Verdana" charset="0"/>
+                <a:cs typeface="Verdana" charset="0"/>
+              </a:endParaRPr>
+            </a:p>
+          </p:txBody>
+        </p:sp>
+        <p:sp>
+          <p:nvSpPr>
+            <p:cNvPr id="16" name="Abgerundetes Rechteck 15"/>
+            <p:cNvSpPr/>
+            <p:nvPr/>
+          </p:nvSpPr>
+          <p:spPr>
+            <a:xfrm>
+              <a:off x="3576552" y="2114549"/>
+              <a:ext cx="924091" cy="631372"/>
+            </a:xfrm>
+            <a:prstGeom prst="roundRect">
+              <a:avLst/>
+            </a:prstGeom>
+            <a:solidFill>
+              <a:srgbClr val="FFC000"/>
+            </a:solidFill>
+            <a:ln>
+              <a:noFill/>
+            </a:ln>
+          </p:spPr>
+          <p:style>
+            <a:lnRef idx="2">
+              <a:schemeClr val="accent1">
+                <a:shade val="50000"/>
+              </a:schemeClr>
+            </a:lnRef>
+            <a:fillRef idx="1">
+              <a:schemeClr val="accent1"/>
+            </a:fillRef>
+            <a:effectRef idx="0">
+              <a:schemeClr val="accent1"/>
+            </a:effectRef>
+            <a:fontRef idx="minor">
+              <a:schemeClr val="lt1"/>
+            </a:fontRef>
+          </p:style>
+          <p:txBody>
+            <a:bodyPr rtlCol="0" anchor="ctr"/>
+            <a:lstStyle/>
+            <a:p>
+              <a:pPr algn="ctr"/>
+              <a:r>
+                <a:rPr lang="de-DE" sz="1200" b="1" smtClean="0">
+                  <a:solidFill>
+                    <a:sysClr val="windowText" lastClr="000000"/>
+                  </a:solidFill>
+                  <a:latin typeface="Verdana" charset="0"/>
+                  <a:ea typeface="Verdana" charset="0"/>
+                  <a:cs typeface="Verdana" charset="0"/>
+                </a:rPr>
+                <a:t>Version</a:t>
+              </a:r>
+              <a:endParaRPr lang="de-DE" sz="1200" b="1" dirty="0">
+                <a:solidFill>
+                  <a:sysClr val="windowText" lastClr="000000"/>
+                </a:solidFill>
+                <a:latin typeface="Verdana" charset="0"/>
+                <a:ea typeface="Verdana" charset="0"/>
+                <a:cs typeface="Verdana" charset="0"/>
+              </a:endParaRPr>
+            </a:p>
+          </p:txBody>
+        </p:sp>
+        <p:sp>
+          <p:nvSpPr>
+            <p:cNvPr id="17" name="Abgerundetes Rechteck 16"/>
+            <p:cNvSpPr/>
+            <p:nvPr/>
+          </p:nvSpPr>
+          <p:spPr>
+            <a:xfrm>
+              <a:off x="5657979" y="2114549"/>
+              <a:ext cx="900662" cy="1381126"/>
+            </a:xfrm>
+            <a:prstGeom prst="roundRect">
+              <a:avLst/>
+            </a:prstGeom>
+            <a:solidFill>
+              <a:srgbClr val="FFC000"/>
+            </a:solidFill>
+            <a:ln>
+              <a:noFill/>
+            </a:ln>
+          </p:spPr>
+          <p:style>
+            <a:lnRef idx="2">
+              <a:schemeClr val="accent1">
+                <a:shade val="50000"/>
+              </a:schemeClr>
+            </a:lnRef>
+            <a:fillRef idx="1">
+              <a:schemeClr val="accent1"/>
+            </a:fillRef>
+            <a:effectRef idx="0">
+              <a:schemeClr val="accent1"/>
+            </a:effectRef>
+            <a:fontRef idx="minor">
+              <a:schemeClr val="lt1"/>
+            </a:fontRef>
+          </p:style>
+          <p:txBody>
+            <a:bodyPr rtlCol="0" anchor="ctr"/>
+            <a:lstStyle/>
+            <a:p>
+              <a:pPr algn="ctr"/>
+              <a:r>
+                <a:rPr lang="de-DE" sz="1200" b="1" dirty="0" smtClean="0">
+                  <a:solidFill>
+                    <a:sysClr val="windowText" lastClr="000000"/>
+                  </a:solidFill>
+                  <a:latin typeface="Verdana" charset="0"/>
+                  <a:ea typeface="Verdana" charset="0"/>
+                  <a:cs typeface="Verdana" charset="0"/>
+                </a:rPr>
+                <a:t>Projekt</a:t>
+              </a:r>
+              <a:endParaRPr lang="de-DE" sz="1200" b="1" dirty="0">
+                <a:solidFill>
+                  <a:sysClr val="windowText" lastClr="000000"/>
+                </a:solidFill>
+                <a:latin typeface="Verdana" charset="0"/>
+                <a:ea typeface="Verdana" charset="0"/>
+                <a:cs typeface="Verdana" charset="0"/>
+              </a:endParaRPr>
+            </a:p>
+          </p:txBody>
+        </p:sp>
+        <p:sp>
+          <p:nvSpPr>
+            <p:cNvPr id="18" name="Abgerundetes Rechteck 17"/>
+            <p:cNvSpPr/>
+            <p:nvPr/>
+          </p:nvSpPr>
+          <p:spPr>
+            <a:xfrm>
+              <a:off x="3576552" y="2864302"/>
+              <a:ext cx="938156" cy="631372"/>
+            </a:xfrm>
+            <a:prstGeom prst="roundRect">
+              <a:avLst/>
+            </a:prstGeom>
+            <a:solidFill>
+              <a:srgbClr val="FFC000"/>
+            </a:solidFill>
+            <a:ln>
+              <a:noFill/>
+            </a:ln>
+          </p:spPr>
+          <p:style>
+            <a:lnRef idx="2">
+              <a:schemeClr val="accent1">
+                <a:shade val="50000"/>
+              </a:schemeClr>
+            </a:lnRef>
+            <a:fillRef idx="1">
+              <a:schemeClr val="accent1"/>
+            </a:fillRef>
+            <a:effectRef idx="0">
+              <a:schemeClr val="accent1"/>
+            </a:effectRef>
+            <a:fontRef idx="minor">
+              <a:schemeClr val="lt1"/>
+            </a:fontRef>
+          </p:style>
+          <p:txBody>
+            <a:bodyPr rtlCol="0" anchor="ctr"/>
+            <a:lstStyle/>
+            <a:p>
+              <a:pPr algn="ctr"/>
+              <a:r>
+                <a:rPr lang="de-DE" sz="1200" b="1" dirty="0" smtClean="0">
+                  <a:solidFill>
+                    <a:sysClr val="windowText" lastClr="000000"/>
+                  </a:solidFill>
+                  <a:latin typeface="Verdana" charset="0"/>
+                  <a:ea typeface="Verdana" charset="0"/>
+                  <a:cs typeface="Verdana" charset="0"/>
+                </a:rPr>
+                <a:t>Release</a:t>
+              </a:r>
+              <a:endParaRPr lang="de-DE" sz="1200" b="1" dirty="0">
+                <a:solidFill>
+                  <a:sysClr val="windowText" lastClr="000000"/>
+                </a:solidFill>
+                <a:latin typeface="Verdana" charset="0"/>
+                <a:ea typeface="Verdana" charset="0"/>
+                <a:cs typeface="Verdana" charset="0"/>
+              </a:endParaRPr>
+            </a:p>
+          </p:txBody>
+        </p:sp>
+        <p:sp>
+          <p:nvSpPr>
+            <p:cNvPr id="19" name="Richtungspfeil 18"/>
+            <p:cNvSpPr/>
+            <p:nvPr/>
+          </p:nvSpPr>
+          <p:spPr>
+            <a:xfrm>
+              <a:off x="2640311" y="2232931"/>
+              <a:ext cx="938157" cy="359229"/>
+            </a:xfrm>
+            <a:prstGeom prst="homePlate">
+              <a:avLst/>
+            </a:prstGeom>
+            <a:solidFill>
+              <a:schemeClr val="bg1">
+                <a:lumMod val="95000"/>
+              </a:schemeClr>
+            </a:solidFill>
+            <a:ln>
+              <a:noFill/>
+            </a:ln>
+          </p:spPr>
+          <p:style>
+            <a:lnRef idx="2">
+              <a:schemeClr val="accent1">
+                <a:shade val="50000"/>
+              </a:schemeClr>
+            </a:lnRef>
+            <a:fillRef idx="1">
+              <a:schemeClr val="accent1"/>
+            </a:fillRef>
+            <a:effectRef idx="0">
+              <a:schemeClr val="accent1"/>
+            </a:effectRef>
+            <a:fontRef idx="minor">
+              <a:schemeClr val="lt1"/>
+            </a:fontRef>
+          </p:style>
+          <p:txBody>
+            <a:bodyPr rtlCol="0" anchor="ctr"/>
+            <a:lstStyle/>
+            <a:p>
+              <a:pPr algn="ctr"/>
+              <a:r>
+                <a:rPr lang="de-DE" sz="800" dirty="0" smtClean="0">
+                  <a:solidFill>
+                    <a:sysClr val="windowText" lastClr="000000"/>
+                  </a:solidFill>
+                  <a:latin typeface="Verdana" charset="0"/>
+                  <a:ea typeface="Verdana" charset="0"/>
+                  <a:cs typeface="Verdana" charset="0"/>
+                </a:rPr>
+                <a:t>Anforderung</a:t>
+              </a:r>
+              <a:endParaRPr lang="de-DE" sz="800" dirty="0">
+                <a:solidFill>
+                  <a:sysClr val="windowText" lastClr="000000"/>
+                </a:solidFill>
+                <a:latin typeface="Verdana" charset="0"/>
+                <a:ea typeface="Verdana" charset="0"/>
+                <a:cs typeface="Verdana" charset="0"/>
+              </a:endParaRPr>
+            </a:p>
+          </p:txBody>
+        </p:sp>
+        <p:sp>
+          <p:nvSpPr>
+            <p:cNvPr id="20" name="Richtungspfeil 19"/>
+            <p:cNvSpPr/>
+            <p:nvPr/>
+          </p:nvSpPr>
+          <p:spPr>
+            <a:xfrm>
+              <a:off x="4500643" y="2267613"/>
+              <a:ext cx="1157335" cy="359229"/>
+            </a:xfrm>
+            <a:prstGeom prst="homePlate">
+              <a:avLst/>
+            </a:prstGeom>
+            <a:solidFill>
+              <a:schemeClr val="bg1"/>
+            </a:solidFill>
+            <a:ln>
+              <a:noFill/>
+            </a:ln>
+          </p:spPr>
+          <p:style>
+            <a:lnRef idx="2">
+              <a:schemeClr val="accent1">
+                <a:shade val="50000"/>
+              </a:schemeClr>
+            </a:lnRef>
+            <a:fillRef idx="1">
+              <a:schemeClr val="accent1"/>
+            </a:fillRef>
+            <a:effectRef idx="0">
+              <a:schemeClr val="accent1"/>
+            </a:effectRef>
+            <a:fontRef idx="minor">
+              <a:schemeClr val="lt1"/>
+            </a:fontRef>
+          </p:style>
+          <p:txBody>
+            <a:bodyPr rtlCol="0" anchor="ctr"/>
+            <a:lstStyle/>
+            <a:p>
+              <a:pPr algn="ctr"/>
+              <a:r>
+                <a:rPr lang="de-DE" sz="800" dirty="0" smtClean="0">
+                  <a:solidFill>
+                    <a:sysClr val="windowText" lastClr="000000"/>
+                  </a:solidFill>
+                  <a:latin typeface="Verdana" charset="0"/>
+                  <a:ea typeface="Verdana" charset="0"/>
+                  <a:cs typeface="Verdana" charset="0"/>
+                </a:rPr>
+                <a:t>Realisierung</a:t>
+              </a:r>
+              <a:endParaRPr lang="de-DE" sz="800" dirty="0">
+                <a:solidFill>
+                  <a:sysClr val="windowText" lastClr="000000"/>
+                </a:solidFill>
+                <a:latin typeface="Verdana" charset="0"/>
+                <a:ea typeface="Verdana" charset="0"/>
+                <a:cs typeface="Verdana" charset="0"/>
+              </a:endParaRPr>
+            </a:p>
+          </p:txBody>
+        </p:sp>
+        <p:sp>
+          <p:nvSpPr>
+            <p:cNvPr id="21" name="Richtungspfeil 20"/>
+            <p:cNvSpPr/>
+            <p:nvPr/>
+          </p:nvSpPr>
+          <p:spPr>
+            <a:xfrm rot="10800000" flipV="1">
+              <a:off x="4514708" y="3000369"/>
+              <a:ext cx="1139959" cy="359229"/>
+            </a:xfrm>
+            <a:prstGeom prst="homePlate">
+              <a:avLst/>
+            </a:prstGeom>
+            <a:solidFill>
+              <a:schemeClr val="bg1"/>
+            </a:solidFill>
+            <a:ln>
+              <a:noFill/>
+            </a:ln>
+          </p:spPr>
+          <p:style>
+            <a:lnRef idx="2">
+              <a:schemeClr val="accent1">
+                <a:shade val="50000"/>
+              </a:schemeClr>
+            </a:lnRef>
+            <a:fillRef idx="1">
+              <a:schemeClr val="accent1"/>
+            </a:fillRef>
+            <a:effectRef idx="0">
+              <a:schemeClr val="accent1"/>
+            </a:effectRef>
+            <a:fontRef idx="minor">
+              <a:schemeClr val="lt1"/>
+            </a:fontRef>
+          </p:style>
+          <p:txBody>
+            <a:bodyPr vert="horz" rtlCol="0" anchor="ctr"/>
+            <a:lstStyle/>
+            <a:p>
+              <a:pPr algn="r"/>
+              <a:r>
+                <a:rPr lang="de-DE" sz="800" dirty="0" smtClean="0">
+                  <a:solidFill>
+                    <a:sysClr val="windowText" lastClr="000000"/>
+                  </a:solidFill>
+                  <a:latin typeface="Verdana" charset="0"/>
+                  <a:ea typeface="Verdana" charset="0"/>
+                  <a:cs typeface="Verdana" charset="0"/>
+                </a:rPr>
+                <a:t>Veröffentlichung</a:t>
+              </a:r>
+              <a:endParaRPr lang="de-DE" sz="800" dirty="0">
+                <a:solidFill>
+                  <a:sysClr val="windowText" lastClr="000000"/>
+                </a:solidFill>
+                <a:latin typeface="Verdana" charset="0"/>
+                <a:ea typeface="Verdana" charset="0"/>
+                <a:cs typeface="Verdana" charset="0"/>
+              </a:endParaRPr>
+            </a:p>
+          </p:txBody>
+        </p:sp>
+        <p:sp>
+          <p:nvSpPr>
+            <p:cNvPr id="22" name="Richtungspfeil 21"/>
+            <p:cNvSpPr/>
+            <p:nvPr/>
+          </p:nvSpPr>
+          <p:spPr>
+            <a:xfrm rot="10800000" flipV="1">
+              <a:off x="2640312" y="3000368"/>
+              <a:ext cx="938156" cy="359229"/>
+            </a:xfrm>
+            <a:prstGeom prst="homePlate">
+              <a:avLst/>
+            </a:prstGeom>
+            <a:solidFill>
+              <a:schemeClr val="bg1">
+                <a:lumMod val="95000"/>
+              </a:schemeClr>
+            </a:solidFill>
+            <a:ln>
+              <a:noFill/>
+            </a:ln>
+          </p:spPr>
+          <p:style>
+            <a:lnRef idx="2">
+              <a:schemeClr val="accent1">
+                <a:shade val="50000"/>
+              </a:schemeClr>
+            </a:lnRef>
+            <a:fillRef idx="1">
+              <a:schemeClr val="accent1"/>
+            </a:fillRef>
+            <a:effectRef idx="0">
+              <a:schemeClr val="accent1"/>
+            </a:effectRef>
+            <a:fontRef idx="minor">
+              <a:schemeClr val="lt1"/>
+            </a:fontRef>
+          </p:style>
+          <p:txBody>
+            <a:bodyPr vert="horz" rtlCol="0" anchor="ctr"/>
+            <a:lstStyle/>
+            <a:p>
+              <a:pPr algn="r"/>
+              <a:r>
+                <a:rPr lang="de-DE" sz="800" dirty="0" smtClean="0">
+                  <a:solidFill>
+                    <a:sysClr val="windowText" lastClr="000000"/>
+                  </a:solidFill>
+                  <a:latin typeface="Verdana" charset="0"/>
+                  <a:ea typeface="Verdana" charset="0"/>
+                  <a:cs typeface="Verdana" charset="0"/>
+                </a:rPr>
+                <a:t>Befriedigung</a:t>
+              </a:r>
+              <a:endParaRPr lang="de-DE" sz="800" dirty="0">
+                <a:solidFill>
+                  <a:sysClr val="windowText" lastClr="000000"/>
+                </a:solidFill>
+                <a:latin typeface="Verdana" charset="0"/>
+                <a:ea typeface="Verdana" charset="0"/>
+                <a:cs typeface="Verdana" charset="0"/>
+              </a:endParaRPr>
+            </a:p>
+          </p:txBody>
+        </p:sp>
+      </p:grpSp>
+    </p:spTree>
+    <p:extLst>
+      <p:ext uri="{BB962C8B-B14F-4D97-AF65-F5344CB8AC3E}">
+        <p14:creationId xmlns:p14="http://schemas.microsoft.com/office/powerpoint/2010/main" val="962500302"/>
+      </p:ext>
+    </p:extLst>
+  </p:cSld>
+  <p:clrMapOvr>
+    <a:masterClrMapping/>
+  </p:clrMapOvr>
+</p:sld>
+</file>
+
+<file path=ppt/slides/slide3.xml><?xml version="1.0" encoding="utf-8"?>
+<p:sld xmlns:a="http://schemas.openxmlformats.org/drawingml/2006/main" xmlns:r="http://schemas.openxmlformats.org/officeDocument/2006/relationships" xmlns:p="http://schemas.openxmlformats.org/presentationml/2006/main">
+  <p:cSld>
+    <p:spTree>
+      <p:nvGrpSpPr>
+        <p:cNvPr id="1" name=""/>
+        <p:cNvGrpSpPr/>
+        <p:nvPr/>
+      </p:nvGrpSpPr>
+      <p:grpSpPr>
+        <a:xfrm>
+          <a:off x="0" y="0"/>
+          <a:ext cx="0" cy="0"/>
+          <a:chOff x="0" y="0"/>
+          <a:chExt cx="0" cy="0"/>
+        </a:xfrm>
+      </p:grpSpPr>
       <p:sp>
         <p:nvSpPr>
           <p:cNvPr id="4" name="Rechteck 3"/>
@@ -3538,7 +4227,7 @@
         </p:nvSpPr>
         <p:spPr>
           <a:xfrm>
-            <a:off x="1518555" y="566057"/>
+            <a:off x="1056509" y="480326"/>
             <a:ext cx="5040086" cy="5758543"/>
           </a:xfrm>
           <a:prstGeom prst="rect">
@@ -3573,7 +4262,7 @@
     </p:spTree>
     <p:extLst>
       <p:ext uri="{BB962C8B-B14F-4D97-AF65-F5344CB8AC3E}">
-        <p14:creationId xmlns:p14="http://schemas.microsoft.com/office/powerpoint/2010/main" val="962500302"/>
+        <p14:creationId xmlns:p14="http://schemas.microsoft.com/office/powerpoint/2010/main" val="481058527"/>
       </p:ext>
     </p:extLst>
   </p:cSld>

</xml_diff>

<commit_message>
ITIL beschrieben und Grafik dazu erstellt
</commit_message>
<xml_diff>
--- a/Abbildungen/Abbildungen.pptx
+++ b/Abbildungen/Abbildungen.pptx
@@ -4,10 +4,14 @@
   <p:sldMasterIdLst>
     <p:sldMasterId id="2147483648" r:id="rId1"/>
   </p:sldMasterIdLst>
+  <p:notesMasterIdLst>
+    <p:notesMasterId r:id="rId6"/>
+  </p:notesMasterIdLst>
   <p:sldIdLst>
     <p:sldId id="256" r:id="rId2"/>
     <p:sldId id="257" r:id="rId3"/>
-    <p:sldId id="258" r:id="rId4"/>
+    <p:sldId id="260" r:id="rId4"/>
+    <p:sldId id="259" r:id="rId5"/>
   </p:sldIdLst>
   <p:sldSz cx="12192000" cy="6858000"/>
   <p:notesSz cx="6858000" cy="9144000"/>
@@ -114,6 +118,440 @@
 </p:presentation>
 </file>
 
+<file path=ppt/notesMasters/notesMaster1.xml><?xml version="1.0" encoding="utf-8"?>
+<p:notesMaster xmlns:a="http://schemas.openxmlformats.org/drawingml/2006/main" xmlns:r="http://schemas.openxmlformats.org/officeDocument/2006/relationships" xmlns:p="http://schemas.openxmlformats.org/presentationml/2006/main">
+  <p:cSld>
+    <p:bg>
+      <p:bgRef idx="1001">
+        <a:schemeClr val="bg1"/>
+      </p:bgRef>
+    </p:bg>
+    <p:spTree>
+      <p:nvGrpSpPr>
+        <p:cNvPr id="1" name=""/>
+        <p:cNvGrpSpPr/>
+        <p:nvPr/>
+      </p:nvGrpSpPr>
+      <p:grpSpPr>
+        <a:xfrm>
+          <a:off x="0" y="0"/>
+          <a:ext cx="0" cy="0"/>
+          <a:chOff x="0" y="0"/>
+          <a:chExt cx="0" cy="0"/>
+        </a:xfrm>
+      </p:grpSpPr>
+      <p:sp>
+        <p:nvSpPr>
+          <p:cNvPr id="2" name="Kopfzeilenplatzhalter 1"/>
+          <p:cNvSpPr>
+            <a:spLocks noGrp="1"/>
+          </p:cNvSpPr>
+          <p:nvPr>
+            <p:ph type="hdr" sz="quarter"/>
+          </p:nvPr>
+        </p:nvSpPr>
+        <p:spPr>
+          <a:xfrm>
+            <a:off x="0" y="0"/>
+            <a:ext cx="2971800" cy="458788"/>
+          </a:xfrm>
+          <a:prstGeom prst="rect">
+            <a:avLst/>
+          </a:prstGeom>
+        </p:spPr>
+        <p:txBody>
+          <a:bodyPr vert="horz" lIns="91440" tIns="45720" rIns="91440" bIns="45720" rtlCol="0"/>
+          <a:lstStyle>
+            <a:lvl1pPr algn="l">
+              <a:defRPr sz="1200"/>
+            </a:lvl1pPr>
+          </a:lstStyle>
+          <a:p>
+            <a:endParaRPr lang="de-DE"/>
+          </a:p>
+        </p:txBody>
+      </p:sp>
+      <p:sp>
+        <p:nvSpPr>
+          <p:cNvPr id="3" name="Datumsplatzhalter 2"/>
+          <p:cNvSpPr>
+            <a:spLocks noGrp="1"/>
+          </p:cNvSpPr>
+          <p:nvPr>
+            <p:ph type="dt" idx="1"/>
+          </p:nvPr>
+        </p:nvSpPr>
+        <p:spPr>
+          <a:xfrm>
+            <a:off x="3884613" y="0"/>
+            <a:ext cx="2971800" cy="458788"/>
+          </a:xfrm>
+          <a:prstGeom prst="rect">
+            <a:avLst/>
+          </a:prstGeom>
+        </p:spPr>
+        <p:txBody>
+          <a:bodyPr vert="horz" lIns="91440" tIns="45720" rIns="91440" bIns="45720" rtlCol="0"/>
+          <a:lstStyle>
+            <a:lvl1pPr algn="r">
+              <a:defRPr sz="1200"/>
+            </a:lvl1pPr>
+          </a:lstStyle>
+          <a:p>
+            <a:fld id="{D6441DEE-3F41-B34E-96C2-26796F10840D}" type="datetimeFigureOut">
+              <a:rPr lang="de-DE" smtClean="0"/>
+              <a:t>16.03.16</a:t>
+            </a:fld>
+            <a:endParaRPr lang="de-DE"/>
+          </a:p>
+        </p:txBody>
+      </p:sp>
+      <p:sp>
+        <p:nvSpPr>
+          <p:cNvPr id="4" name="Folienbildplatzhalter 3"/>
+          <p:cNvSpPr>
+            <a:spLocks noGrp="1" noRot="1" noChangeAspect="1"/>
+          </p:cNvSpPr>
+          <p:nvPr>
+            <p:ph type="sldImg" idx="2"/>
+          </p:nvPr>
+        </p:nvSpPr>
+        <p:spPr>
+          <a:xfrm>
+            <a:off x="685800" y="1143000"/>
+            <a:ext cx="5486400" cy="3086100"/>
+          </a:xfrm>
+          <a:prstGeom prst="rect">
+            <a:avLst/>
+          </a:prstGeom>
+          <a:noFill/>
+          <a:ln w="12700">
+            <a:solidFill>
+              <a:prstClr val="black"/>
+            </a:solidFill>
+          </a:ln>
+        </p:spPr>
+        <p:txBody>
+          <a:bodyPr vert="horz" lIns="91440" tIns="45720" rIns="91440" bIns="45720" rtlCol="0" anchor="ctr"/>
+          <a:lstStyle/>
+          <a:p>
+            <a:endParaRPr lang="de-DE"/>
+          </a:p>
+        </p:txBody>
+      </p:sp>
+      <p:sp>
+        <p:nvSpPr>
+          <p:cNvPr id="5" name="Notizenplatzhalter 4"/>
+          <p:cNvSpPr>
+            <a:spLocks noGrp="1"/>
+          </p:cNvSpPr>
+          <p:nvPr>
+            <p:ph type="body" sz="quarter" idx="3"/>
+          </p:nvPr>
+        </p:nvSpPr>
+        <p:spPr>
+          <a:xfrm>
+            <a:off x="685800" y="4400550"/>
+            <a:ext cx="5486400" cy="3600450"/>
+          </a:xfrm>
+          <a:prstGeom prst="rect">
+            <a:avLst/>
+          </a:prstGeom>
+        </p:spPr>
+        <p:txBody>
+          <a:bodyPr vert="horz" lIns="91440" tIns="45720" rIns="91440" bIns="45720" rtlCol="0"/>
+          <a:lstStyle/>
+          <a:p>
+            <a:pPr lvl="0"/>
+            <a:r>
+              <a:rPr lang="de-DE" smtClean="0"/>
+              <a:t>Mastertextformat bearbeiten</a:t>
+            </a:r>
+          </a:p>
+          <a:p>
+            <a:pPr lvl="1"/>
+            <a:r>
+              <a:rPr lang="de-DE" smtClean="0"/>
+              <a:t>Zweite Ebene</a:t>
+            </a:r>
+          </a:p>
+          <a:p>
+            <a:pPr lvl="2"/>
+            <a:r>
+              <a:rPr lang="de-DE" smtClean="0"/>
+              <a:t>Dritte Ebene</a:t>
+            </a:r>
+          </a:p>
+          <a:p>
+            <a:pPr lvl="3"/>
+            <a:r>
+              <a:rPr lang="de-DE" smtClean="0"/>
+              <a:t>Vierte Ebene</a:t>
+            </a:r>
+          </a:p>
+          <a:p>
+            <a:pPr lvl="4"/>
+            <a:r>
+              <a:rPr lang="de-DE" smtClean="0"/>
+              <a:t>Fünfte Ebene</a:t>
+            </a:r>
+            <a:endParaRPr lang="de-DE"/>
+          </a:p>
+        </p:txBody>
+      </p:sp>
+      <p:sp>
+        <p:nvSpPr>
+          <p:cNvPr id="6" name="Fußzeilenplatzhalter 5"/>
+          <p:cNvSpPr>
+            <a:spLocks noGrp="1"/>
+          </p:cNvSpPr>
+          <p:nvPr>
+            <p:ph type="ftr" sz="quarter" idx="4"/>
+          </p:nvPr>
+        </p:nvSpPr>
+        <p:spPr>
+          <a:xfrm>
+            <a:off x="0" y="8685213"/>
+            <a:ext cx="2971800" cy="458787"/>
+          </a:xfrm>
+          <a:prstGeom prst="rect">
+            <a:avLst/>
+          </a:prstGeom>
+        </p:spPr>
+        <p:txBody>
+          <a:bodyPr vert="horz" lIns="91440" tIns="45720" rIns="91440" bIns="45720" rtlCol="0" anchor="b"/>
+          <a:lstStyle>
+            <a:lvl1pPr algn="l">
+              <a:defRPr sz="1200"/>
+            </a:lvl1pPr>
+          </a:lstStyle>
+          <a:p>
+            <a:endParaRPr lang="de-DE"/>
+          </a:p>
+        </p:txBody>
+      </p:sp>
+      <p:sp>
+        <p:nvSpPr>
+          <p:cNvPr id="7" name="Foliennummernplatzhalter 6"/>
+          <p:cNvSpPr>
+            <a:spLocks noGrp="1"/>
+          </p:cNvSpPr>
+          <p:nvPr>
+            <p:ph type="sldNum" sz="quarter" idx="5"/>
+          </p:nvPr>
+        </p:nvSpPr>
+        <p:spPr>
+          <a:xfrm>
+            <a:off x="3884613" y="8685213"/>
+            <a:ext cx="2971800" cy="458787"/>
+          </a:xfrm>
+          <a:prstGeom prst="rect">
+            <a:avLst/>
+          </a:prstGeom>
+        </p:spPr>
+        <p:txBody>
+          <a:bodyPr vert="horz" lIns="91440" tIns="45720" rIns="91440" bIns="45720" rtlCol="0" anchor="b"/>
+          <a:lstStyle>
+            <a:lvl1pPr algn="r">
+              <a:defRPr sz="1200"/>
+            </a:lvl1pPr>
+          </a:lstStyle>
+          <a:p>
+            <a:fld id="{F066C7BC-674D-4B4E-93C4-E155CB34FEBC}" type="slidenum">
+              <a:rPr lang="de-DE" smtClean="0"/>
+              <a:t>‹Nr.›</a:t>
+            </a:fld>
+            <a:endParaRPr lang="de-DE"/>
+          </a:p>
+        </p:txBody>
+      </p:sp>
+    </p:spTree>
+    <p:extLst>
+      <p:ext uri="{BB962C8B-B14F-4D97-AF65-F5344CB8AC3E}">
+        <p14:creationId xmlns:p14="http://schemas.microsoft.com/office/powerpoint/2010/main" val="2127984719"/>
+      </p:ext>
+    </p:extLst>
+  </p:cSld>
+  <p:clrMap bg1="lt1" tx1="dk1" bg2="lt2" tx2="dk2" accent1="accent1" accent2="accent2" accent3="accent3" accent4="accent4" accent5="accent5" accent6="accent6" hlink="hlink" folHlink="folHlink"/>
+  <p:notesStyle>
+    <a:lvl1pPr marL="0" algn="l" defTabSz="914400" rtl="0" eaLnBrk="1" latinLnBrk="0" hangingPunct="1">
+      <a:defRPr sz="1200" kern="1200">
+        <a:solidFill>
+          <a:schemeClr val="tx1"/>
+        </a:solidFill>
+        <a:latin typeface="+mn-lt"/>
+        <a:ea typeface="+mn-ea"/>
+        <a:cs typeface="+mn-cs"/>
+      </a:defRPr>
+    </a:lvl1pPr>
+    <a:lvl2pPr marL="457200" algn="l" defTabSz="914400" rtl="0" eaLnBrk="1" latinLnBrk="0" hangingPunct="1">
+      <a:defRPr sz="1200" kern="1200">
+        <a:solidFill>
+          <a:schemeClr val="tx1"/>
+        </a:solidFill>
+        <a:latin typeface="+mn-lt"/>
+        <a:ea typeface="+mn-ea"/>
+        <a:cs typeface="+mn-cs"/>
+      </a:defRPr>
+    </a:lvl2pPr>
+    <a:lvl3pPr marL="914400" algn="l" defTabSz="914400" rtl="0" eaLnBrk="1" latinLnBrk="0" hangingPunct="1">
+      <a:defRPr sz="1200" kern="1200">
+        <a:solidFill>
+          <a:schemeClr val="tx1"/>
+        </a:solidFill>
+        <a:latin typeface="+mn-lt"/>
+        <a:ea typeface="+mn-ea"/>
+        <a:cs typeface="+mn-cs"/>
+      </a:defRPr>
+    </a:lvl3pPr>
+    <a:lvl4pPr marL="1371600" algn="l" defTabSz="914400" rtl="0" eaLnBrk="1" latinLnBrk="0" hangingPunct="1">
+      <a:defRPr sz="1200" kern="1200">
+        <a:solidFill>
+          <a:schemeClr val="tx1"/>
+        </a:solidFill>
+        <a:latin typeface="+mn-lt"/>
+        <a:ea typeface="+mn-ea"/>
+        <a:cs typeface="+mn-cs"/>
+      </a:defRPr>
+    </a:lvl4pPr>
+    <a:lvl5pPr marL="1828800" algn="l" defTabSz="914400" rtl="0" eaLnBrk="1" latinLnBrk="0" hangingPunct="1">
+      <a:defRPr sz="1200" kern="1200">
+        <a:solidFill>
+          <a:schemeClr val="tx1"/>
+        </a:solidFill>
+        <a:latin typeface="+mn-lt"/>
+        <a:ea typeface="+mn-ea"/>
+        <a:cs typeface="+mn-cs"/>
+      </a:defRPr>
+    </a:lvl5pPr>
+    <a:lvl6pPr marL="2286000" algn="l" defTabSz="914400" rtl="0" eaLnBrk="1" latinLnBrk="0" hangingPunct="1">
+      <a:defRPr sz="1200" kern="1200">
+        <a:solidFill>
+          <a:schemeClr val="tx1"/>
+        </a:solidFill>
+        <a:latin typeface="+mn-lt"/>
+        <a:ea typeface="+mn-ea"/>
+        <a:cs typeface="+mn-cs"/>
+      </a:defRPr>
+    </a:lvl6pPr>
+    <a:lvl7pPr marL="2743200" algn="l" defTabSz="914400" rtl="0" eaLnBrk="1" latinLnBrk="0" hangingPunct="1">
+      <a:defRPr sz="1200" kern="1200">
+        <a:solidFill>
+          <a:schemeClr val="tx1"/>
+        </a:solidFill>
+        <a:latin typeface="+mn-lt"/>
+        <a:ea typeface="+mn-ea"/>
+        <a:cs typeface="+mn-cs"/>
+      </a:defRPr>
+    </a:lvl7pPr>
+    <a:lvl8pPr marL="3200400" algn="l" defTabSz="914400" rtl="0" eaLnBrk="1" latinLnBrk="0" hangingPunct="1">
+      <a:defRPr sz="1200" kern="1200">
+        <a:solidFill>
+          <a:schemeClr val="tx1"/>
+        </a:solidFill>
+        <a:latin typeface="+mn-lt"/>
+        <a:ea typeface="+mn-ea"/>
+        <a:cs typeface="+mn-cs"/>
+      </a:defRPr>
+    </a:lvl8pPr>
+    <a:lvl9pPr marL="3657600" algn="l" defTabSz="914400" rtl="0" eaLnBrk="1" latinLnBrk="0" hangingPunct="1">
+      <a:defRPr sz="1200" kern="1200">
+        <a:solidFill>
+          <a:schemeClr val="tx1"/>
+        </a:solidFill>
+        <a:latin typeface="+mn-lt"/>
+        <a:ea typeface="+mn-ea"/>
+        <a:cs typeface="+mn-cs"/>
+      </a:defRPr>
+    </a:lvl9pPr>
+  </p:notesStyle>
+</p:notesMaster>
+</file>
+
+<file path=ppt/notesSlides/notesSlide1.xml><?xml version="1.0" encoding="utf-8"?>
+<p:notes xmlns:a="http://schemas.openxmlformats.org/drawingml/2006/main" xmlns:r="http://schemas.openxmlformats.org/officeDocument/2006/relationships" xmlns:p="http://schemas.openxmlformats.org/presentationml/2006/main">
+  <p:cSld>
+    <p:spTree>
+      <p:nvGrpSpPr>
+        <p:cNvPr id="1" name=""/>
+        <p:cNvGrpSpPr/>
+        <p:nvPr/>
+      </p:nvGrpSpPr>
+      <p:grpSpPr>
+        <a:xfrm>
+          <a:off x="0" y="0"/>
+          <a:ext cx="0" cy="0"/>
+          <a:chOff x="0" y="0"/>
+          <a:chExt cx="0" cy="0"/>
+        </a:xfrm>
+      </p:grpSpPr>
+      <p:sp>
+        <p:nvSpPr>
+          <p:cNvPr id="2" name="Folienbildplatzhalter 1"/>
+          <p:cNvSpPr>
+            <a:spLocks noGrp="1" noRot="1" noChangeAspect="1"/>
+          </p:cNvSpPr>
+          <p:nvPr>
+            <p:ph type="sldImg"/>
+          </p:nvPr>
+        </p:nvSpPr>
+        <p:spPr/>
+      </p:sp>
+      <p:sp>
+        <p:nvSpPr>
+          <p:cNvPr id="3" name="Notizenplatzhalter 2"/>
+          <p:cNvSpPr>
+            <a:spLocks noGrp="1"/>
+          </p:cNvSpPr>
+          <p:nvPr>
+            <p:ph type="body" idx="1"/>
+          </p:nvPr>
+        </p:nvSpPr>
+        <p:spPr/>
+        <p:txBody>
+          <a:bodyPr/>
+          <a:lstStyle/>
+          <a:p>
+            <a:endParaRPr lang="de-DE" dirty="0"/>
+          </a:p>
+        </p:txBody>
+      </p:sp>
+      <p:sp>
+        <p:nvSpPr>
+          <p:cNvPr id="4" name="Foliennummernplatzhalter 3"/>
+          <p:cNvSpPr>
+            <a:spLocks noGrp="1"/>
+          </p:cNvSpPr>
+          <p:nvPr>
+            <p:ph type="sldNum" sz="quarter" idx="10"/>
+          </p:nvPr>
+        </p:nvSpPr>
+        <p:spPr/>
+        <p:txBody>
+          <a:bodyPr/>
+          <a:lstStyle/>
+          <a:p>
+            <a:fld id="{F066C7BC-674D-4B4E-93C4-E155CB34FEBC}" type="slidenum">
+              <a:rPr lang="de-DE" smtClean="0"/>
+              <a:t>3</a:t>
+            </a:fld>
+            <a:endParaRPr lang="de-DE"/>
+          </a:p>
+        </p:txBody>
+      </p:sp>
+    </p:spTree>
+    <p:extLst>
+      <p:ext uri="{BB962C8B-B14F-4D97-AF65-F5344CB8AC3E}">
+        <p14:creationId xmlns:p14="http://schemas.microsoft.com/office/powerpoint/2010/main" val="846515095"/>
+      </p:ext>
+    </p:extLst>
+  </p:cSld>
+  <p:clrMapOvr>
+    <a:masterClrMapping/>
+  </p:clrMapOvr>
+</p:notes>
+</file>
+
 <file path=ppt/slideLayouts/slideLayout1.xml><?xml version="1.0" encoding="utf-8"?>
 <p:sldLayout xmlns:a="http://schemas.openxmlformats.org/drawingml/2006/main" xmlns:r="http://schemas.openxmlformats.org/officeDocument/2006/relationships" xmlns:p="http://schemas.openxmlformats.org/presentationml/2006/main" type="title" preserve="1">
   <p:cSld name="Titelfolie">
@@ -245,7 +683,7 @@
           <a:p>
             <a:fld id="{45C635BA-7AD8-E44A-B5F4-33C1482C67A6}" type="datetimeFigureOut">
               <a:rPr lang="de-DE" smtClean="0"/>
-              <a:t>06.03.16</a:t>
+              <a:t>16.03.16</a:t>
             </a:fld>
             <a:endParaRPr lang="de-DE"/>
           </a:p>
@@ -415,7 +853,7 @@
           <a:p>
             <a:fld id="{45C635BA-7AD8-E44A-B5F4-33C1482C67A6}" type="datetimeFigureOut">
               <a:rPr lang="de-DE" smtClean="0"/>
-              <a:t>06.03.16</a:t>
+              <a:t>16.03.16</a:t>
             </a:fld>
             <a:endParaRPr lang="de-DE"/>
           </a:p>
@@ -595,7 +1033,7 @@
           <a:p>
             <a:fld id="{45C635BA-7AD8-E44A-B5F4-33C1482C67A6}" type="datetimeFigureOut">
               <a:rPr lang="de-DE" smtClean="0"/>
-              <a:t>06.03.16</a:t>
+              <a:t>16.03.16</a:t>
             </a:fld>
             <a:endParaRPr lang="de-DE"/>
           </a:p>
@@ -765,7 +1203,7 @@
           <a:p>
             <a:fld id="{45C635BA-7AD8-E44A-B5F4-33C1482C67A6}" type="datetimeFigureOut">
               <a:rPr lang="de-DE" smtClean="0"/>
-              <a:t>06.03.16</a:t>
+              <a:t>16.03.16</a:t>
             </a:fld>
             <a:endParaRPr lang="de-DE"/>
           </a:p>
@@ -1011,7 +1449,7 @@
           <a:p>
             <a:fld id="{45C635BA-7AD8-E44A-B5F4-33C1482C67A6}" type="datetimeFigureOut">
               <a:rPr lang="de-DE" smtClean="0"/>
-              <a:t>06.03.16</a:t>
+              <a:t>16.03.16</a:t>
             </a:fld>
             <a:endParaRPr lang="de-DE"/>
           </a:p>
@@ -1243,7 +1681,7 @@
           <a:p>
             <a:fld id="{45C635BA-7AD8-E44A-B5F4-33C1482C67A6}" type="datetimeFigureOut">
               <a:rPr lang="de-DE" smtClean="0"/>
-              <a:t>06.03.16</a:t>
+              <a:t>16.03.16</a:t>
             </a:fld>
             <a:endParaRPr lang="de-DE"/>
           </a:p>
@@ -1610,7 +2048,7 @@
           <a:p>
             <a:fld id="{45C635BA-7AD8-E44A-B5F4-33C1482C67A6}" type="datetimeFigureOut">
               <a:rPr lang="de-DE" smtClean="0"/>
-              <a:t>06.03.16</a:t>
+              <a:t>16.03.16</a:t>
             </a:fld>
             <a:endParaRPr lang="de-DE"/>
           </a:p>
@@ -1728,7 +2166,7 @@
           <a:p>
             <a:fld id="{45C635BA-7AD8-E44A-B5F4-33C1482C67A6}" type="datetimeFigureOut">
               <a:rPr lang="de-DE" smtClean="0"/>
-              <a:t>06.03.16</a:t>
+              <a:t>16.03.16</a:t>
             </a:fld>
             <a:endParaRPr lang="de-DE"/>
           </a:p>
@@ -1823,7 +2261,7 @@
           <a:p>
             <a:fld id="{45C635BA-7AD8-E44A-B5F4-33C1482C67A6}" type="datetimeFigureOut">
               <a:rPr lang="de-DE" smtClean="0"/>
-              <a:t>06.03.16</a:t>
+              <a:t>16.03.16</a:t>
             </a:fld>
             <a:endParaRPr lang="de-DE"/>
           </a:p>
@@ -2100,7 +2538,7 @@
           <a:p>
             <a:fld id="{45C635BA-7AD8-E44A-B5F4-33C1482C67A6}" type="datetimeFigureOut">
               <a:rPr lang="de-DE" smtClean="0"/>
-              <a:t>06.03.16</a:t>
+              <a:t>16.03.16</a:t>
             </a:fld>
             <a:endParaRPr lang="de-DE"/>
           </a:p>
@@ -2353,7 +2791,7 @@
           <a:p>
             <a:fld id="{45C635BA-7AD8-E44A-B5F4-33C1482C67A6}" type="datetimeFigureOut">
               <a:rPr lang="de-DE" smtClean="0"/>
-              <a:t>06.03.16</a:t>
+              <a:t>16.03.16</a:t>
             </a:fld>
             <a:endParaRPr lang="de-DE"/>
           </a:p>
@@ -2566,7 +3004,7 @@
           <a:p>
             <a:fld id="{45C635BA-7AD8-E44A-B5F4-33C1482C67A6}" type="datetimeFigureOut">
               <a:rPr lang="de-DE" smtClean="0"/>
-              <a:t>06.03.16</a:t>
+              <a:t>16.03.16</a:t>
             </a:fld>
             <a:endParaRPr lang="de-DE"/>
           </a:p>
@@ -4221,6 +4659,1379 @@
       </p:grpSpPr>
       <p:sp>
         <p:nvSpPr>
+          <p:cNvPr id="28" name="Abgerundetes Rechteck 27"/>
+          <p:cNvSpPr/>
+          <p:nvPr/>
+        </p:nvSpPr>
+        <p:spPr>
+          <a:xfrm>
+            <a:off x="2165349" y="666241"/>
+            <a:ext cx="3548265" cy="2534159"/>
+          </a:xfrm>
+          <a:prstGeom prst="roundRect">
+            <a:avLst>
+              <a:gd name="adj" fmla="val 3431"/>
+            </a:avLst>
+          </a:prstGeom>
+          <a:solidFill>
+            <a:srgbClr val="FFC000"/>
+          </a:solidFill>
+          <a:ln>
+            <a:noFill/>
+          </a:ln>
+        </p:spPr>
+        <p:style>
+          <a:lnRef idx="2">
+            <a:schemeClr val="accent1">
+              <a:shade val="50000"/>
+            </a:schemeClr>
+          </a:lnRef>
+          <a:fillRef idx="1">
+            <a:schemeClr val="accent1"/>
+          </a:fillRef>
+          <a:effectRef idx="0">
+            <a:schemeClr val="accent1"/>
+          </a:effectRef>
+          <a:fontRef idx="minor">
+            <a:schemeClr val="lt1"/>
+          </a:fontRef>
+        </p:style>
+        <p:txBody>
+          <a:bodyPr rtlCol="0" anchor="b"/>
+          <a:lstStyle/>
+          <a:p>
+            <a:pPr algn="ctr"/>
+            <a:r>
+              <a:rPr lang="de-DE" sz="800" b="1" dirty="0" smtClean="0">
+                <a:solidFill>
+                  <a:sysClr val="windowText" lastClr="000000"/>
+                </a:solidFill>
+                <a:latin typeface="Verdana" charset="0"/>
+                <a:ea typeface="Verdana" charset="0"/>
+                <a:cs typeface="Verdana" charset="0"/>
+              </a:rPr>
+              <a:t>Service Transition</a:t>
+            </a:r>
+            <a:endParaRPr lang="de-DE" sz="800" b="1" dirty="0">
+              <a:solidFill>
+                <a:sysClr val="windowText" lastClr="000000"/>
+              </a:solidFill>
+              <a:latin typeface="Verdana" charset="0"/>
+              <a:ea typeface="Verdana" charset="0"/>
+              <a:cs typeface="Verdana" charset="0"/>
+            </a:endParaRPr>
+          </a:p>
+        </p:txBody>
+      </p:sp>
+      <p:sp>
+        <p:nvSpPr>
+          <p:cNvPr id="12" name="Abgerundetes Rechteck 11"/>
+          <p:cNvSpPr/>
+          <p:nvPr/>
+        </p:nvSpPr>
+        <p:spPr>
+          <a:xfrm>
+            <a:off x="1032267" y="1987077"/>
+            <a:ext cx="716872" cy="373755"/>
+          </a:xfrm>
+          <a:prstGeom prst="roundRect">
+            <a:avLst/>
+          </a:prstGeom>
+          <a:solidFill>
+            <a:srgbClr val="FFC000"/>
+          </a:solidFill>
+          <a:ln>
+            <a:noFill/>
+          </a:ln>
+        </p:spPr>
+        <p:style>
+          <a:lnRef idx="2">
+            <a:schemeClr val="accent1">
+              <a:shade val="50000"/>
+            </a:schemeClr>
+          </a:lnRef>
+          <a:fillRef idx="1">
+            <a:schemeClr val="accent1"/>
+          </a:fillRef>
+          <a:effectRef idx="0">
+            <a:schemeClr val="accent1"/>
+          </a:effectRef>
+          <a:fontRef idx="minor">
+            <a:schemeClr val="lt1"/>
+          </a:fontRef>
+        </p:style>
+        <p:txBody>
+          <a:bodyPr rtlCol="0" anchor="ctr"/>
+          <a:lstStyle/>
+          <a:p>
+            <a:pPr algn="ctr"/>
+            <a:r>
+              <a:rPr lang="de-DE" sz="800" b="1" dirty="0" smtClean="0">
+                <a:solidFill>
+                  <a:sysClr val="windowText" lastClr="000000"/>
+                </a:solidFill>
+                <a:latin typeface="Verdana" charset="0"/>
+                <a:ea typeface="Verdana" charset="0"/>
+                <a:cs typeface="Verdana" charset="0"/>
+              </a:rPr>
+              <a:t>Service Strategy</a:t>
+            </a:r>
+            <a:endParaRPr lang="de-DE" sz="800" b="1" dirty="0">
+              <a:solidFill>
+                <a:sysClr val="windowText" lastClr="000000"/>
+              </a:solidFill>
+              <a:latin typeface="Verdana" charset="0"/>
+              <a:ea typeface="Verdana" charset="0"/>
+              <a:cs typeface="Verdana" charset="0"/>
+            </a:endParaRPr>
+          </a:p>
+        </p:txBody>
+      </p:sp>
+      <p:sp>
+        <p:nvSpPr>
+          <p:cNvPr id="15" name="Abgerundetes Rechteck 14"/>
+          <p:cNvSpPr/>
+          <p:nvPr/>
+        </p:nvSpPr>
+        <p:spPr>
+          <a:xfrm>
+            <a:off x="2165349" y="493025"/>
+            <a:ext cx="3548267" cy="159893"/>
+          </a:xfrm>
+          <a:prstGeom prst="roundRect">
+            <a:avLst/>
+          </a:prstGeom>
+          <a:solidFill>
+            <a:srgbClr val="FFC000"/>
+          </a:solidFill>
+          <a:ln>
+            <a:noFill/>
+          </a:ln>
+        </p:spPr>
+        <p:style>
+          <a:lnRef idx="2">
+            <a:schemeClr val="accent1">
+              <a:shade val="50000"/>
+            </a:schemeClr>
+          </a:lnRef>
+          <a:fillRef idx="1">
+            <a:schemeClr val="accent1"/>
+          </a:fillRef>
+          <a:effectRef idx="0">
+            <a:schemeClr val="accent1"/>
+          </a:effectRef>
+          <a:fontRef idx="minor">
+            <a:schemeClr val="lt1"/>
+          </a:fontRef>
+        </p:style>
+        <p:txBody>
+          <a:bodyPr rtlCol="0" anchor="ctr"/>
+          <a:lstStyle/>
+          <a:p>
+            <a:pPr algn="ctr"/>
+            <a:r>
+              <a:rPr lang="de-DE" sz="800" b="1" dirty="0" err="1" smtClean="0">
+                <a:solidFill>
+                  <a:sysClr val="windowText" lastClr="000000"/>
+                </a:solidFill>
+                <a:latin typeface="Verdana" charset="0"/>
+                <a:ea typeface="Verdana" charset="0"/>
+                <a:cs typeface="Verdana" charset="0"/>
+              </a:rPr>
+              <a:t>Continual</a:t>
+            </a:r>
+            <a:r>
+              <a:rPr lang="de-DE" sz="800" b="1" dirty="0" smtClean="0">
+                <a:solidFill>
+                  <a:sysClr val="windowText" lastClr="000000"/>
+                </a:solidFill>
+                <a:latin typeface="Verdana" charset="0"/>
+                <a:ea typeface="Verdana" charset="0"/>
+                <a:cs typeface="Verdana" charset="0"/>
+              </a:rPr>
+              <a:t> Service </a:t>
+            </a:r>
+            <a:r>
+              <a:rPr lang="de-DE" sz="800" b="1" dirty="0" err="1" smtClean="0">
+                <a:solidFill>
+                  <a:sysClr val="windowText" lastClr="000000"/>
+                </a:solidFill>
+                <a:latin typeface="Verdana" charset="0"/>
+                <a:ea typeface="Verdana" charset="0"/>
+                <a:cs typeface="Verdana" charset="0"/>
+              </a:rPr>
+              <a:t>Improvement</a:t>
+            </a:r>
+            <a:endParaRPr lang="de-DE" sz="800" b="1" dirty="0">
+              <a:solidFill>
+                <a:sysClr val="windowText" lastClr="000000"/>
+              </a:solidFill>
+              <a:latin typeface="Verdana" charset="0"/>
+              <a:ea typeface="Verdana" charset="0"/>
+              <a:cs typeface="Verdana" charset="0"/>
+            </a:endParaRPr>
+          </a:p>
+        </p:txBody>
+      </p:sp>
+      <p:sp>
+        <p:nvSpPr>
+          <p:cNvPr id="16" name="Abgerundetes Rechteck 15"/>
+          <p:cNvSpPr/>
+          <p:nvPr/>
+        </p:nvSpPr>
+        <p:spPr>
+          <a:xfrm>
+            <a:off x="2222500" y="691640"/>
+            <a:ext cx="3441700" cy="159893"/>
+          </a:xfrm>
+          <a:prstGeom prst="roundRect">
+            <a:avLst/>
+          </a:prstGeom>
+          <a:solidFill>
+            <a:schemeClr val="tx1">
+              <a:lumMod val="75000"/>
+              <a:lumOff val="25000"/>
+            </a:schemeClr>
+          </a:solidFill>
+          <a:ln>
+            <a:noFill/>
+          </a:ln>
+        </p:spPr>
+        <p:style>
+          <a:lnRef idx="2">
+            <a:schemeClr val="accent1">
+              <a:shade val="50000"/>
+            </a:schemeClr>
+          </a:lnRef>
+          <a:fillRef idx="1">
+            <a:schemeClr val="accent1"/>
+          </a:fillRef>
+          <a:effectRef idx="0">
+            <a:schemeClr val="accent1"/>
+          </a:effectRef>
+          <a:fontRef idx="minor">
+            <a:schemeClr val="lt1"/>
+          </a:fontRef>
+        </p:style>
+        <p:txBody>
+          <a:bodyPr rtlCol="0" anchor="ctr"/>
+          <a:lstStyle/>
+          <a:p>
+            <a:pPr algn="ctr"/>
+            <a:r>
+              <a:rPr lang="de-DE" sz="800" dirty="0" smtClean="0">
+                <a:solidFill>
+                  <a:schemeClr val="bg1"/>
+                </a:solidFill>
+                <a:latin typeface="Verdana" charset="0"/>
+                <a:ea typeface="Verdana" charset="0"/>
+                <a:cs typeface="Verdana" charset="0"/>
+              </a:rPr>
+              <a:t>Change Management</a:t>
+            </a:r>
+            <a:endParaRPr lang="de-DE" sz="800" dirty="0">
+              <a:solidFill>
+                <a:schemeClr val="bg1"/>
+              </a:solidFill>
+              <a:latin typeface="Verdana" charset="0"/>
+              <a:ea typeface="Verdana" charset="0"/>
+              <a:cs typeface="Verdana" charset="0"/>
+            </a:endParaRPr>
+          </a:p>
+        </p:txBody>
+      </p:sp>
+      <p:sp>
+        <p:nvSpPr>
+          <p:cNvPr id="17" name="Abgerundetes Rechteck 16"/>
+          <p:cNvSpPr/>
+          <p:nvPr/>
+        </p:nvSpPr>
+        <p:spPr>
+          <a:xfrm>
+            <a:off x="2222500" y="866100"/>
+            <a:ext cx="3441700" cy="159893"/>
+          </a:xfrm>
+          <a:prstGeom prst="roundRect">
+            <a:avLst/>
+          </a:prstGeom>
+          <a:solidFill>
+            <a:schemeClr val="tx1">
+              <a:lumMod val="75000"/>
+              <a:lumOff val="25000"/>
+            </a:schemeClr>
+          </a:solidFill>
+          <a:ln>
+            <a:noFill/>
+          </a:ln>
+        </p:spPr>
+        <p:style>
+          <a:lnRef idx="2">
+            <a:schemeClr val="accent1">
+              <a:shade val="50000"/>
+            </a:schemeClr>
+          </a:lnRef>
+          <a:fillRef idx="1">
+            <a:schemeClr val="accent1"/>
+          </a:fillRef>
+          <a:effectRef idx="0">
+            <a:schemeClr val="accent1"/>
+          </a:effectRef>
+          <a:fontRef idx="minor">
+            <a:schemeClr val="lt1"/>
+          </a:fontRef>
+        </p:style>
+        <p:txBody>
+          <a:bodyPr rtlCol="0" anchor="ctr"/>
+          <a:lstStyle/>
+          <a:p>
+            <a:pPr algn="ctr"/>
+            <a:r>
+              <a:rPr lang="de-DE" sz="800" dirty="0" smtClean="0">
+                <a:solidFill>
+                  <a:schemeClr val="bg1"/>
+                </a:solidFill>
+                <a:latin typeface="Verdana" charset="0"/>
+                <a:ea typeface="Verdana" charset="0"/>
+                <a:cs typeface="Verdana" charset="0"/>
+              </a:rPr>
+              <a:t>Service Asset </a:t>
+            </a:r>
+            <a:r>
+              <a:rPr lang="de-DE" sz="800" dirty="0" err="1" smtClean="0">
+                <a:solidFill>
+                  <a:schemeClr val="bg1"/>
+                </a:solidFill>
+                <a:latin typeface="Verdana" charset="0"/>
+                <a:ea typeface="Verdana" charset="0"/>
+                <a:cs typeface="Verdana" charset="0"/>
+              </a:rPr>
+              <a:t>and</a:t>
+            </a:r>
+            <a:r>
+              <a:rPr lang="de-DE" sz="800" dirty="0" smtClean="0">
+                <a:solidFill>
+                  <a:schemeClr val="bg1"/>
+                </a:solidFill>
+                <a:latin typeface="Verdana" charset="0"/>
+                <a:ea typeface="Verdana" charset="0"/>
+                <a:cs typeface="Verdana" charset="0"/>
+              </a:rPr>
+              <a:t> </a:t>
+            </a:r>
+            <a:r>
+              <a:rPr lang="de-DE" sz="800" dirty="0" err="1" smtClean="0">
+                <a:solidFill>
+                  <a:schemeClr val="bg1"/>
+                </a:solidFill>
+                <a:latin typeface="Verdana" charset="0"/>
+                <a:ea typeface="Verdana" charset="0"/>
+                <a:cs typeface="Verdana" charset="0"/>
+              </a:rPr>
+              <a:t>Configuration</a:t>
+            </a:r>
+            <a:r>
+              <a:rPr lang="de-DE" sz="800" dirty="0" smtClean="0">
+                <a:solidFill>
+                  <a:schemeClr val="bg1"/>
+                </a:solidFill>
+                <a:latin typeface="Verdana" charset="0"/>
+                <a:ea typeface="Verdana" charset="0"/>
+                <a:cs typeface="Verdana" charset="0"/>
+              </a:rPr>
+              <a:t> Management</a:t>
+            </a:r>
+            <a:endParaRPr lang="de-DE" sz="800" dirty="0">
+              <a:solidFill>
+                <a:schemeClr val="bg1"/>
+              </a:solidFill>
+              <a:latin typeface="Verdana" charset="0"/>
+              <a:ea typeface="Verdana" charset="0"/>
+              <a:cs typeface="Verdana" charset="0"/>
+            </a:endParaRPr>
+          </a:p>
+        </p:txBody>
+      </p:sp>
+      <p:sp>
+        <p:nvSpPr>
+          <p:cNvPr id="18" name="Abgerundetes Rechteck 17"/>
+          <p:cNvSpPr/>
+          <p:nvPr/>
+        </p:nvSpPr>
+        <p:spPr>
+          <a:xfrm>
+            <a:off x="2222500" y="1040983"/>
+            <a:ext cx="3441700" cy="1776300"/>
+          </a:xfrm>
+          <a:prstGeom prst="roundRect">
+            <a:avLst>
+              <a:gd name="adj" fmla="val 4254"/>
+            </a:avLst>
+          </a:prstGeom>
+          <a:solidFill>
+            <a:schemeClr val="tx1">
+              <a:lumMod val="75000"/>
+              <a:lumOff val="25000"/>
+            </a:schemeClr>
+          </a:solidFill>
+          <a:ln>
+            <a:noFill/>
+          </a:ln>
+        </p:spPr>
+        <p:style>
+          <a:lnRef idx="2">
+            <a:schemeClr val="accent1">
+              <a:shade val="50000"/>
+            </a:schemeClr>
+          </a:lnRef>
+          <a:fillRef idx="1">
+            <a:schemeClr val="accent1"/>
+          </a:fillRef>
+          <a:effectRef idx="0">
+            <a:schemeClr val="accent1"/>
+          </a:effectRef>
+          <a:fontRef idx="minor">
+            <a:schemeClr val="lt1"/>
+          </a:fontRef>
+        </p:style>
+        <p:txBody>
+          <a:bodyPr rtlCol="0" anchor="ctr"/>
+          <a:lstStyle/>
+          <a:p>
+            <a:pPr algn="ctr"/>
+            <a:endParaRPr lang="de-DE" sz="800" dirty="0">
+              <a:solidFill>
+                <a:schemeClr val="bg1"/>
+              </a:solidFill>
+              <a:latin typeface="Verdana" charset="0"/>
+              <a:ea typeface="Verdana" charset="0"/>
+              <a:cs typeface="Verdana" charset="0"/>
+            </a:endParaRPr>
+          </a:p>
+        </p:txBody>
+      </p:sp>
+      <p:sp>
+        <p:nvSpPr>
+          <p:cNvPr id="14" name="Abgerundetes Rechteck 13"/>
+          <p:cNvSpPr/>
+          <p:nvPr/>
+        </p:nvSpPr>
+        <p:spPr>
+          <a:xfrm>
+            <a:off x="5306518" y="1984949"/>
+            <a:ext cx="790077" cy="373755"/>
+          </a:xfrm>
+          <a:prstGeom prst="roundRect">
+            <a:avLst/>
+          </a:prstGeom>
+          <a:solidFill>
+            <a:srgbClr val="FFC000"/>
+          </a:solidFill>
+          <a:ln>
+            <a:noFill/>
+          </a:ln>
+        </p:spPr>
+        <p:style>
+          <a:lnRef idx="2">
+            <a:schemeClr val="accent1">
+              <a:shade val="50000"/>
+            </a:schemeClr>
+          </a:lnRef>
+          <a:fillRef idx="1">
+            <a:schemeClr val="accent1"/>
+          </a:fillRef>
+          <a:effectRef idx="0">
+            <a:schemeClr val="accent1"/>
+          </a:effectRef>
+          <a:fontRef idx="minor">
+            <a:schemeClr val="lt1"/>
+          </a:fontRef>
+        </p:style>
+        <p:txBody>
+          <a:bodyPr rtlCol="0" anchor="ctr"/>
+          <a:lstStyle/>
+          <a:p>
+            <a:pPr algn="ctr"/>
+            <a:r>
+              <a:rPr lang="de-DE" sz="800" b="1" smtClean="0">
+                <a:solidFill>
+                  <a:sysClr val="windowText" lastClr="000000"/>
+                </a:solidFill>
+                <a:latin typeface="Verdana" charset="0"/>
+                <a:ea typeface="Verdana" charset="0"/>
+                <a:cs typeface="Verdana" charset="0"/>
+              </a:rPr>
+              <a:t>Service Operation</a:t>
+            </a:r>
+            <a:endParaRPr lang="de-DE" sz="800" b="1" dirty="0">
+              <a:solidFill>
+                <a:sysClr val="windowText" lastClr="000000"/>
+              </a:solidFill>
+              <a:latin typeface="Verdana" charset="0"/>
+              <a:ea typeface="Verdana" charset="0"/>
+              <a:cs typeface="Verdana" charset="0"/>
+            </a:endParaRPr>
+          </a:p>
+        </p:txBody>
+      </p:sp>
+      <p:sp>
+        <p:nvSpPr>
+          <p:cNvPr id="13" name="Abgerundetes Rechteck 12"/>
+          <p:cNvSpPr/>
+          <p:nvPr/>
+        </p:nvSpPr>
+        <p:spPr>
+          <a:xfrm>
+            <a:off x="1788371" y="1980714"/>
+            <a:ext cx="716872" cy="373755"/>
+          </a:xfrm>
+          <a:prstGeom prst="roundRect">
+            <a:avLst/>
+          </a:prstGeom>
+          <a:solidFill>
+            <a:srgbClr val="FFC000"/>
+          </a:solidFill>
+          <a:ln>
+            <a:noFill/>
+          </a:ln>
+        </p:spPr>
+        <p:style>
+          <a:lnRef idx="2">
+            <a:schemeClr val="accent1">
+              <a:shade val="50000"/>
+            </a:schemeClr>
+          </a:lnRef>
+          <a:fillRef idx="1">
+            <a:schemeClr val="accent1"/>
+          </a:fillRef>
+          <a:effectRef idx="0">
+            <a:schemeClr val="accent1"/>
+          </a:effectRef>
+          <a:fontRef idx="minor">
+            <a:schemeClr val="lt1"/>
+          </a:fontRef>
+        </p:style>
+        <p:txBody>
+          <a:bodyPr rtlCol="0" anchor="ctr"/>
+          <a:lstStyle/>
+          <a:p>
+            <a:pPr algn="ctr"/>
+            <a:r>
+              <a:rPr lang="de-DE" sz="800" b="1" dirty="0" smtClean="0">
+                <a:solidFill>
+                  <a:sysClr val="windowText" lastClr="000000"/>
+                </a:solidFill>
+                <a:latin typeface="Verdana" charset="0"/>
+                <a:ea typeface="Verdana" charset="0"/>
+                <a:cs typeface="Verdana" charset="0"/>
+              </a:rPr>
+              <a:t>Service Design</a:t>
+            </a:r>
+            <a:endParaRPr lang="de-DE" sz="800" b="1" dirty="0">
+              <a:solidFill>
+                <a:sysClr val="windowText" lastClr="000000"/>
+              </a:solidFill>
+              <a:latin typeface="Verdana" charset="0"/>
+              <a:ea typeface="Verdana" charset="0"/>
+              <a:cs typeface="Verdana" charset="0"/>
+            </a:endParaRPr>
+          </a:p>
+        </p:txBody>
+      </p:sp>
+      <p:sp>
+        <p:nvSpPr>
+          <p:cNvPr id="19" name="Abgerundetes Rechteck 18"/>
+          <p:cNvSpPr/>
+          <p:nvPr/>
+        </p:nvSpPr>
+        <p:spPr>
+          <a:xfrm>
+            <a:off x="2298700" y="1090118"/>
+            <a:ext cx="3303814" cy="159893"/>
+          </a:xfrm>
+          <a:prstGeom prst="roundRect">
+            <a:avLst/>
+          </a:prstGeom>
+          <a:solidFill>
+            <a:schemeClr val="bg1">
+              <a:lumMod val="75000"/>
+            </a:schemeClr>
+          </a:solidFill>
+          <a:ln>
+            <a:noFill/>
+          </a:ln>
+        </p:spPr>
+        <p:style>
+          <a:lnRef idx="2">
+            <a:schemeClr val="accent1">
+              <a:shade val="50000"/>
+            </a:schemeClr>
+          </a:lnRef>
+          <a:fillRef idx="1">
+            <a:schemeClr val="accent1"/>
+          </a:fillRef>
+          <a:effectRef idx="0">
+            <a:schemeClr val="accent1"/>
+          </a:effectRef>
+          <a:fontRef idx="minor">
+            <a:schemeClr val="lt1"/>
+          </a:fontRef>
+        </p:style>
+        <p:txBody>
+          <a:bodyPr rtlCol="0" anchor="ctr"/>
+          <a:lstStyle/>
+          <a:p>
+            <a:pPr algn="ctr"/>
+            <a:r>
+              <a:rPr lang="de-DE" sz="800" dirty="0" smtClean="0">
+                <a:solidFill>
+                  <a:schemeClr val="tx1"/>
+                </a:solidFill>
+                <a:latin typeface="Verdana" charset="0"/>
+                <a:ea typeface="Verdana" charset="0"/>
+                <a:cs typeface="Verdana" charset="0"/>
+              </a:rPr>
+              <a:t>Transition </a:t>
+            </a:r>
+            <a:r>
+              <a:rPr lang="de-DE" sz="800" dirty="0" err="1" smtClean="0">
+                <a:solidFill>
+                  <a:schemeClr val="tx1"/>
+                </a:solidFill>
+                <a:latin typeface="Verdana" charset="0"/>
+                <a:ea typeface="Verdana" charset="0"/>
+                <a:cs typeface="Verdana" charset="0"/>
+              </a:rPr>
+              <a:t>Planning</a:t>
+            </a:r>
+            <a:r>
+              <a:rPr lang="de-DE" sz="800" dirty="0" smtClean="0">
+                <a:solidFill>
+                  <a:schemeClr val="tx1"/>
+                </a:solidFill>
+                <a:latin typeface="Verdana" charset="0"/>
+                <a:ea typeface="Verdana" charset="0"/>
+                <a:cs typeface="Verdana" charset="0"/>
+              </a:rPr>
+              <a:t> </a:t>
+            </a:r>
+            <a:r>
+              <a:rPr lang="de-DE" sz="800" dirty="0" err="1" smtClean="0">
+                <a:solidFill>
+                  <a:schemeClr val="tx1"/>
+                </a:solidFill>
+                <a:latin typeface="Verdana" charset="0"/>
+                <a:ea typeface="Verdana" charset="0"/>
+                <a:cs typeface="Verdana" charset="0"/>
+              </a:rPr>
+              <a:t>and</a:t>
+            </a:r>
+            <a:r>
+              <a:rPr lang="de-DE" sz="800" dirty="0" smtClean="0">
+                <a:solidFill>
+                  <a:schemeClr val="tx1"/>
+                </a:solidFill>
+                <a:latin typeface="Verdana" charset="0"/>
+                <a:ea typeface="Verdana" charset="0"/>
+                <a:cs typeface="Verdana" charset="0"/>
+              </a:rPr>
+              <a:t> Support</a:t>
+            </a:r>
+            <a:endParaRPr lang="de-DE" sz="800" dirty="0">
+              <a:solidFill>
+                <a:schemeClr val="tx1"/>
+              </a:solidFill>
+              <a:latin typeface="Verdana" charset="0"/>
+              <a:ea typeface="Verdana" charset="0"/>
+              <a:cs typeface="Verdana" charset="0"/>
+            </a:endParaRPr>
+          </a:p>
+        </p:txBody>
+      </p:sp>
+      <p:sp>
+        <p:nvSpPr>
+          <p:cNvPr id="20" name="Abgerundetes Rechteck 19"/>
+          <p:cNvSpPr/>
+          <p:nvPr/>
+        </p:nvSpPr>
+        <p:spPr>
+          <a:xfrm>
+            <a:off x="2556933" y="1264057"/>
+            <a:ext cx="3045581" cy="159893"/>
+          </a:xfrm>
+          <a:prstGeom prst="roundRect">
+            <a:avLst/>
+          </a:prstGeom>
+          <a:solidFill>
+            <a:schemeClr val="bg1">
+              <a:lumMod val="75000"/>
+            </a:schemeClr>
+          </a:solidFill>
+          <a:ln>
+            <a:noFill/>
+          </a:ln>
+        </p:spPr>
+        <p:style>
+          <a:lnRef idx="2">
+            <a:schemeClr val="accent1">
+              <a:shade val="50000"/>
+            </a:schemeClr>
+          </a:lnRef>
+          <a:fillRef idx="1">
+            <a:schemeClr val="accent1"/>
+          </a:fillRef>
+          <a:effectRef idx="0">
+            <a:schemeClr val="accent1"/>
+          </a:effectRef>
+          <a:fontRef idx="minor">
+            <a:schemeClr val="lt1"/>
+          </a:fontRef>
+        </p:style>
+        <p:txBody>
+          <a:bodyPr rtlCol="0" anchor="ctr"/>
+          <a:lstStyle/>
+          <a:p>
+            <a:pPr algn="ctr"/>
+            <a:r>
+              <a:rPr lang="de-DE" sz="800" dirty="0" smtClean="0">
+                <a:solidFill>
+                  <a:schemeClr val="tx1"/>
+                </a:solidFill>
+                <a:latin typeface="Verdana" charset="0"/>
+                <a:ea typeface="Verdana" charset="0"/>
+                <a:cs typeface="Verdana" charset="0"/>
+              </a:rPr>
+              <a:t>Change Evaluation</a:t>
+            </a:r>
+            <a:endParaRPr lang="de-DE" sz="800" dirty="0">
+              <a:solidFill>
+                <a:schemeClr val="tx1"/>
+              </a:solidFill>
+              <a:latin typeface="Verdana" charset="0"/>
+              <a:ea typeface="Verdana" charset="0"/>
+              <a:cs typeface="Verdana" charset="0"/>
+            </a:endParaRPr>
+          </a:p>
+        </p:txBody>
+      </p:sp>
+      <p:sp>
+        <p:nvSpPr>
+          <p:cNvPr id="21" name="Abgerundetes Rechteck 20"/>
+          <p:cNvSpPr/>
+          <p:nvPr/>
+        </p:nvSpPr>
+        <p:spPr>
+          <a:xfrm>
+            <a:off x="2556933" y="1446344"/>
+            <a:ext cx="2697895" cy="1176206"/>
+          </a:xfrm>
+          <a:prstGeom prst="roundRect">
+            <a:avLst/>
+          </a:prstGeom>
+          <a:solidFill>
+            <a:schemeClr val="bg1">
+              <a:lumMod val="75000"/>
+            </a:schemeClr>
+          </a:solidFill>
+          <a:ln>
+            <a:noFill/>
+          </a:ln>
+        </p:spPr>
+        <p:style>
+          <a:lnRef idx="2">
+            <a:schemeClr val="accent1">
+              <a:shade val="50000"/>
+            </a:schemeClr>
+          </a:lnRef>
+          <a:fillRef idx="1">
+            <a:schemeClr val="accent1"/>
+          </a:fillRef>
+          <a:effectRef idx="0">
+            <a:schemeClr val="accent1"/>
+          </a:effectRef>
+          <a:fontRef idx="minor">
+            <a:schemeClr val="lt1"/>
+          </a:fontRef>
+        </p:style>
+        <p:txBody>
+          <a:bodyPr rtlCol="0" anchor="t"/>
+          <a:lstStyle/>
+          <a:p>
+            <a:pPr algn="ctr"/>
+            <a:r>
+              <a:rPr lang="de-DE" sz="800" dirty="0" smtClean="0">
+                <a:solidFill>
+                  <a:schemeClr val="tx1"/>
+                </a:solidFill>
+                <a:latin typeface="Verdana" charset="0"/>
+                <a:ea typeface="Verdana" charset="0"/>
+                <a:cs typeface="Verdana" charset="0"/>
+              </a:rPr>
+              <a:t>Release </a:t>
+            </a:r>
+            <a:r>
+              <a:rPr lang="de-DE" sz="800" dirty="0" err="1" smtClean="0">
+                <a:solidFill>
+                  <a:schemeClr val="tx1"/>
+                </a:solidFill>
+                <a:latin typeface="Verdana" charset="0"/>
+                <a:ea typeface="Verdana" charset="0"/>
+                <a:cs typeface="Verdana" charset="0"/>
+              </a:rPr>
+              <a:t>and</a:t>
+            </a:r>
+            <a:r>
+              <a:rPr lang="de-DE" sz="800" dirty="0" smtClean="0">
+                <a:solidFill>
+                  <a:schemeClr val="tx1"/>
+                </a:solidFill>
+                <a:latin typeface="Verdana" charset="0"/>
+                <a:ea typeface="Verdana" charset="0"/>
+                <a:cs typeface="Verdana" charset="0"/>
+              </a:rPr>
+              <a:t> </a:t>
+            </a:r>
+            <a:r>
+              <a:rPr lang="de-DE" sz="800" dirty="0" err="1" smtClean="0">
+                <a:solidFill>
+                  <a:schemeClr val="tx1"/>
+                </a:solidFill>
+                <a:latin typeface="Verdana" charset="0"/>
+                <a:ea typeface="Verdana" charset="0"/>
+                <a:cs typeface="Verdana" charset="0"/>
+              </a:rPr>
+              <a:t>Deployment</a:t>
+            </a:r>
+            <a:r>
+              <a:rPr lang="de-DE" sz="800" dirty="0" smtClean="0">
+                <a:solidFill>
+                  <a:schemeClr val="tx1"/>
+                </a:solidFill>
+                <a:latin typeface="Verdana" charset="0"/>
+                <a:ea typeface="Verdana" charset="0"/>
+                <a:cs typeface="Verdana" charset="0"/>
+              </a:rPr>
+              <a:t> Management</a:t>
+            </a:r>
+            <a:endParaRPr lang="de-DE" sz="800" dirty="0">
+              <a:solidFill>
+                <a:schemeClr val="tx1"/>
+              </a:solidFill>
+              <a:latin typeface="Verdana" charset="0"/>
+              <a:ea typeface="Verdana" charset="0"/>
+              <a:cs typeface="Verdana" charset="0"/>
+            </a:endParaRPr>
+          </a:p>
+        </p:txBody>
+      </p:sp>
+      <p:sp>
+        <p:nvSpPr>
+          <p:cNvPr id="22" name="Abgerundetes Rechteck 21"/>
+          <p:cNvSpPr/>
+          <p:nvPr/>
+        </p:nvSpPr>
+        <p:spPr>
+          <a:xfrm>
+            <a:off x="2633482" y="1785210"/>
+            <a:ext cx="663045" cy="373755"/>
+          </a:xfrm>
+          <a:prstGeom prst="roundRect">
+            <a:avLst/>
+          </a:prstGeom>
+          <a:solidFill>
+            <a:schemeClr val="bg1"/>
+          </a:solidFill>
+          <a:ln>
+            <a:noFill/>
+          </a:ln>
+        </p:spPr>
+        <p:style>
+          <a:lnRef idx="2">
+            <a:schemeClr val="accent1">
+              <a:shade val="50000"/>
+            </a:schemeClr>
+          </a:lnRef>
+          <a:fillRef idx="1">
+            <a:schemeClr val="accent1"/>
+          </a:fillRef>
+          <a:effectRef idx="0">
+            <a:schemeClr val="accent1"/>
+          </a:effectRef>
+          <a:fontRef idx="minor">
+            <a:schemeClr val="lt1"/>
+          </a:fontRef>
+        </p:style>
+        <p:txBody>
+          <a:bodyPr rtlCol="0" anchor="ctr"/>
+          <a:lstStyle/>
+          <a:p>
+            <a:pPr algn="ctr"/>
+            <a:r>
+              <a:rPr lang="de-DE" sz="800" dirty="0" smtClean="0">
+                <a:solidFill>
+                  <a:sysClr val="windowText" lastClr="000000"/>
+                </a:solidFill>
+                <a:latin typeface="Verdana" charset="0"/>
+                <a:ea typeface="Verdana" charset="0"/>
+                <a:cs typeface="Verdana" charset="0"/>
+              </a:rPr>
+              <a:t>Release </a:t>
+            </a:r>
+            <a:r>
+              <a:rPr lang="de-DE" sz="800" dirty="0" err="1" smtClean="0">
+                <a:solidFill>
+                  <a:sysClr val="windowText" lastClr="000000"/>
+                </a:solidFill>
+                <a:latin typeface="Verdana" charset="0"/>
+                <a:ea typeface="Verdana" charset="0"/>
+                <a:cs typeface="Verdana" charset="0"/>
+              </a:rPr>
+              <a:t>Planning</a:t>
+            </a:r>
+            <a:endParaRPr lang="de-DE" sz="800" dirty="0">
+              <a:solidFill>
+                <a:sysClr val="windowText" lastClr="000000"/>
+              </a:solidFill>
+              <a:latin typeface="Verdana" charset="0"/>
+              <a:ea typeface="Verdana" charset="0"/>
+              <a:cs typeface="Verdana" charset="0"/>
+            </a:endParaRPr>
+          </a:p>
+        </p:txBody>
+      </p:sp>
+      <p:sp>
+        <p:nvSpPr>
+          <p:cNvPr id="23" name="Abgerundetes Rechteck 22"/>
+          <p:cNvSpPr/>
+          <p:nvPr/>
+        </p:nvSpPr>
+        <p:spPr>
+          <a:xfrm>
+            <a:off x="3157033" y="2173955"/>
+            <a:ext cx="816144" cy="373755"/>
+          </a:xfrm>
+          <a:prstGeom prst="roundRect">
+            <a:avLst/>
+          </a:prstGeom>
+          <a:solidFill>
+            <a:schemeClr val="bg1"/>
+          </a:solidFill>
+          <a:ln>
+            <a:noFill/>
+          </a:ln>
+        </p:spPr>
+        <p:style>
+          <a:lnRef idx="2">
+            <a:schemeClr val="accent1">
+              <a:shade val="50000"/>
+            </a:schemeClr>
+          </a:lnRef>
+          <a:fillRef idx="1">
+            <a:schemeClr val="accent1"/>
+          </a:fillRef>
+          <a:effectRef idx="0">
+            <a:schemeClr val="accent1"/>
+          </a:effectRef>
+          <a:fontRef idx="minor">
+            <a:schemeClr val="lt1"/>
+          </a:fontRef>
+        </p:style>
+        <p:txBody>
+          <a:bodyPr rtlCol="0" anchor="ctr"/>
+          <a:lstStyle/>
+          <a:p>
+            <a:pPr algn="ctr"/>
+            <a:r>
+              <a:rPr lang="de-DE" sz="800" dirty="0" smtClean="0">
+                <a:solidFill>
+                  <a:sysClr val="windowText" lastClr="000000"/>
+                </a:solidFill>
+                <a:latin typeface="Verdana" charset="0"/>
+                <a:ea typeface="Verdana" charset="0"/>
+                <a:cs typeface="Verdana" charset="0"/>
+              </a:rPr>
+              <a:t>Release </a:t>
+            </a:r>
+            <a:r>
+              <a:rPr lang="de-DE" sz="800" dirty="0" err="1" smtClean="0">
+                <a:solidFill>
+                  <a:sysClr val="windowText" lastClr="000000"/>
+                </a:solidFill>
+                <a:latin typeface="Verdana" charset="0"/>
+                <a:ea typeface="Verdana" charset="0"/>
+                <a:cs typeface="Verdana" charset="0"/>
+              </a:rPr>
+              <a:t>Build</a:t>
+            </a:r>
+            <a:r>
+              <a:rPr lang="de-DE" sz="800" dirty="0" smtClean="0">
+                <a:solidFill>
+                  <a:sysClr val="windowText" lastClr="000000"/>
+                </a:solidFill>
+                <a:latin typeface="Verdana" charset="0"/>
+                <a:ea typeface="Verdana" charset="0"/>
+                <a:cs typeface="Verdana" charset="0"/>
+              </a:rPr>
+              <a:t> &amp;Test</a:t>
+            </a:r>
+            <a:endParaRPr lang="de-DE" sz="800" dirty="0">
+              <a:solidFill>
+                <a:sysClr val="windowText" lastClr="000000"/>
+              </a:solidFill>
+              <a:latin typeface="Verdana" charset="0"/>
+              <a:ea typeface="Verdana" charset="0"/>
+              <a:cs typeface="Verdana" charset="0"/>
+            </a:endParaRPr>
+          </a:p>
+        </p:txBody>
+      </p:sp>
+      <p:sp>
+        <p:nvSpPr>
+          <p:cNvPr id="24" name="Abgerundetes Rechteck 23"/>
+          <p:cNvSpPr/>
+          <p:nvPr/>
+        </p:nvSpPr>
+        <p:spPr>
+          <a:xfrm>
+            <a:off x="3854305" y="1759940"/>
+            <a:ext cx="842744" cy="373755"/>
+          </a:xfrm>
+          <a:prstGeom prst="roundRect">
+            <a:avLst/>
+          </a:prstGeom>
+          <a:solidFill>
+            <a:schemeClr val="bg1"/>
+          </a:solidFill>
+          <a:ln>
+            <a:noFill/>
+          </a:ln>
+        </p:spPr>
+        <p:style>
+          <a:lnRef idx="2">
+            <a:schemeClr val="accent1">
+              <a:shade val="50000"/>
+            </a:schemeClr>
+          </a:lnRef>
+          <a:fillRef idx="1">
+            <a:schemeClr val="accent1"/>
+          </a:fillRef>
+          <a:effectRef idx="0">
+            <a:schemeClr val="accent1"/>
+          </a:effectRef>
+          <a:fontRef idx="minor">
+            <a:schemeClr val="lt1"/>
+          </a:fontRef>
+        </p:style>
+        <p:txBody>
+          <a:bodyPr rtlCol="0" anchor="ctr"/>
+          <a:lstStyle/>
+          <a:p>
+            <a:pPr algn="ctr"/>
+            <a:r>
+              <a:rPr lang="de-DE" sz="800" dirty="0">
+                <a:solidFill>
+                  <a:sysClr val="windowText" lastClr="000000"/>
+                </a:solidFill>
+                <a:latin typeface="Verdana" charset="0"/>
+                <a:ea typeface="Verdana" charset="0"/>
+                <a:cs typeface="Verdana" charset="0"/>
+              </a:rPr>
+              <a:t>Release </a:t>
+            </a:r>
+            <a:r>
+              <a:rPr lang="de-DE" sz="800" dirty="0" err="1">
+                <a:solidFill>
+                  <a:sysClr val="windowText" lastClr="000000"/>
+                </a:solidFill>
+                <a:latin typeface="Verdana" charset="0"/>
+                <a:ea typeface="Verdana" charset="0"/>
+                <a:cs typeface="Verdana" charset="0"/>
+              </a:rPr>
+              <a:t>Deployment</a:t>
+            </a:r>
+            <a:endParaRPr lang="de-DE" sz="800" dirty="0">
+              <a:solidFill>
+                <a:sysClr val="windowText" lastClr="000000"/>
+              </a:solidFill>
+              <a:latin typeface="Verdana" charset="0"/>
+              <a:ea typeface="Verdana" charset="0"/>
+              <a:cs typeface="Verdana" charset="0"/>
+            </a:endParaRPr>
+          </a:p>
+        </p:txBody>
+      </p:sp>
+      <p:sp>
+        <p:nvSpPr>
+          <p:cNvPr id="25" name="Abgerundetes Rechteck 24"/>
+          <p:cNvSpPr/>
+          <p:nvPr/>
+        </p:nvSpPr>
+        <p:spPr>
+          <a:xfrm>
+            <a:off x="4573276" y="2167591"/>
+            <a:ext cx="607733" cy="373755"/>
+          </a:xfrm>
+          <a:prstGeom prst="roundRect">
+            <a:avLst/>
+          </a:prstGeom>
+          <a:solidFill>
+            <a:schemeClr val="bg1"/>
+          </a:solidFill>
+          <a:ln>
+            <a:noFill/>
+          </a:ln>
+        </p:spPr>
+        <p:style>
+          <a:lnRef idx="2">
+            <a:schemeClr val="accent1">
+              <a:shade val="50000"/>
+            </a:schemeClr>
+          </a:lnRef>
+          <a:fillRef idx="1">
+            <a:schemeClr val="accent1"/>
+          </a:fillRef>
+          <a:effectRef idx="0">
+            <a:schemeClr val="accent1"/>
+          </a:effectRef>
+          <a:fontRef idx="minor">
+            <a:schemeClr val="lt1"/>
+          </a:fontRef>
+        </p:style>
+        <p:txBody>
+          <a:bodyPr rtlCol="0" anchor="ctr"/>
+          <a:lstStyle/>
+          <a:p>
+            <a:pPr algn="ctr"/>
+            <a:r>
+              <a:rPr lang="de-DE" sz="800" dirty="0" smtClean="0">
+                <a:solidFill>
+                  <a:sysClr val="windowText" lastClr="000000"/>
+                </a:solidFill>
+                <a:latin typeface="Verdana" charset="0"/>
+                <a:ea typeface="Verdana" charset="0"/>
+                <a:cs typeface="Verdana" charset="0"/>
+              </a:rPr>
+              <a:t>Review </a:t>
+            </a:r>
+            <a:r>
+              <a:rPr lang="de-DE" sz="800" smtClean="0">
+                <a:solidFill>
+                  <a:sysClr val="windowText" lastClr="000000"/>
+                </a:solidFill>
+                <a:latin typeface="Verdana" charset="0"/>
+                <a:ea typeface="Verdana" charset="0"/>
+                <a:cs typeface="Verdana" charset="0"/>
+              </a:rPr>
+              <a:t>&amp; Close</a:t>
+            </a:r>
+            <a:endParaRPr lang="de-DE" sz="800" dirty="0">
+              <a:solidFill>
+                <a:sysClr val="windowText" lastClr="000000"/>
+              </a:solidFill>
+              <a:latin typeface="Verdana" charset="0"/>
+              <a:ea typeface="Verdana" charset="0"/>
+              <a:cs typeface="Verdana" charset="0"/>
+            </a:endParaRPr>
+          </a:p>
+        </p:txBody>
+      </p:sp>
+      <p:sp>
+        <p:nvSpPr>
+          <p:cNvPr id="26" name="Abgerundetes Rechteck 25"/>
+          <p:cNvSpPr/>
+          <p:nvPr/>
+        </p:nvSpPr>
+        <p:spPr>
+          <a:xfrm>
+            <a:off x="2556933" y="2631016"/>
+            <a:ext cx="3045581" cy="159893"/>
+          </a:xfrm>
+          <a:prstGeom prst="roundRect">
+            <a:avLst/>
+          </a:prstGeom>
+          <a:solidFill>
+            <a:schemeClr val="bg1">
+              <a:lumMod val="75000"/>
+            </a:schemeClr>
+          </a:solidFill>
+          <a:ln>
+            <a:noFill/>
+          </a:ln>
+        </p:spPr>
+        <p:style>
+          <a:lnRef idx="2">
+            <a:schemeClr val="accent1">
+              <a:shade val="50000"/>
+            </a:schemeClr>
+          </a:lnRef>
+          <a:fillRef idx="1">
+            <a:schemeClr val="accent1"/>
+          </a:fillRef>
+          <a:effectRef idx="0">
+            <a:schemeClr val="accent1"/>
+          </a:effectRef>
+          <a:fontRef idx="minor">
+            <a:schemeClr val="lt1"/>
+          </a:fontRef>
+        </p:style>
+        <p:txBody>
+          <a:bodyPr rtlCol="0" anchor="ctr"/>
+          <a:lstStyle/>
+          <a:p>
+            <a:pPr algn="ctr"/>
+            <a:r>
+              <a:rPr lang="de-DE" sz="800" dirty="0" smtClean="0">
+                <a:solidFill>
+                  <a:schemeClr val="tx1"/>
+                </a:solidFill>
+                <a:latin typeface="Verdana" charset="0"/>
+                <a:ea typeface="Verdana" charset="0"/>
+                <a:cs typeface="Verdana" charset="0"/>
+              </a:rPr>
+              <a:t>Service Validation </a:t>
+            </a:r>
+            <a:r>
+              <a:rPr lang="de-DE" sz="800" dirty="0" err="1" smtClean="0">
+                <a:solidFill>
+                  <a:schemeClr val="tx1"/>
+                </a:solidFill>
+                <a:latin typeface="Verdana" charset="0"/>
+                <a:ea typeface="Verdana" charset="0"/>
+                <a:cs typeface="Verdana" charset="0"/>
+              </a:rPr>
+              <a:t>and</a:t>
+            </a:r>
+            <a:r>
+              <a:rPr lang="de-DE" sz="800" dirty="0" smtClean="0">
+                <a:solidFill>
+                  <a:schemeClr val="tx1"/>
+                </a:solidFill>
+                <a:latin typeface="Verdana" charset="0"/>
+                <a:ea typeface="Verdana" charset="0"/>
+                <a:cs typeface="Verdana" charset="0"/>
+              </a:rPr>
+              <a:t> </a:t>
+            </a:r>
+            <a:r>
+              <a:rPr lang="de-DE" sz="800" dirty="0" err="1" smtClean="0">
+                <a:solidFill>
+                  <a:schemeClr val="tx1"/>
+                </a:solidFill>
+                <a:latin typeface="Verdana" charset="0"/>
+                <a:ea typeface="Verdana" charset="0"/>
+                <a:cs typeface="Verdana" charset="0"/>
+              </a:rPr>
+              <a:t>Testing</a:t>
+            </a:r>
+            <a:endParaRPr lang="de-DE" sz="800" dirty="0">
+              <a:solidFill>
+                <a:schemeClr val="tx1"/>
+              </a:solidFill>
+              <a:latin typeface="Verdana" charset="0"/>
+              <a:ea typeface="Verdana" charset="0"/>
+              <a:cs typeface="Verdana" charset="0"/>
+            </a:endParaRPr>
+          </a:p>
+        </p:txBody>
+      </p:sp>
+      <p:sp>
+        <p:nvSpPr>
+          <p:cNvPr id="27" name="Abgerundetes Rechteck 26"/>
+          <p:cNvSpPr/>
+          <p:nvPr/>
+        </p:nvSpPr>
+        <p:spPr>
+          <a:xfrm>
+            <a:off x="2222500" y="2832649"/>
+            <a:ext cx="3441700" cy="159893"/>
+          </a:xfrm>
+          <a:prstGeom prst="roundRect">
+            <a:avLst/>
+          </a:prstGeom>
+          <a:solidFill>
+            <a:schemeClr val="tx1">
+              <a:lumMod val="75000"/>
+              <a:lumOff val="25000"/>
+            </a:schemeClr>
+          </a:solidFill>
+          <a:ln>
+            <a:noFill/>
+          </a:ln>
+        </p:spPr>
+        <p:style>
+          <a:lnRef idx="2">
+            <a:schemeClr val="accent1">
+              <a:shade val="50000"/>
+            </a:schemeClr>
+          </a:lnRef>
+          <a:fillRef idx="1">
+            <a:schemeClr val="accent1"/>
+          </a:fillRef>
+          <a:effectRef idx="0">
+            <a:schemeClr val="accent1"/>
+          </a:effectRef>
+          <a:fontRef idx="minor">
+            <a:schemeClr val="lt1"/>
+          </a:fontRef>
+        </p:style>
+        <p:txBody>
+          <a:bodyPr rtlCol="0" anchor="ctr"/>
+          <a:lstStyle/>
+          <a:p>
+            <a:pPr algn="ctr"/>
+            <a:r>
+              <a:rPr lang="de-DE" sz="800" smtClean="0">
+                <a:solidFill>
+                  <a:schemeClr val="bg1"/>
+                </a:solidFill>
+                <a:latin typeface="Verdana" charset="0"/>
+                <a:ea typeface="Verdana" charset="0"/>
+                <a:cs typeface="Verdana" charset="0"/>
+              </a:rPr>
+              <a:t>Knowledge Management</a:t>
+            </a:r>
+            <a:endParaRPr lang="de-DE" sz="800" dirty="0">
+              <a:solidFill>
+                <a:schemeClr val="bg1"/>
+              </a:solidFill>
+              <a:latin typeface="Verdana" charset="0"/>
+              <a:ea typeface="Verdana" charset="0"/>
+              <a:cs typeface="Verdana" charset="0"/>
+            </a:endParaRPr>
+          </a:p>
+        </p:txBody>
+      </p:sp>
+    </p:spTree>
+    <p:extLst>
+      <p:ext uri="{BB962C8B-B14F-4D97-AF65-F5344CB8AC3E}">
+        <p14:creationId xmlns:p14="http://schemas.microsoft.com/office/powerpoint/2010/main" val="162268762"/>
+      </p:ext>
+    </p:extLst>
+  </p:cSld>
+  <p:clrMapOvr>
+    <a:masterClrMapping/>
+  </p:clrMapOvr>
+</p:sld>
+</file>
+
+<file path=ppt/slides/slide4.xml><?xml version="1.0" encoding="utf-8"?>
+<p:sld xmlns:a="http://schemas.openxmlformats.org/drawingml/2006/main" xmlns:r="http://schemas.openxmlformats.org/officeDocument/2006/relationships" xmlns:p="http://schemas.openxmlformats.org/presentationml/2006/main">
+  <p:cSld>
+    <p:spTree>
+      <p:nvGrpSpPr>
+        <p:cNvPr id="1" name=""/>
+        <p:cNvGrpSpPr/>
+        <p:nvPr/>
+      </p:nvGrpSpPr>
+      <p:grpSpPr>
+        <a:xfrm>
+          <a:off x="0" y="0"/>
+          <a:ext cx="0" cy="0"/>
+          <a:chOff x="0" y="0"/>
+          <a:chExt cx="0" cy="0"/>
+        </a:xfrm>
+      </p:grpSpPr>
+      <p:sp>
+        <p:nvSpPr>
           <p:cNvPr id="4" name="Rechteck 3"/>
           <p:cNvSpPr/>
           <p:nvPr/>
@@ -4262,7 +6073,7 @@
     </p:spTree>
     <p:extLst>
       <p:ext uri="{BB962C8B-B14F-4D97-AF65-F5344CB8AC3E}">
-        <p14:creationId xmlns:p14="http://schemas.microsoft.com/office/powerpoint/2010/main" val="481058527"/>
+        <p14:creationId xmlns:p14="http://schemas.microsoft.com/office/powerpoint/2010/main" val="1916859560"/>
       </p:ext>
     </p:extLst>
   </p:cSld>
@@ -4523,6 +6334,293 @@
       </a:bgFillStyleLst>
     </a:fmtScheme>
   </a:themeElements>
+  <a:objectDefaults>
+    <a:spDef>
+      <a:spPr/>
+      <a:bodyPr rtlCol="0" anchor="ctr"/>
+      <a:lstStyle>
+        <a:defPPr algn="ctr">
+          <a:defRPr/>
+        </a:defPPr>
+      </a:lstStyle>
+      <a:style>
+        <a:lnRef idx="2">
+          <a:schemeClr val="accent1">
+            <a:shade val="50000"/>
+          </a:schemeClr>
+        </a:lnRef>
+        <a:fillRef idx="1">
+          <a:schemeClr val="accent1"/>
+        </a:fillRef>
+        <a:effectRef idx="0">
+          <a:schemeClr val="accent1"/>
+        </a:effectRef>
+        <a:fontRef idx="minor">
+          <a:schemeClr val="lt1"/>
+        </a:fontRef>
+      </a:style>
+    </a:spDef>
+  </a:objectDefaults>
+  <a:extraClrSchemeLst/>
+  <a:extLst>
+    <a:ext uri="{05A4C25C-085E-4340-85A3-A5531E510DB2}">
+      <thm15:themeFamily xmlns:thm15="http://schemas.microsoft.com/office/thememl/2012/main" name="Office Theme" id="{62F939B6-93AF-4DB8-9C6B-D6C7DFDC589F}" vid="{4A3C46E8-61CC-4603-A589-7422A47A8E4A}"/>
+    </a:ext>
+  </a:extLst>
+</a:theme>
+</file>
+
+<file path=ppt/theme/theme2.xml><?xml version="1.0" encoding="utf-8"?>
+<a:theme xmlns:a="http://schemas.openxmlformats.org/drawingml/2006/main" name="Office-Design">
+  <a:themeElements>
+    <a:clrScheme name="Office">
+      <a:dk1>
+        <a:sysClr val="windowText" lastClr="000000"/>
+      </a:dk1>
+      <a:lt1>
+        <a:sysClr val="window" lastClr="FFFFFF"/>
+      </a:lt1>
+      <a:dk2>
+        <a:srgbClr val="44546A"/>
+      </a:dk2>
+      <a:lt2>
+        <a:srgbClr val="E7E6E6"/>
+      </a:lt2>
+      <a:accent1>
+        <a:srgbClr val="5B9BD5"/>
+      </a:accent1>
+      <a:accent2>
+        <a:srgbClr val="ED7D31"/>
+      </a:accent2>
+      <a:accent3>
+        <a:srgbClr val="A5A5A5"/>
+      </a:accent3>
+      <a:accent4>
+        <a:srgbClr val="FFC000"/>
+      </a:accent4>
+      <a:accent5>
+        <a:srgbClr val="4472C4"/>
+      </a:accent5>
+      <a:accent6>
+        <a:srgbClr val="70AD47"/>
+      </a:accent6>
+      <a:hlink>
+        <a:srgbClr val="0563C1"/>
+      </a:hlink>
+      <a:folHlink>
+        <a:srgbClr val="954F72"/>
+      </a:folHlink>
+    </a:clrScheme>
+    <a:fontScheme name="Office">
+      <a:majorFont>
+        <a:latin typeface="Calibri Light" panose="020F0302020204030204"/>
+        <a:ea typeface=""/>
+        <a:cs typeface=""/>
+        <a:font script="Jpan" typeface="ＭＳ Ｐゴシック"/>
+        <a:font script="Hang" typeface="맑은 고딕"/>
+        <a:font script="Hans" typeface="宋体"/>
+        <a:font script="Hant" typeface="新細明體"/>
+        <a:font script="Arab" typeface="Times New Roman"/>
+        <a:font script="Hebr" typeface="Times New Roman"/>
+        <a:font script="Thai" typeface="Angsana New"/>
+        <a:font script="Ethi" typeface="Nyala"/>
+        <a:font script="Beng" typeface="Vrinda"/>
+        <a:font script="Gujr" typeface="Shruti"/>
+        <a:font script="Khmr" typeface="MoolBoran"/>
+        <a:font script="Knda" typeface="Tunga"/>
+        <a:font script="Guru" typeface="Raavi"/>
+        <a:font script="Cans" typeface="Euphemia"/>
+        <a:font script="Cher" typeface="Plantagenet Cherokee"/>
+        <a:font script="Yiii" typeface="Microsoft Yi Baiti"/>
+        <a:font script="Tibt" typeface="Microsoft Himalaya"/>
+        <a:font script="Thaa" typeface="MV Boli"/>
+        <a:font script="Deva" typeface="Mangal"/>
+        <a:font script="Telu" typeface="Gautami"/>
+        <a:font script="Taml" typeface="Latha"/>
+        <a:font script="Syrc" typeface="Estrangelo Edessa"/>
+        <a:font script="Orya" typeface="Kalinga"/>
+        <a:font script="Mlym" typeface="Kartika"/>
+        <a:font script="Laoo" typeface="DokChampa"/>
+        <a:font script="Sinh" typeface="Iskoola Pota"/>
+        <a:font script="Mong" typeface="Mongolian Baiti"/>
+        <a:font script="Viet" typeface="Times New Roman"/>
+        <a:font script="Uigh" typeface="Microsoft Uighur"/>
+        <a:font script="Geor" typeface="Sylfaen"/>
+      </a:majorFont>
+      <a:minorFont>
+        <a:latin typeface="Calibri" panose="020F0502020204030204"/>
+        <a:ea typeface=""/>
+        <a:cs typeface=""/>
+        <a:font script="Jpan" typeface="ＭＳ Ｐゴシック"/>
+        <a:font script="Hang" typeface="맑은 고딕"/>
+        <a:font script="Hans" typeface="宋体"/>
+        <a:font script="Hant" typeface="新細明體"/>
+        <a:font script="Arab" typeface="Arial"/>
+        <a:font script="Hebr" typeface="Arial"/>
+        <a:font script="Thai" typeface="Cordia New"/>
+        <a:font script="Ethi" typeface="Nyala"/>
+        <a:font script="Beng" typeface="Vrinda"/>
+        <a:font script="Gujr" typeface="Shruti"/>
+        <a:font script="Khmr" typeface="DaunPenh"/>
+        <a:font script="Knda" typeface="Tunga"/>
+        <a:font script="Guru" typeface="Raavi"/>
+        <a:font script="Cans" typeface="Euphemia"/>
+        <a:font script="Cher" typeface="Plantagenet Cherokee"/>
+        <a:font script="Yiii" typeface="Microsoft Yi Baiti"/>
+        <a:font script="Tibt" typeface="Microsoft Himalaya"/>
+        <a:font script="Thaa" typeface="MV Boli"/>
+        <a:font script="Deva" typeface="Mangal"/>
+        <a:font script="Telu" typeface="Gautami"/>
+        <a:font script="Taml" typeface="Latha"/>
+        <a:font script="Syrc" typeface="Estrangelo Edessa"/>
+        <a:font script="Orya" typeface="Kalinga"/>
+        <a:font script="Mlym" typeface="Kartika"/>
+        <a:font script="Laoo" typeface="DokChampa"/>
+        <a:font script="Sinh" typeface="Iskoola Pota"/>
+        <a:font script="Mong" typeface="Mongolian Baiti"/>
+        <a:font script="Viet" typeface="Arial"/>
+        <a:font script="Uigh" typeface="Microsoft Uighur"/>
+        <a:font script="Geor" typeface="Sylfaen"/>
+      </a:minorFont>
+    </a:fontScheme>
+    <a:fmtScheme name="Office">
+      <a:fillStyleLst>
+        <a:solidFill>
+          <a:schemeClr val="phClr"/>
+        </a:solidFill>
+        <a:gradFill rotWithShape="1">
+          <a:gsLst>
+            <a:gs pos="0">
+              <a:schemeClr val="phClr">
+                <a:lumMod val="110000"/>
+                <a:satMod val="105000"/>
+                <a:tint val="67000"/>
+              </a:schemeClr>
+            </a:gs>
+            <a:gs pos="50000">
+              <a:schemeClr val="phClr">
+                <a:lumMod val="105000"/>
+                <a:satMod val="103000"/>
+                <a:tint val="73000"/>
+              </a:schemeClr>
+            </a:gs>
+            <a:gs pos="100000">
+              <a:schemeClr val="phClr">
+                <a:lumMod val="105000"/>
+                <a:satMod val="109000"/>
+                <a:tint val="81000"/>
+              </a:schemeClr>
+            </a:gs>
+          </a:gsLst>
+          <a:lin ang="5400000" scaled="0"/>
+        </a:gradFill>
+        <a:gradFill rotWithShape="1">
+          <a:gsLst>
+            <a:gs pos="0">
+              <a:schemeClr val="phClr">
+                <a:satMod val="103000"/>
+                <a:lumMod val="102000"/>
+                <a:tint val="94000"/>
+              </a:schemeClr>
+            </a:gs>
+            <a:gs pos="50000">
+              <a:schemeClr val="phClr">
+                <a:satMod val="110000"/>
+                <a:lumMod val="100000"/>
+                <a:shade val="100000"/>
+              </a:schemeClr>
+            </a:gs>
+            <a:gs pos="100000">
+              <a:schemeClr val="phClr">
+                <a:lumMod val="99000"/>
+                <a:satMod val="120000"/>
+                <a:shade val="78000"/>
+              </a:schemeClr>
+            </a:gs>
+          </a:gsLst>
+          <a:lin ang="5400000" scaled="0"/>
+        </a:gradFill>
+      </a:fillStyleLst>
+      <a:lnStyleLst>
+        <a:ln w="6350" cap="flat" cmpd="sng" algn="ctr">
+          <a:solidFill>
+            <a:schemeClr val="phClr"/>
+          </a:solidFill>
+          <a:prstDash val="solid"/>
+          <a:miter lim="800000"/>
+        </a:ln>
+        <a:ln w="12700" cap="flat" cmpd="sng" algn="ctr">
+          <a:solidFill>
+            <a:schemeClr val="phClr"/>
+          </a:solidFill>
+          <a:prstDash val="solid"/>
+          <a:miter lim="800000"/>
+        </a:ln>
+        <a:ln w="19050" cap="flat" cmpd="sng" algn="ctr">
+          <a:solidFill>
+            <a:schemeClr val="phClr"/>
+          </a:solidFill>
+          <a:prstDash val="solid"/>
+          <a:miter lim="800000"/>
+        </a:ln>
+      </a:lnStyleLst>
+      <a:effectStyleLst>
+        <a:effectStyle>
+          <a:effectLst/>
+        </a:effectStyle>
+        <a:effectStyle>
+          <a:effectLst/>
+        </a:effectStyle>
+        <a:effectStyle>
+          <a:effectLst>
+            <a:outerShdw blurRad="57150" dist="19050" dir="5400000" algn="ctr" rotWithShape="0">
+              <a:srgbClr val="000000">
+                <a:alpha val="63000"/>
+              </a:srgbClr>
+            </a:outerShdw>
+          </a:effectLst>
+        </a:effectStyle>
+      </a:effectStyleLst>
+      <a:bgFillStyleLst>
+        <a:solidFill>
+          <a:schemeClr val="phClr"/>
+        </a:solidFill>
+        <a:solidFill>
+          <a:schemeClr val="phClr">
+            <a:tint val="95000"/>
+            <a:satMod val="170000"/>
+          </a:schemeClr>
+        </a:solidFill>
+        <a:gradFill rotWithShape="1">
+          <a:gsLst>
+            <a:gs pos="0">
+              <a:schemeClr val="phClr">
+                <a:tint val="93000"/>
+                <a:satMod val="150000"/>
+                <a:shade val="98000"/>
+                <a:lumMod val="102000"/>
+              </a:schemeClr>
+            </a:gs>
+            <a:gs pos="50000">
+              <a:schemeClr val="phClr">
+                <a:tint val="98000"/>
+                <a:satMod val="130000"/>
+                <a:shade val="90000"/>
+                <a:lumMod val="103000"/>
+              </a:schemeClr>
+            </a:gs>
+            <a:gs pos="100000">
+              <a:schemeClr val="phClr">
+                <a:shade val="63000"/>
+                <a:satMod val="120000"/>
+              </a:schemeClr>
+            </a:gs>
+          </a:gsLst>
+          <a:lin ang="5400000" scaled="0"/>
+        </a:gradFill>
+      </a:bgFillStyleLst>
+    </a:fmtScheme>
+  </a:themeElements>
   <a:objectDefaults/>
   <a:extraClrSchemeLst/>
   <a:extLst>

</xml_diff>

<commit_message>
PLZ ergänzt um charakteristische Verläufe und Einleitung gestrafft
</commit_message>
<xml_diff>
--- a/Abbildungen/Abbildungen.pptx
+++ b/Abbildungen/Abbildungen.pptx
@@ -5,13 +5,14 @@
     <p:sldMasterId id="2147483648" r:id="rId1"/>
   </p:sldMasterIdLst>
   <p:notesMasterIdLst>
-    <p:notesMasterId r:id="rId6"/>
+    <p:notesMasterId r:id="rId7"/>
   </p:notesMasterIdLst>
   <p:sldIdLst>
     <p:sldId id="256" r:id="rId2"/>
     <p:sldId id="257" r:id="rId3"/>
-    <p:sldId id="260" r:id="rId4"/>
-    <p:sldId id="259" r:id="rId5"/>
+    <p:sldId id="259" r:id="rId4"/>
+    <p:sldId id="260" r:id="rId5"/>
+    <p:sldId id="261" r:id="rId6"/>
   </p:sldIdLst>
   <p:sldSz cx="12192000" cy="6858000"/>
   <p:notesSz cx="6858000" cy="9144000"/>
@@ -118,6 +119,1263 @@
 </p:presentation>
 </file>
 
+<file path=ppt/charts/chart1.xml><?xml version="1.0" encoding="utf-8"?>
+<c:chartSpace xmlns:c="http://schemas.openxmlformats.org/drawingml/2006/chart" xmlns:a="http://schemas.openxmlformats.org/drawingml/2006/main" xmlns:r="http://schemas.openxmlformats.org/officeDocument/2006/relationships">
+  <c:date1904 val="0"/>
+  <c:lang val="de-DE"/>
+  <c:roundedCorners val="0"/>
+  <mc:AlternateContent xmlns:mc="http://schemas.openxmlformats.org/markup-compatibility/2006">
+    <mc:Choice xmlns:c14="http://schemas.microsoft.com/office/drawing/2007/8/2/chart" Requires="c14">
+      <c14:style val="102"/>
+    </mc:Choice>
+    <mc:Fallback>
+      <c:style val="2"/>
+    </mc:Fallback>
+  </mc:AlternateContent>
+  <c:chart>
+    <c:title>
+      <c:tx>
+        <c:rich>
+          <a:bodyPr rot="0" spcFirstLastPara="1" vertOverflow="ellipsis" vert="horz" wrap="square" anchor="ctr" anchorCtr="1"/>
+          <a:lstStyle/>
+          <a:p>
+            <a:pPr>
+              <a:defRPr sz="1862" b="0" i="0" u="none" strike="noStrike" kern="1200" spc="0" baseline="0">
+                <a:solidFill>
+                  <a:schemeClr val="tx1">
+                    <a:lumMod val="65000"/>
+                    <a:lumOff val="35000"/>
+                  </a:schemeClr>
+                </a:solidFill>
+                <a:latin typeface="+mn-lt"/>
+                <a:ea typeface="+mn-ea"/>
+                <a:cs typeface="+mn-cs"/>
+              </a:defRPr>
+            </a:pPr>
+            <a:r>
+              <a:rPr lang="de-DE" sz="1400" b="1" dirty="0" smtClean="0">
+                <a:latin typeface="Verdana" charset="0"/>
+                <a:ea typeface="Verdana" charset="0"/>
+                <a:cs typeface="Verdana" charset="0"/>
+              </a:rPr>
+              <a:t>Produktlebenszyklen</a:t>
+            </a:r>
+            <a:endParaRPr lang="de-DE" sz="1400" b="1" dirty="0">
+              <a:latin typeface="Verdana" charset="0"/>
+              <a:ea typeface="Verdana" charset="0"/>
+              <a:cs typeface="Verdana" charset="0"/>
+            </a:endParaRPr>
+          </a:p>
+        </c:rich>
+      </c:tx>
+      <c:layout/>
+      <c:overlay val="0"/>
+      <c:spPr>
+        <a:noFill/>
+        <a:ln>
+          <a:noFill/>
+        </a:ln>
+        <a:effectLst/>
+      </c:spPr>
+      <c:txPr>
+        <a:bodyPr rot="0" spcFirstLastPara="1" vertOverflow="ellipsis" vert="horz" wrap="square" anchor="ctr" anchorCtr="1"/>
+        <a:lstStyle/>
+        <a:p>
+          <a:pPr>
+            <a:defRPr sz="1862" b="0" i="0" u="none" strike="noStrike" kern="1200" spc="0" baseline="0">
+              <a:solidFill>
+                <a:schemeClr val="tx1">
+                  <a:lumMod val="65000"/>
+                  <a:lumOff val="35000"/>
+                </a:schemeClr>
+              </a:solidFill>
+              <a:latin typeface="+mn-lt"/>
+              <a:ea typeface="+mn-ea"/>
+              <a:cs typeface="+mn-cs"/>
+            </a:defRPr>
+          </a:pPr>
+          <a:endParaRPr lang="de-DE"/>
+        </a:p>
+      </c:txPr>
+    </c:title>
+    <c:autoTitleDeleted val="0"/>
+    <c:plotArea>
+      <c:layout>
+        <c:manualLayout>
+          <c:layoutTarget val="inner"/>
+          <c:xMode val="edge"/>
+          <c:yMode val="edge"/>
+          <c:x val="0.0327573775526846"/>
+          <c:y val="0.125397706688094"/>
+          <c:w val="0.934485244894631"/>
+          <c:h val="0.846165111071352"/>
+        </c:manualLayout>
+      </c:layout>
+      <c:lineChart>
+        <c:grouping val="standard"/>
+        <c:varyColors val="0"/>
+        <c:ser>
+          <c:idx val="0"/>
+          <c:order val="0"/>
+          <c:tx>
+            <c:strRef>
+              <c:f>Tabelle1!$B$1</c:f>
+              <c:strCache>
+                <c:ptCount val="1"/>
+                <c:pt idx="0">
+                  <c:v>Normalform</c:v>
+                </c:pt>
+              </c:strCache>
+            </c:strRef>
+          </c:tx>
+          <c:spPr>
+            <a:ln w="28575" cap="rnd">
+              <a:solidFill>
+                <a:schemeClr val="tx1">
+                  <a:lumMod val="75000"/>
+                  <a:lumOff val="25000"/>
+                </a:schemeClr>
+              </a:solidFill>
+              <a:round/>
+            </a:ln>
+            <a:effectLst/>
+          </c:spPr>
+          <c:marker>
+            <c:symbol val="none"/>
+          </c:marker>
+          <c:cat>
+            <c:numRef>
+              <c:f>Tabelle1!$A$2:$A$6</c:f>
+              <c:numCache>
+                <c:formatCode>General</c:formatCode>
+                <c:ptCount val="5"/>
+              </c:numCache>
+            </c:numRef>
+          </c:cat>
+          <c:val>
+            <c:numRef>
+              <c:f>Tabelle1!$B$2:$B$6</c:f>
+              <c:numCache>
+                <c:formatCode>General</c:formatCode>
+                <c:ptCount val="5"/>
+                <c:pt idx="0">
+                  <c:v>0.0</c:v>
+                </c:pt>
+                <c:pt idx="1">
+                  <c:v>1.5</c:v>
+                </c:pt>
+                <c:pt idx="2">
+                  <c:v>3.0</c:v>
+                </c:pt>
+                <c:pt idx="3">
+                  <c:v>4.0</c:v>
+                </c:pt>
+                <c:pt idx="4">
+                  <c:v>3.0</c:v>
+                </c:pt>
+              </c:numCache>
+            </c:numRef>
+          </c:val>
+          <c:smooth val="1"/>
+        </c:ser>
+        <c:ser>
+          <c:idx val="1"/>
+          <c:order val="1"/>
+          <c:tx>
+            <c:strRef>
+              <c:f>Tabelle1!$C$1</c:f>
+              <c:strCache>
+                <c:ptCount val="1"/>
+                <c:pt idx="0">
+                  <c:v>Flop</c:v>
+                </c:pt>
+              </c:strCache>
+            </c:strRef>
+          </c:tx>
+          <c:spPr>
+            <a:ln w="28575" cap="rnd">
+              <a:solidFill>
+                <a:srgbClr val="FF0000"/>
+              </a:solidFill>
+              <a:round/>
+            </a:ln>
+            <a:effectLst/>
+          </c:spPr>
+          <c:marker>
+            <c:symbol val="none"/>
+          </c:marker>
+          <c:cat>
+            <c:numRef>
+              <c:f>Tabelle1!$A$2:$A$6</c:f>
+              <c:numCache>
+                <c:formatCode>General</c:formatCode>
+                <c:ptCount val="5"/>
+              </c:numCache>
+            </c:numRef>
+          </c:cat>
+          <c:val>
+            <c:numRef>
+              <c:f>Tabelle1!$C$2:$C$6</c:f>
+              <c:numCache>
+                <c:formatCode>General</c:formatCode>
+                <c:ptCount val="5"/>
+                <c:pt idx="0">
+                  <c:v>0.0</c:v>
+                </c:pt>
+                <c:pt idx="1">
+                  <c:v>4.0</c:v>
+                </c:pt>
+                <c:pt idx="2">
+                  <c:v>1.0</c:v>
+                </c:pt>
+                <c:pt idx="3">
+                  <c:v>0.1</c:v>
+                </c:pt>
+                <c:pt idx="4">
+                  <c:v>0.0</c:v>
+                </c:pt>
+              </c:numCache>
+            </c:numRef>
+          </c:val>
+          <c:smooth val="1"/>
+        </c:ser>
+        <c:ser>
+          <c:idx val="2"/>
+          <c:order val="2"/>
+          <c:tx>
+            <c:strRef>
+              <c:f>Tabelle1!$D$1</c:f>
+              <c:strCache>
+                <c:ptCount val="1"/>
+                <c:pt idx="0">
+                  <c:v>sterbend</c:v>
+                </c:pt>
+              </c:strCache>
+            </c:strRef>
+          </c:tx>
+          <c:spPr>
+            <a:ln w="28575" cap="rnd">
+              <a:solidFill>
+                <a:schemeClr val="bg1">
+                  <a:lumMod val="50000"/>
+                </a:schemeClr>
+              </a:solidFill>
+              <a:round/>
+            </a:ln>
+            <a:effectLst/>
+          </c:spPr>
+          <c:marker>
+            <c:symbol val="none"/>
+          </c:marker>
+          <c:cat>
+            <c:numRef>
+              <c:f>Tabelle1!$A$2:$A$6</c:f>
+              <c:numCache>
+                <c:formatCode>General</c:formatCode>
+                <c:ptCount val="5"/>
+              </c:numCache>
+            </c:numRef>
+          </c:cat>
+          <c:val>
+            <c:numRef>
+              <c:f>Tabelle1!$D$2:$D$6</c:f>
+              <c:numCache>
+                <c:formatCode>General</c:formatCode>
+                <c:ptCount val="5"/>
+                <c:pt idx="0">
+                  <c:v>0.0</c:v>
+                </c:pt>
+                <c:pt idx="1">
+                  <c:v>2.0</c:v>
+                </c:pt>
+                <c:pt idx="2">
+                  <c:v>3.0</c:v>
+                </c:pt>
+                <c:pt idx="3">
+                  <c:v>2.5</c:v>
+                </c:pt>
+                <c:pt idx="4">
+                  <c:v>2.0</c:v>
+                </c:pt>
+              </c:numCache>
+            </c:numRef>
+          </c:val>
+          <c:smooth val="1"/>
+        </c:ser>
+        <c:ser>
+          <c:idx val="3"/>
+          <c:order val="3"/>
+          <c:tx>
+            <c:strRef>
+              <c:f>Tabelle1!$E$1</c:f>
+              <c:strCache>
+                <c:ptCount val="1"/>
+                <c:pt idx="0">
+                  <c:v>Modifikation</c:v>
+                </c:pt>
+              </c:strCache>
+            </c:strRef>
+          </c:tx>
+          <c:spPr>
+            <a:ln w="28575" cap="rnd">
+              <a:solidFill>
+                <a:srgbClr val="FFC000"/>
+              </a:solidFill>
+              <a:round/>
+            </a:ln>
+            <a:effectLst/>
+          </c:spPr>
+          <c:marker>
+            <c:symbol val="none"/>
+          </c:marker>
+          <c:cat>
+            <c:numRef>
+              <c:f>Tabelle1!$A$2:$A$6</c:f>
+              <c:numCache>
+                <c:formatCode>General</c:formatCode>
+                <c:ptCount val="5"/>
+              </c:numCache>
+            </c:numRef>
+          </c:cat>
+          <c:val>
+            <c:numRef>
+              <c:f>Tabelle1!$E$2:$E$6</c:f>
+              <c:numCache>
+                <c:formatCode>General</c:formatCode>
+                <c:ptCount val="5"/>
+                <c:pt idx="0">
+                  <c:v>0.0</c:v>
+                </c:pt>
+                <c:pt idx="1">
+                  <c:v>2.5</c:v>
+                </c:pt>
+                <c:pt idx="2">
+                  <c:v>2.0</c:v>
+                </c:pt>
+                <c:pt idx="3">
+                  <c:v>4.0</c:v>
+                </c:pt>
+                <c:pt idx="4">
+                  <c:v>4.5</c:v>
+                </c:pt>
+              </c:numCache>
+            </c:numRef>
+          </c:val>
+          <c:smooth val="1"/>
+        </c:ser>
+        <c:ser>
+          <c:idx val="4"/>
+          <c:order val="4"/>
+          <c:tx>
+            <c:strRef>
+              <c:f>Tabelle1!$F$1</c:f>
+              <c:strCache>
+                <c:ptCount val="1"/>
+                <c:pt idx="0">
+                  <c:v>Erfolg</c:v>
+                </c:pt>
+              </c:strCache>
+            </c:strRef>
+          </c:tx>
+          <c:spPr>
+            <a:ln w="28575" cap="rnd">
+              <a:solidFill>
+                <a:srgbClr val="00B050"/>
+              </a:solidFill>
+              <a:round/>
+            </a:ln>
+            <a:effectLst/>
+          </c:spPr>
+          <c:marker>
+            <c:symbol val="none"/>
+          </c:marker>
+          <c:cat>
+            <c:numRef>
+              <c:f>Tabelle1!$A$2:$A$6</c:f>
+              <c:numCache>
+                <c:formatCode>General</c:formatCode>
+                <c:ptCount val="5"/>
+              </c:numCache>
+            </c:numRef>
+          </c:cat>
+          <c:val>
+            <c:numRef>
+              <c:f>Tabelle1!$F$2:$F$6</c:f>
+              <c:numCache>
+                <c:formatCode>General</c:formatCode>
+                <c:ptCount val="5"/>
+                <c:pt idx="0">
+                  <c:v>0.0</c:v>
+                </c:pt>
+                <c:pt idx="1">
+                  <c:v>3.0</c:v>
+                </c:pt>
+                <c:pt idx="2">
+                  <c:v>4.0</c:v>
+                </c:pt>
+                <c:pt idx="3">
+                  <c:v>4.5</c:v>
+                </c:pt>
+                <c:pt idx="4">
+                  <c:v>5.0</c:v>
+                </c:pt>
+              </c:numCache>
+            </c:numRef>
+          </c:val>
+          <c:smooth val="1"/>
+        </c:ser>
+        <c:dLbls>
+          <c:showLegendKey val="0"/>
+          <c:showVal val="0"/>
+          <c:showCatName val="0"/>
+          <c:showSerName val="0"/>
+          <c:showPercent val="0"/>
+          <c:showBubbleSize val="0"/>
+        </c:dLbls>
+        <c:smooth val="0"/>
+        <c:axId val="-2108056480"/>
+        <c:axId val="-2110234688"/>
+      </c:lineChart>
+      <c:catAx>
+        <c:axId val="-2108056480"/>
+        <c:scaling>
+          <c:orientation val="minMax"/>
+        </c:scaling>
+        <c:delete val="0"/>
+        <c:axPos val="b"/>
+        <c:numFmt formatCode="General" sourceLinked="1"/>
+        <c:majorTickMark val="none"/>
+        <c:minorTickMark val="none"/>
+        <c:tickLblPos val="nextTo"/>
+        <c:spPr>
+          <a:noFill/>
+          <a:ln w="9525" cap="flat" cmpd="sng" algn="ctr">
+            <a:solidFill>
+              <a:schemeClr val="tx1">
+                <a:lumMod val="15000"/>
+                <a:lumOff val="85000"/>
+              </a:schemeClr>
+            </a:solidFill>
+            <a:round/>
+          </a:ln>
+          <a:effectLst/>
+        </c:spPr>
+        <c:txPr>
+          <a:bodyPr rot="-60000000" spcFirstLastPara="1" vertOverflow="ellipsis" vert="horz" wrap="square" anchor="ctr" anchorCtr="1"/>
+          <a:lstStyle/>
+          <a:p>
+            <a:pPr>
+              <a:defRPr sz="1197" b="0" i="0" u="none" strike="noStrike" kern="1200" baseline="0">
+                <a:solidFill>
+                  <a:schemeClr val="tx1">
+                    <a:lumMod val="65000"/>
+                    <a:lumOff val="35000"/>
+                  </a:schemeClr>
+                </a:solidFill>
+                <a:latin typeface="+mn-lt"/>
+                <a:ea typeface="+mn-ea"/>
+                <a:cs typeface="+mn-cs"/>
+              </a:defRPr>
+            </a:pPr>
+            <a:endParaRPr lang="de-DE"/>
+          </a:p>
+        </c:txPr>
+        <c:crossAx val="-2110234688"/>
+        <c:crosses val="autoZero"/>
+        <c:auto val="1"/>
+        <c:lblAlgn val="ctr"/>
+        <c:lblOffset val="100"/>
+        <c:noMultiLvlLbl val="0"/>
+      </c:catAx>
+      <c:valAx>
+        <c:axId val="-2110234688"/>
+        <c:scaling>
+          <c:orientation val="minMax"/>
+        </c:scaling>
+        <c:delete val="0"/>
+        <c:axPos val="l"/>
+        <c:majorGridlines>
+          <c:spPr>
+            <a:ln w="9525" cap="flat" cmpd="sng" algn="ctr">
+              <a:noFill/>
+              <a:round/>
+            </a:ln>
+            <a:effectLst/>
+          </c:spPr>
+        </c:majorGridlines>
+        <c:numFmt formatCode="General" sourceLinked="1"/>
+        <c:majorTickMark val="none"/>
+        <c:minorTickMark val="none"/>
+        <c:tickLblPos val="none"/>
+        <c:spPr>
+          <a:noFill/>
+          <a:ln>
+            <a:noFill/>
+          </a:ln>
+          <a:effectLst/>
+        </c:spPr>
+        <c:txPr>
+          <a:bodyPr rot="-60000000" spcFirstLastPara="1" vertOverflow="ellipsis" vert="horz" wrap="square" anchor="ctr" anchorCtr="1"/>
+          <a:lstStyle/>
+          <a:p>
+            <a:pPr>
+              <a:defRPr sz="1197" b="0" i="0" u="none" strike="noStrike" kern="1200" baseline="0">
+                <a:solidFill>
+                  <a:schemeClr val="tx1">
+                    <a:lumMod val="65000"/>
+                    <a:lumOff val="35000"/>
+                  </a:schemeClr>
+                </a:solidFill>
+                <a:latin typeface="+mn-lt"/>
+                <a:ea typeface="+mn-ea"/>
+                <a:cs typeface="+mn-cs"/>
+              </a:defRPr>
+            </a:pPr>
+            <a:endParaRPr lang="de-DE"/>
+          </a:p>
+        </c:txPr>
+        <c:crossAx val="-2108056480"/>
+        <c:crosses val="autoZero"/>
+        <c:crossBetween val="between"/>
+      </c:valAx>
+      <c:spPr>
+        <a:noFill/>
+        <a:ln>
+          <a:noFill/>
+        </a:ln>
+        <a:effectLst/>
+      </c:spPr>
+    </c:plotArea>
+    <c:legend>
+      <c:legendPos val="b"/>
+      <c:legendEntry>
+        <c:idx val="0"/>
+        <c:txPr>
+          <a:bodyPr rot="0" spcFirstLastPara="1" vertOverflow="ellipsis" vert="horz" wrap="square" anchor="ctr" anchorCtr="1"/>
+          <a:lstStyle/>
+          <a:p>
+            <a:pPr>
+              <a:defRPr sz="1000" b="0" i="0" u="none" strike="noStrike" kern="1200" baseline="0">
+                <a:solidFill>
+                  <a:schemeClr val="tx1">
+                    <a:lumMod val="65000"/>
+                    <a:lumOff val="35000"/>
+                  </a:schemeClr>
+                </a:solidFill>
+                <a:latin typeface="Verdana" charset="0"/>
+                <a:ea typeface="Verdana" charset="0"/>
+                <a:cs typeface="Verdana" charset="0"/>
+              </a:defRPr>
+            </a:pPr>
+            <a:endParaRPr lang="de-DE"/>
+          </a:p>
+        </c:txPr>
+      </c:legendEntry>
+      <c:legendEntry>
+        <c:idx val="1"/>
+        <c:txPr>
+          <a:bodyPr rot="0" spcFirstLastPara="1" vertOverflow="ellipsis" vert="horz" wrap="square" anchor="ctr" anchorCtr="1"/>
+          <a:lstStyle/>
+          <a:p>
+            <a:pPr>
+              <a:defRPr sz="1000" b="0" i="0" u="none" strike="noStrike" kern="1200" baseline="0">
+                <a:solidFill>
+                  <a:schemeClr val="tx1">
+                    <a:lumMod val="65000"/>
+                    <a:lumOff val="35000"/>
+                  </a:schemeClr>
+                </a:solidFill>
+                <a:latin typeface="Verdana" charset="0"/>
+                <a:ea typeface="Verdana" charset="0"/>
+                <a:cs typeface="Verdana" charset="0"/>
+              </a:defRPr>
+            </a:pPr>
+            <a:endParaRPr lang="de-DE"/>
+          </a:p>
+        </c:txPr>
+      </c:legendEntry>
+      <c:legendEntry>
+        <c:idx val="2"/>
+        <c:txPr>
+          <a:bodyPr rot="0" spcFirstLastPara="1" vertOverflow="ellipsis" vert="horz" wrap="square" anchor="ctr" anchorCtr="1"/>
+          <a:lstStyle/>
+          <a:p>
+            <a:pPr>
+              <a:defRPr sz="1000" b="0" i="0" u="none" strike="noStrike" kern="1200" baseline="0">
+                <a:solidFill>
+                  <a:schemeClr val="tx1">
+                    <a:lumMod val="65000"/>
+                    <a:lumOff val="35000"/>
+                  </a:schemeClr>
+                </a:solidFill>
+                <a:latin typeface="Verdana" charset="0"/>
+                <a:ea typeface="Verdana" charset="0"/>
+                <a:cs typeface="Verdana" charset="0"/>
+              </a:defRPr>
+            </a:pPr>
+            <a:endParaRPr lang="de-DE"/>
+          </a:p>
+        </c:txPr>
+      </c:legendEntry>
+      <c:legendEntry>
+        <c:idx val="3"/>
+        <c:txPr>
+          <a:bodyPr rot="0" spcFirstLastPara="1" vertOverflow="ellipsis" vert="horz" wrap="square" anchor="ctr" anchorCtr="1"/>
+          <a:lstStyle/>
+          <a:p>
+            <a:pPr>
+              <a:defRPr sz="1000" b="0" i="0" u="none" strike="noStrike" kern="1200" baseline="0">
+                <a:solidFill>
+                  <a:schemeClr val="tx1">
+                    <a:lumMod val="65000"/>
+                    <a:lumOff val="35000"/>
+                  </a:schemeClr>
+                </a:solidFill>
+                <a:latin typeface="Verdana" charset="0"/>
+                <a:ea typeface="Verdana" charset="0"/>
+                <a:cs typeface="Verdana" charset="0"/>
+              </a:defRPr>
+            </a:pPr>
+            <a:endParaRPr lang="de-DE"/>
+          </a:p>
+        </c:txPr>
+      </c:legendEntry>
+      <c:legendEntry>
+        <c:idx val="4"/>
+        <c:txPr>
+          <a:bodyPr rot="0" spcFirstLastPara="1" vertOverflow="ellipsis" vert="horz" wrap="square" anchor="ctr" anchorCtr="1"/>
+          <a:lstStyle/>
+          <a:p>
+            <a:pPr>
+              <a:defRPr sz="1000" b="0" i="0" u="none" strike="noStrike" kern="1200" baseline="0">
+                <a:solidFill>
+                  <a:schemeClr val="tx1">
+                    <a:lumMod val="65000"/>
+                    <a:lumOff val="35000"/>
+                  </a:schemeClr>
+                </a:solidFill>
+                <a:latin typeface="Verdana" charset="0"/>
+                <a:ea typeface="Verdana" charset="0"/>
+                <a:cs typeface="Verdana" charset="0"/>
+              </a:defRPr>
+            </a:pPr>
+            <a:endParaRPr lang="de-DE"/>
+          </a:p>
+        </c:txPr>
+      </c:legendEntry>
+      <c:layout/>
+      <c:overlay val="0"/>
+      <c:spPr>
+        <a:noFill/>
+        <a:ln>
+          <a:noFill/>
+        </a:ln>
+        <a:effectLst/>
+      </c:spPr>
+      <c:txPr>
+        <a:bodyPr rot="0" spcFirstLastPara="1" vertOverflow="ellipsis" vert="horz" wrap="square" anchor="ctr" anchorCtr="1"/>
+        <a:lstStyle/>
+        <a:p>
+          <a:pPr>
+            <a:defRPr sz="1197" b="0" i="0" u="none" strike="noStrike" kern="1200" baseline="0">
+              <a:solidFill>
+                <a:schemeClr val="tx1">
+                  <a:lumMod val="65000"/>
+                  <a:lumOff val="35000"/>
+                </a:schemeClr>
+              </a:solidFill>
+              <a:latin typeface="+mn-lt"/>
+              <a:ea typeface="+mn-ea"/>
+              <a:cs typeface="+mn-cs"/>
+            </a:defRPr>
+          </a:pPr>
+          <a:endParaRPr lang="de-DE"/>
+        </a:p>
+      </c:txPr>
+    </c:legend>
+    <c:plotVisOnly val="1"/>
+    <c:dispBlanksAs val="gap"/>
+    <c:showDLblsOverMax val="0"/>
+  </c:chart>
+  <c:spPr>
+    <a:noFill/>
+    <a:ln>
+      <a:noFill/>
+    </a:ln>
+    <a:effectLst/>
+  </c:spPr>
+  <c:txPr>
+    <a:bodyPr/>
+    <a:lstStyle/>
+    <a:p>
+      <a:pPr>
+        <a:defRPr/>
+      </a:pPr>
+      <a:endParaRPr lang="de-DE"/>
+    </a:p>
+  </c:txPr>
+  <c:externalData r:id="rId3">
+    <c:autoUpdate val="0"/>
+  </c:externalData>
+</c:chartSpace>
+</file>
+
+<file path=ppt/charts/colors1.xml><?xml version="1.0" encoding="utf-8"?>
+<cs:colorStyle xmlns:cs="http://schemas.microsoft.com/office/drawing/2012/chartStyle" xmlns:a="http://schemas.openxmlformats.org/drawingml/2006/main" meth="cycle" id="10">
+  <a:schemeClr val="accent1"/>
+  <a:schemeClr val="accent2"/>
+  <a:schemeClr val="accent3"/>
+  <a:schemeClr val="accent4"/>
+  <a:schemeClr val="accent5"/>
+  <a:schemeClr val="accent6"/>
+  <cs:variation/>
+  <cs:variation>
+    <a:lumMod val="60000"/>
+  </cs:variation>
+  <cs:variation>
+    <a:lumMod val="80000"/>
+    <a:lumOff val="20000"/>
+  </cs:variation>
+  <cs:variation>
+    <a:lumMod val="80000"/>
+  </cs:variation>
+  <cs:variation>
+    <a:lumMod val="60000"/>
+    <a:lumOff val="40000"/>
+  </cs:variation>
+  <cs:variation>
+    <a:lumMod val="50000"/>
+  </cs:variation>
+  <cs:variation>
+    <a:lumMod val="70000"/>
+    <a:lumOff val="30000"/>
+  </cs:variation>
+  <cs:variation>
+    <a:lumMod val="70000"/>
+  </cs:variation>
+  <cs:variation>
+    <a:lumMod val="50000"/>
+    <a:lumOff val="50000"/>
+  </cs:variation>
+</cs:colorStyle>
+</file>
+
+<file path=ppt/charts/style1.xml><?xml version="1.0" encoding="utf-8"?>
+<cs:chartStyle xmlns:cs="http://schemas.microsoft.com/office/drawing/2012/chartStyle" xmlns:a="http://schemas.openxmlformats.org/drawingml/2006/main" id="227">
+  <cs:axisTitle>
+    <cs:lnRef idx="0"/>
+    <cs:fillRef idx="0"/>
+    <cs:effectRef idx="0"/>
+    <cs:fontRef idx="minor">
+      <a:schemeClr val="tx1">
+        <a:lumMod val="65000"/>
+        <a:lumOff val="35000"/>
+      </a:schemeClr>
+    </cs:fontRef>
+    <cs:defRPr sz="1330" kern="1200"/>
+  </cs:axisTitle>
+  <cs:categoryAxis>
+    <cs:lnRef idx="0"/>
+    <cs:fillRef idx="0"/>
+    <cs:effectRef idx="0"/>
+    <cs:fontRef idx="minor">
+      <a:schemeClr val="tx1">
+        <a:lumMod val="65000"/>
+        <a:lumOff val="35000"/>
+      </a:schemeClr>
+    </cs:fontRef>
+    <cs:spPr>
+      <a:ln w="9525" cap="flat" cmpd="sng" algn="ctr">
+        <a:solidFill>
+          <a:schemeClr val="tx1">
+            <a:lumMod val="15000"/>
+            <a:lumOff val="85000"/>
+          </a:schemeClr>
+        </a:solidFill>
+        <a:round/>
+      </a:ln>
+    </cs:spPr>
+    <cs:defRPr sz="1197" kern="1200"/>
+  </cs:categoryAxis>
+  <cs:chartArea mods="allowNoFillOverride allowNoLineOverride">
+    <cs:lnRef idx="0"/>
+    <cs:fillRef idx="0"/>
+    <cs:effectRef idx="0"/>
+    <cs:fontRef idx="minor">
+      <a:schemeClr val="tx1"/>
+    </cs:fontRef>
+    <cs:spPr>
+      <a:solidFill>
+        <a:schemeClr val="bg1"/>
+      </a:solidFill>
+      <a:ln w="9525" cap="flat" cmpd="sng" algn="ctr">
+        <a:solidFill>
+          <a:schemeClr val="tx1">
+            <a:lumMod val="15000"/>
+            <a:lumOff val="85000"/>
+          </a:schemeClr>
+        </a:solidFill>
+        <a:round/>
+      </a:ln>
+    </cs:spPr>
+    <cs:defRPr sz="1330" kern="1200"/>
+  </cs:chartArea>
+  <cs:dataLabel>
+    <cs:lnRef idx="0"/>
+    <cs:fillRef idx="0"/>
+    <cs:effectRef idx="0"/>
+    <cs:fontRef idx="minor">
+      <a:schemeClr val="tx1">
+        <a:lumMod val="75000"/>
+        <a:lumOff val="25000"/>
+      </a:schemeClr>
+    </cs:fontRef>
+    <cs:defRPr sz="1197" kern="1200"/>
+  </cs:dataLabel>
+  <cs:dataLabelCallout>
+    <cs:lnRef idx="0"/>
+    <cs:fillRef idx="0"/>
+    <cs:effectRef idx="0"/>
+    <cs:fontRef idx="minor">
+      <a:schemeClr val="dk1">
+        <a:lumMod val="65000"/>
+        <a:lumOff val="35000"/>
+      </a:schemeClr>
+    </cs:fontRef>
+    <cs:spPr>
+      <a:solidFill>
+        <a:schemeClr val="lt1"/>
+      </a:solidFill>
+      <a:ln>
+        <a:solidFill>
+          <a:schemeClr val="dk1">
+            <a:lumMod val="25000"/>
+            <a:lumOff val="75000"/>
+          </a:schemeClr>
+        </a:solidFill>
+      </a:ln>
+    </cs:spPr>
+    <cs:defRPr sz="1197" kern="1200"/>
+    <cs:bodyPr rot="0" spcFirstLastPara="1" vertOverflow="clip" horzOverflow="clip" vert="horz" wrap="square" lIns="36576" tIns="18288" rIns="36576" bIns="18288" anchor="ctr" anchorCtr="1">
+      <a:spAutoFit/>
+    </cs:bodyPr>
+  </cs:dataLabelCallout>
+  <cs:dataPoint>
+    <cs:lnRef idx="0"/>
+    <cs:fillRef idx="1">
+      <cs:styleClr val="auto"/>
+    </cs:fillRef>
+    <cs:effectRef idx="0"/>
+    <cs:fontRef idx="minor">
+      <a:schemeClr val="tx1"/>
+    </cs:fontRef>
+    <cs:spPr>
+      <a:solidFill>
+        <a:schemeClr val="phClr"/>
+      </a:solidFill>
+    </cs:spPr>
+  </cs:dataPoint>
+  <cs:dataPoint3D>
+    <cs:lnRef idx="0"/>
+    <cs:fillRef idx="1">
+      <cs:styleClr val="auto"/>
+    </cs:fillRef>
+    <cs:effectRef idx="0"/>
+    <cs:fontRef idx="minor">
+      <a:schemeClr val="tx1"/>
+    </cs:fontRef>
+    <cs:spPr>
+      <a:solidFill>
+        <a:schemeClr val="phClr"/>
+      </a:solidFill>
+    </cs:spPr>
+  </cs:dataPoint3D>
+  <cs:dataPointLine>
+    <cs:lnRef idx="0">
+      <cs:styleClr val="auto"/>
+    </cs:lnRef>
+    <cs:fillRef idx="1"/>
+    <cs:effectRef idx="0"/>
+    <cs:fontRef idx="minor">
+      <a:schemeClr val="tx1"/>
+    </cs:fontRef>
+    <cs:spPr>
+      <a:ln w="28575" cap="rnd">
+        <a:solidFill>
+          <a:schemeClr val="phClr"/>
+        </a:solidFill>
+        <a:round/>
+      </a:ln>
+    </cs:spPr>
+  </cs:dataPointLine>
+  <cs:dataPointMarker>
+    <cs:lnRef idx="0">
+      <cs:styleClr val="auto"/>
+    </cs:lnRef>
+    <cs:fillRef idx="1">
+      <cs:styleClr val="auto"/>
+    </cs:fillRef>
+    <cs:effectRef idx="0"/>
+    <cs:fontRef idx="minor">
+      <a:schemeClr val="tx1"/>
+    </cs:fontRef>
+    <cs:spPr>
+      <a:solidFill>
+        <a:schemeClr val="phClr"/>
+      </a:solidFill>
+      <a:ln w="9525">
+        <a:solidFill>
+          <a:schemeClr val="phClr"/>
+        </a:solidFill>
+      </a:ln>
+    </cs:spPr>
+  </cs:dataPointMarker>
+  <cs:dataPointMarkerLayout symbol="circle" size="5"/>
+  <cs:dataPointWireframe>
+    <cs:lnRef idx="0">
+      <cs:styleClr val="auto"/>
+    </cs:lnRef>
+    <cs:fillRef idx="1"/>
+    <cs:effectRef idx="0"/>
+    <cs:fontRef idx="minor">
+      <a:schemeClr val="tx1"/>
+    </cs:fontRef>
+    <cs:spPr>
+      <a:ln w="9525" cap="rnd">
+        <a:solidFill>
+          <a:schemeClr val="phClr"/>
+        </a:solidFill>
+        <a:round/>
+      </a:ln>
+    </cs:spPr>
+  </cs:dataPointWireframe>
+  <cs:dataTable>
+    <cs:lnRef idx="0"/>
+    <cs:fillRef idx="0"/>
+    <cs:effectRef idx="0"/>
+    <cs:fontRef idx="minor">
+      <a:schemeClr val="tx1">
+        <a:lumMod val="65000"/>
+        <a:lumOff val="35000"/>
+      </a:schemeClr>
+    </cs:fontRef>
+    <cs:spPr>
+      <a:noFill/>
+      <a:ln w="9525" cap="flat" cmpd="sng" algn="ctr">
+        <a:solidFill>
+          <a:schemeClr val="tx1">
+            <a:lumMod val="15000"/>
+            <a:lumOff val="85000"/>
+          </a:schemeClr>
+        </a:solidFill>
+        <a:round/>
+      </a:ln>
+    </cs:spPr>
+    <cs:defRPr sz="1197" kern="1200"/>
+  </cs:dataTable>
+  <cs:downBar>
+    <cs:lnRef idx="0"/>
+    <cs:fillRef idx="0"/>
+    <cs:effectRef idx="0"/>
+    <cs:fontRef idx="minor">
+      <a:schemeClr val="dk1"/>
+    </cs:fontRef>
+    <cs:spPr>
+      <a:solidFill>
+        <a:schemeClr val="dk1">
+          <a:lumMod val="65000"/>
+          <a:lumOff val="35000"/>
+        </a:schemeClr>
+      </a:solidFill>
+      <a:ln w="9525">
+        <a:solidFill>
+          <a:schemeClr val="tx1">
+            <a:lumMod val="65000"/>
+            <a:lumOff val="35000"/>
+          </a:schemeClr>
+        </a:solidFill>
+      </a:ln>
+    </cs:spPr>
+  </cs:downBar>
+  <cs:dropLine>
+    <cs:lnRef idx="0"/>
+    <cs:fillRef idx="0"/>
+    <cs:effectRef idx="0"/>
+    <cs:fontRef idx="minor">
+      <a:schemeClr val="tx1"/>
+    </cs:fontRef>
+    <cs:spPr>
+      <a:ln w="9525" cap="flat" cmpd="sng" algn="ctr">
+        <a:solidFill>
+          <a:schemeClr val="tx1">
+            <a:lumMod val="35000"/>
+            <a:lumOff val="65000"/>
+          </a:schemeClr>
+        </a:solidFill>
+        <a:round/>
+      </a:ln>
+    </cs:spPr>
+  </cs:dropLine>
+  <cs:errorBar>
+    <cs:lnRef idx="0"/>
+    <cs:fillRef idx="0"/>
+    <cs:effectRef idx="0"/>
+    <cs:fontRef idx="minor">
+      <a:schemeClr val="tx1"/>
+    </cs:fontRef>
+    <cs:spPr>
+      <a:ln w="9525" cap="flat" cmpd="sng" algn="ctr">
+        <a:solidFill>
+          <a:schemeClr val="tx1">
+            <a:lumMod val="65000"/>
+            <a:lumOff val="35000"/>
+          </a:schemeClr>
+        </a:solidFill>
+        <a:round/>
+      </a:ln>
+    </cs:spPr>
+  </cs:errorBar>
+  <cs:floor>
+    <cs:lnRef idx="0"/>
+    <cs:fillRef idx="0"/>
+    <cs:effectRef idx="0"/>
+    <cs:fontRef idx="minor">
+      <a:schemeClr val="tx1"/>
+    </cs:fontRef>
+    <cs:spPr>
+      <a:noFill/>
+      <a:ln>
+        <a:noFill/>
+      </a:ln>
+    </cs:spPr>
+  </cs:floor>
+  <cs:gridlineMajor>
+    <cs:lnRef idx="0"/>
+    <cs:fillRef idx="0"/>
+    <cs:effectRef idx="0"/>
+    <cs:fontRef idx="minor">
+      <a:schemeClr val="tx1"/>
+    </cs:fontRef>
+    <cs:spPr>
+      <a:ln w="9525" cap="flat" cmpd="sng" algn="ctr">
+        <a:solidFill>
+          <a:schemeClr val="tx1">
+            <a:lumMod val="15000"/>
+            <a:lumOff val="85000"/>
+          </a:schemeClr>
+        </a:solidFill>
+        <a:round/>
+      </a:ln>
+    </cs:spPr>
+  </cs:gridlineMajor>
+  <cs:gridlineMinor>
+    <cs:lnRef idx="0"/>
+    <cs:fillRef idx="0"/>
+    <cs:effectRef idx="0"/>
+    <cs:fontRef idx="minor">
+      <a:schemeClr val="tx1"/>
+    </cs:fontRef>
+    <cs:spPr>
+      <a:ln w="9525" cap="flat" cmpd="sng" algn="ctr">
+        <a:solidFill>
+          <a:schemeClr val="tx1">
+            <a:lumMod val="5000"/>
+            <a:lumOff val="95000"/>
+          </a:schemeClr>
+        </a:solidFill>
+        <a:round/>
+      </a:ln>
+    </cs:spPr>
+  </cs:gridlineMinor>
+  <cs:hiLoLine>
+    <cs:lnRef idx="0"/>
+    <cs:fillRef idx="0"/>
+    <cs:effectRef idx="0"/>
+    <cs:fontRef idx="minor">
+      <a:schemeClr val="tx1"/>
+    </cs:fontRef>
+    <cs:spPr>
+      <a:ln w="9525" cap="flat" cmpd="sng" algn="ctr">
+        <a:solidFill>
+          <a:schemeClr val="tx1">
+            <a:lumMod val="75000"/>
+            <a:lumOff val="25000"/>
+          </a:schemeClr>
+        </a:solidFill>
+        <a:round/>
+      </a:ln>
+    </cs:spPr>
+  </cs:hiLoLine>
+  <cs:leaderLine>
+    <cs:lnRef idx="0"/>
+    <cs:fillRef idx="0"/>
+    <cs:effectRef idx="0"/>
+    <cs:fontRef idx="minor">
+      <a:schemeClr val="tx1"/>
+    </cs:fontRef>
+    <cs:spPr>
+      <a:ln w="9525" cap="flat" cmpd="sng" algn="ctr">
+        <a:solidFill>
+          <a:schemeClr val="tx1">
+            <a:lumMod val="35000"/>
+            <a:lumOff val="65000"/>
+          </a:schemeClr>
+        </a:solidFill>
+        <a:round/>
+      </a:ln>
+    </cs:spPr>
+  </cs:leaderLine>
+  <cs:legend>
+    <cs:lnRef idx="0"/>
+    <cs:fillRef idx="0"/>
+    <cs:effectRef idx="0"/>
+    <cs:fontRef idx="minor">
+      <a:schemeClr val="tx1">
+        <a:lumMod val="65000"/>
+        <a:lumOff val="35000"/>
+      </a:schemeClr>
+    </cs:fontRef>
+    <cs:defRPr sz="1197" kern="1200"/>
+  </cs:legend>
+  <cs:plotArea mods="allowNoFillOverride allowNoLineOverride">
+    <cs:lnRef idx="0"/>
+    <cs:fillRef idx="0"/>
+    <cs:effectRef idx="0"/>
+    <cs:fontRef idx="minor">
+      <a:schemeClr val="tx1"/>
+    </cs:fontRef>
+  </cs:plotArea>
+  <cs:plotArea3D mods="allowNoFillOverride allowNoLineOverride">
+    <cs:lnRef idx="0"/>
+    <cs:fillRef idx="0"/>
+    <cs:effectRef idx="0"/>
+    <cs:fontRef idx="minor">
+      <a:schemeClr val="tx1"/>
+    </cs:fontRef>
+  </cs:plotArea3D>
+  <cs:seriesAxis>
+    <cs:lnRef idx="0"/>
+    <cs:fillRef idx="0"/>
+    <cs:effectRef idx="0"/>
+    <cs:fontRef idx="minor">
+      <a:schemeClr val="tx1">
+        <a:lumMod val="65000"/>
+        <a:lumOff val="35000"/>
+      </a:schemeClr>
+    </cs:fontRef>
+    <cs:defRPr sz="1197" kern="1200"/>
+  </cs:seriesAxis>
+  <cs:seriesLine>
+    <cs:lnRef idx="0"/>
+    <cs:fillRef idx="0"/>
+    <cs:effectRef idx="0"/>
+    <cs:fontRef idx="minor">
+      <a:schemeClr val="tx1"/>
+    </cs:fontRef>
+    <cs:spPr>
+      <a:ln w="9525" cap="flat" cmpd="sng" algn="ctr">
+        <a:solidFill>
+          <a:schemeClr val="tx1">
+            <a:lumMod val="35000"/>
+            <a:lumOff val="65000"/>
+          </a:schemeClr>
+        </a:solidFill>
+        <a:round/>
+      </a:ln>
+    </cs:spPr>
+  </cs:seriesLine>
+  <cs:title>
+    <cs:lnRef idx="0"/>
+    <cs:fillRef idx="0"/>
+    <cs:effectRef idx="0"/>
+    <cs:fontRef idx="minor">
+      <a:schemeClr val="tx1">
+        <a:lumMod val="65000"/>
+        <a:lumOff val="35000"/>
+      </a:schemeClr>
+    </cs:fontRef>
+    <cs:defRPr sz="1862" b="0" kern="1200" spc="0" baseline="0"/>
+  </cs:title>
+  <cs:trendline>
+    <cs:lnRef idx="0">
+      <cs:styleClr val="auto"/>
+    </cs:lnRef>
+    <cs:fillRef idx="0"/>
+    <cs:effectRef idx="0"/>
+    <cs:fontRef idx="minor">
+      <a:schemeClr val="tx1"/>
+    </cs:fontRef>
+    <cs:spPr>
+      <a:ln w="19050" cap="rnd">
+        <a:solidFill>
+          <a:schemeClr val="phClr"/>
+        </a:solidFill>
+        <a:prstDash val="sysDot"/>
+      </a:ln>
+    </cs:spPr>
+  </cs:trendline>
+  <cs:trendlineLabel>
+    <cs:lnRef idx="0"/>
+    <cs:fillRef idx="0"/>
+    <cs:effectRef idx="0"/>
+    <cs:fontRef idx="minor">
+      <a:schemeClr val="tx1">
+        <a:lumMod val="65000"/>
+        <a:lumOff val="35000"/>
+      </a:schemeClr>
+    </cs:fontRef>
+    <cs:defRPr sz="1197" kern="1200"/>
+  </cs:trendlineLabel>
+  <cs:upBar>
+    <cs:lnRef idx="0"/>
+    <cs:fillRef idx="0"/>
+    <cs:effectRef idx="0"/>
+    <cs:fontRef idx="minor">
+      <a:schemeClr val="dk1"/>
+    </cs:fontRef>
+    <cs:spPr>
+      <a:solidFill>
+        <a:schemeClr val="lt1"/>
+      </a:solidFill>
+      <a:ln w="9525">
+        <a:solidFill>
+          <a:schemeClr val="tx1">
+            <a:lumMod val="15000"/>
+            <a:lumOff val="85000"/>
+          </a:schemeClr>
+        </a:solidFill>
+      </a:ln>
+    </cs:spPr>
+  </cs:upBar>
+  <cs:valueAxis>
+    <cs:lnRef idx="0"/>
+    <cs:fillRef idx="0"/>
+    <cs:effectRef idx="0"/>
+    <cs:fontRef idx="minor">
+      <a:schemeClr val="tx1">
+        <a:lumMod val="65000"/>
+        <a:lumOff val="35000"/>
+      </a:schemeClr>
+    </cs:fontRef>
+    <cs:defRPr sz="1197" kern="1200"/>
+  </cs:valueAxis>
+  <cs:wall>
+    <cs:lnRef idx="0"/>
+    <cs:fillRef idx="0"/>
+    <cs:effectRef idx="0"/>
+    <cs:fontRef idx="minor">
+      <a:schemeClr val="tx1"/>
+    </cs:fontRef>
+    <cs:spPr>
+      <a:noFill/>
+      <a:ln>
+        <a:noFill/>
+      </a:ln>
+    </cs:spPr>
+  </cs:wall>
+</cs:chartStyle>
+</file>
+
 <file path=ppt/notesMasters/notesMaster1.xml><?xml version="1.0" encoding="utf-8"?>
 <p:notesMaster xmlns:a="http://schemas.openxmlformats.org/drawingml/2006/main" xmlns:r="http://schemas.openxmlformats.org/officeDocument/2006/relationships" xmlns:p="http://schemas.openxmlformats.org/presentationml/2006/main">
   <p:cSld>
@@ -200,7 +1458,7 @@
           <a:p>
             <a:fld id="{D6441DEE-3F41-B34E-96C2-26796F10840D}" type="datetimeFigureOut">
               <a:rPr lang="de-DE" smtClean="0"/>
-              <a:t>23.03.16</a:t>
+              <a:t>25.03.16</a:t>
             </a:fld>
             <a:endParaRPr lang="de-DE"/>
           </a:p>
@@ -533,7 +1791,7 @@
           <a:p>
             <a:fld id="{F066C7BC-674D-4B4E-93C4-E155CB34FEBC}" type="slidenum">
               <a:rPr lang="de-DE" smtClean="0"/>
-              <a:t>3</a:t>
+              <a:t>4</a:t>
             </a:fld>
             <a:endParaRPr lang="de-DE"/>
           </a:p>
@@ -683,7 +1941,7 @@
           <a:p>
             <a:fld id="{45C635BA-7AD8-E44A-B5F4-33C1482C67A6}" type="datetimeFigureOut">
               <a:rPr lang="de-DE" smtClean="0"/>
-              <a:t>23.03.16</a:t>
+              <a:t>25.03.16</a:t>
             </a:fld>
             <a:endParaRPr lang="de-DE"/>
           </a:p>
@@ -853,7 +2111,7 @@
           <a:p>
             <a:fld id="{45C635BA-7AD8-E44A-B5F4-33C1482C67A6}" type="datetimeFigureOut">
               <a:rPr lang="de-DE" smtClean="0"/>
-              <a:t>23.03.16</a:t>
+              <a:t>25.03.16</a:t>
             </a:fld>
             <a:endParaRPr lang="de-DE"/>
           </a:p>
@@ -1033,7 +2291,7 @@
           <a:p>
             <a:fld id="{45C635BA-7AD8-E44A-B5F4-33C1482C67A6}" type="datetimeFigureOut">
               <a:rPr lang="de-DE" smtClean="0"/>
-              <a:t>23.03.16</a:t>
+              <a:t>25.03.16</a:t>
             </a:fld>
             <a:endParaRPr lang="de-DE"/>
           </a:p>
@@ -1203,7 +2461,7 @@
           <a:p>
             <a:fld id="{45C635BA-7AD8-E44A-B5F4-33C1482C67A6}" type="datetimeFigureOut">
               <a:rPr lang="de-DE" smtClean="0"/>
-              <a:t>23.03.16</a:t>
+              <a:t>25.03.16</a:t>
             </a:fld>
             <a:endParaRPr lang="de-DE"/>
           </a:p>
@@ -1449,7 +2707,7 @@
           <a:p>
             <a:fld id="{45C635BA-7AD8-E44A-B5F4-33C1482C67A6}" type="datetimeFigureOut">
               <a:rPr lang="de-DE" smtClean="0"/>
-              <a:t>23.03.16</a:t>
+              <a:t>25.03.16</a:t>
             </a:fld>
             <a:endParaRPr lang="de-DE"/>
           </a:p>
@@ -1681,7 +2939,7 @@
           <a:p>
             <a:fld id="{45C635BA-7AD8-E44A-B5F4-33C1482C67A6}" type="datetimeFigureOut">
               <a:rPr lang="de-DE" smtClean="0"/>
-              <a:t>23.03.16</a:t>
+              <a:t>25.03.16</a:t>
             </a:fld>
             <a:endParaRPr lang="de-DE"/>
           </a:p>
@@ -2048,7 +3306,7 @@
           <a:p>
             <a:fld id="{45C635BA-7AD8-E44A-B5F4-33C1482C67A6}" type="datetimeFigureOut">
               <a:rPr lang="de-DE" smtClean="0"/>
-              <a:t>23.03.16</a:t>
+              <a:t>25.03.16</a:t>
             </a:fld>
             <a:endParaRPr lang="de-DE"/>
           </a:p>
@@ -2166,7 +3424,7 @@
           <a:p>
             <a:fld id="{45C635BA-7AD8-E44A-B5F4-33C1482C67A6}" type="datetimeFigureOut">
               <a:rPr lang="de-DE" smtClean="0"/>
-              <a:t>23.03.16</a:t>
+              <a:t>25.03.16</a:t>
             </a:fld>
             <a:endParaRPr lang="de-DE"/>
           </a:p>
@@ -2261,7 +3519,7 @@
           <a:p>
             <a:fld id="{45C635BA-7AD8-E44A-B5F4-33C1482C67A6}" type="datetimeFigureOut">
               <a:rPr lang="de-DE" smtClean="0"/>
-              <a:t>23.03.16</a:t>
+              <a:t>25.03.16</a:t>
             </a:fld>
             <a:endParaRPr lang="de-DE"/>
           </a:p>
@@ -2538,7 +3796,7 @@
           <a:p>
             <a:fld id="{45C635BA-7AD8-E44A-B5F4-33C1482C67A6}" type="datetimeFigureOut">
               <a:rPr lang="de-DE" smtClean="0"/>
-              <a:t>23.03.16</a:t>
+              <a:t>25.03.16</a:t>
             </a:fld>
             <a:endParaRPr lang="de-DE"/>
           </a:p>
@@ -2791,7 +4049,7 @@
           <a:p>
             <a:fld id="{45C635BA-7AD8-E44A-B5F4-33C1482C67A6}" type="datetimeFigureOut">
               <a:rPr lang="de-DE" smtClean="0"/>
-              <a:t>23.03.16</a:t>
+              <a:t>25.03.16</a:t>
             </a:fld>
             <a:endParaRPr lang="de-DE"/>
           </a:p>
@@ -3004,7 +4262,7 @@
           <a:p>
             <a:fld id="{45C635BA-7AD8-E44A-B5F4-33C1482C67A6}" type="datetimeFigureOut">
               <a:rPr lang="de-DE" smtClean="0"/>
-              <a:t>23.03.16</a:t>
+              <a:t>25.03.16</a:t>
             </a:fld>
             <a:endParaRPr lang="de-DE"/>
           </a:p>
@@ -4657,6 +5915,295 @@
           <a:chExt cx="0" cy="0"/>
         </a:xfrm>
       </p:grpSpPr>
+      <p:graphicFrame>
+        <p:nvGraphicFramePr>
+          <p:cNvPr id="2" name="Diagramm 1"/>
+          <p:cNvGraphicFramePr/>
+          <p:nvPr>
+            <p:extLst>
+              <p:ext uri="{D42A27DB-BD31-4B8C-83A1-F6EECF244321}">
+                <p14:modId xmlns:p14="http://schemas.microsoft.com/office/powerpoint/2010/main" val="474546472"/>
+              </p:ext>
+            </p:extLst>
+          </p:nvPr>
+        </p:nvGraphicFramePr>
+        <p:xfrm>
+          <a:off x="1056509" y="719667"/>
+          <a:ext cx="5040086" cy="3141134"/>
+        </p:xfrm>
+        <a:graphic>
+          <a:graphicData uri="http://schemas.openxmlformats.org/drawingml/2006/chart">
+            <c:chart xmlns:c="http://schemas.openxmlformats.org/drawingml/2006/chart" xmlns:r="http://schemas.openxmlformats.org/officeDocument/2006/relationships" r:id="rId2"/>
+          </a:graphicData>
+        </a:graphic>
+      </p:graphicFrame>
+      <p:sp>
+        <p:nvSpPr>
+          <p:cNvPr id="3" name="Textfeld 2"/>
+          <p:cNvSpPr txBox="1"/>
+          <p:nvPr/>
+        </p:nvSpPr>
+        <p:spPr>
+          <a:xfrm>
+            <a:off x="1109130" y="1397003"/>
+            <a:ext cx="614271" cy="215444"/>
+          </a:xfrm>
+          <a:prstGeom prst="rect">
+            <a:avLst/>
+          </a:prstGeom>
+          <a:noFill/>
+        </p:spPr>
+        <p:txBody>
+          <a:bodyPr wrap="none" rtlCol="0">
+            <a:spAutoFit/>
+          </a:bodyPr>
+          <a:lstStyle/>
+          <a:p>
+            <a:r>
+              <a:rPr lang="de-DE" sz="800" b="1" dirty="0" smtClean="0">
+                <a:solidFill>
+                  <a:schemeClr val="bg1">
+                    <a:lumMod val="75000"/>
+                  </a:schemeClr>
+                </a:solidFill>
+                <a:latin typeface="Verdana" charset="0"/>
+                <a:ea typeface="Verdana" charset="0"/>
+                <a:cs typeface="Verdana" charset="0"/>
+              </a:rPr>
+              <a:t>Umsatz</a:t>
+            </a:r>
+            <a:endParaRPr lang="de-DE" sz="800" b="1" dirty="0">
+              <a:solidFill>
+                <a:schemeClr val="bg1">
+                  <a:lumMod val="75000"/>
+                </a:schemeClr>
+              </a:solidFill>
+              <a:latin typeface="Verdana" charset="0"/>
+              <a:ea typeface="Verdana" charset="0"/>
+              <a:cs typeface="Verdana" charset="0"/>
+            </a:endParaRPr>
+          </a:p>
+        </p:txBody>
+      </p:sp>
+      <p:sp>
+        <p:nvSpPr>
+          <p:cNvPr id="5" name="Textfeld 4"/>
+          <p:cNvSpPr txBox="1"/>
+          <p:nvPr/>
+        </p:nvSpPr>
+        <p:spPr>
+          <a:xfrm>
+            <a:off x="5376337" y="3158064"/>
+            <a:ext cx="660400" cy="215444"/>
+          </a:xfrm>
+          <a:prstGeom prst="rect">
+            <a:avLst/>
+          </a:prstGeom>
+          <a:noFill/>
+        </p:spPr>
+        <p:txBody>
+          <a:bodyPr wrap="square" rtlCol="0">
+            <a:spAutoFit/>
+          </a:bodyPr>
+          <a:lstStyle/>
+          <a:p>
+            <a:pPr algn="r"/>
+            <a:r>
+              <a:rPr lang="de-DE" sz="800" b="1" dirty="0" smtClean="0">
+                <a:solidFill>
+                  <a:schemeClr val="bg1">
+                    <a:lumMod val="75000"/>
+                  </a:schemeClr>
+                </a:solidFill>
+                <a:latin typeface="Verdana" charset="0"/>
+                <a:ea typeface="Verdana" charset="0"/>
+                <a:cs typeface="Verdana" charset="0"/>
+              </a:rPr>
+              <a:t>Zeit</a:t>
+            </a:r>
+            <a:endParaRPr lang="de-DE" sz="800" b="1" dirty="0">
+              <a:solidFill>
+                <a:schemeClr val="bg1">
+                  <a:lumMod val="75000"/>
+                </a:schemeClr>
+              </a:solidFill>
+              <a:latin typeface="Verdana" charset="0"/>
+              <a:ea typeface="Verdana" charset="0"/>
+              <a:cs typeface="Verdana" charset="0"/>
+            </a:endParaRPr>
+          </a:p>
+        </p:txBody>
+      </p:sp>
+      <p:cxnSp>
+        <p:nvCxnSpPr>
+          <p:cNvPr id="12" name="Gerade Verbindung mit Pfeil 11"/>
+          <p:cNvCxnSpPr/>
+          <p:nvPr/>
+        </p:nvCxnSpPr>
+        <p:spPr>
+          <a:xfrm flipV="1">
+            <a:off x="1227666" y="1578586"/>
+            <a:ext cx="0" cy="1808089"/>
+          </a:xfrm>
+          <a:prstGeom prst="straightConnector1">
+            <a:avLst/>
+          </a:prstGeom>
+          <a:ln>
+            <a:solidFill>
+              <a:schemeClr val="bg1">
+                <a:lumMod val="85000"/>
+              </a:schemeClr>
+            </a:solidFill>
+            <a:tailEnd type="triangle"/>
+          </a:ln>
+        </p:spPr>
+        <p:style>
+          <a:lnRef idx="1">
+            <a:schemeClr val="accent1"/>
+          </a:lnRef>
+          <a:fillRef idx="0">
+            <a:schemeClr val="accent1"/>
+          </a:fillRef>
+          <a:effectRef idx="0">
+            <a:schemeClr val="accent1"/>
+          </a:effectRef>
+          <a:fontRef idx="minor">
+            <a:schemeClr val="tx1"/>
+          </a:fontRef>
+        </p:style>
+      </p:cxnSp>
+      <p:cxnSp>
+        <p:nvCxnSpPr>
+          <p:cNvPr id="14" name="Gerade Verbindung mit Pfeil 13"/>
+          <p:cNvCxnSpPr/>
+          <p:nvPr/>
+        </p:nvCxnSpPr>
+        <p:spPr>
+          <a:xfrm>
+            <a:off x="5503332" y="3390442"/>
+            <a:ext cx="431800" cy="1"/>
+          </a:xfrm>
+          <a:prstGeom prst="straightConnector1">
+            <a:avLst/>
+          </a:prstGeom>
+          <a:ln>
+            <a:solidFill>
+              <a:schemeClr val="bg1">
+                <a:lumMod val="85000"/>
+              </a:schemeClr>
+            </a:solidFill>
+            <a:tailEnd type="triangle"/>
+          </a:ln>
+        </p:spPr>
+        <p:style>
+          <a:lnRef idx="1">
+            <a:schemeClr val="accent1"/>
+          </a:lnRef>
+          <a:fillRef idx="0">
+            <a:schemeClr val="accent1"/>
+          </a:fillRef>
+          <a:effectRef idx="0">
+            <a:schemeClr val="accent1"/>
+          </a:effectRef>
+          <a:fontRef idx="minor">
+            <a:schemeClr val="tx1"/>
+          </a:fontRef>
+        </p:style>
+      </p:cxnSp>
+      <p:sp>
+        <p:nvSpPr>
+          <p:cNvPr id="17" name="Explosion 1 16"/>
+          <p:cNvSpPr/>
+          <p:nvPr/>
+        </p:nvSpPr>
+        <p:spPr>
+          <a:xfrm>
+            <a:off x="1320802" y="2870121"/>
+            <a:ext cx="821270" cy="740528"/>
+          </a:xfrm>
+          <a:prstGeom prst="irregularSeal1">
+            <a:avLst/>
+          </a:prstGeom>
+          <a:solidFill>
+            <a:srgbClr val="FFC000"/>
+          </a:solidFill>
+          <a:ln>
+            <a:noFill/>
+          </a:ln>
+        </p:spPr>
+        <p:style>
+          <a:lnRef idx="2">
+            <a:schemeClr val="accent1">
+              <a:shade val="50000"/>
+            </a:schemeClr>
+          </a:lnRef>
+          <a:fillRef idx="1">
+            <a:schemeClr val="accent1"/>
+          </a:fillRef>
+          <a:effectRef idx="0">
+            <a:schemeClr val="accent1"/>
+          </a:effectRef>
+          <a:fontRef idx="minor">
+            <a:schemeClr val="lt1"/>
+          </a:fontRef>
+        </p:style>
+        <p:txBody>
+          <a:bodyPr rtlCol="0" anchor="ctr"/>
+          <a:lstStyle/>
+          <a:p>
+            <a:pPr algn="ctr"/>
+            <a:r>
+              <a:rPr lang="de-DE" sz="600" dirty="0" smtClean="0">
+                <a:solidFill>
+                  <a:sysClr val="windowText" lastClr="000000"/>
+                </a:solidFill>
+                <a:latin typeface="Verdana" charset="0"/>
+                <a:ea typeface="Verdana" charset="0"/>
+                <a:cs typeface="Verdana" charset="0"/>
+              </a:rPr>
+              <a:t>Markt-eintritt</a:t>
+            </a:r>
+            <a:endParaRPr lang="de-DE" sz="600" dirty="0">
+              <a:solidFill>
+                <a:sysClr val="windowText" lastClr="000000"/>
+              </a:solidFill>
+              <a:latin typeface="Verdana" charset="0"/>
+              <a:ea typeface="Verdana" charset="0"/>
+              <a:cs typeface="Verdana" charset="0"/>
+            </a:endParaRPr>
+          </a:p>
+        </p:txBody>
+      </p:sp>
+    </p:spTree>
+    <p:extLst>
+      <p:ext uri="{BB962C8B-B14F-4D97-AF65-F5344CB8AC3E}">
+        <p14:creationId xmlns:p14="http://schemas.microsoft.com/office/powerpoint/2010/main" val="1916859560"/>
+      </p:ext>
+    </p:extLst>
+  </p:cSld>
+  <p:clrMapOvr>
+    <a:masterClrMapping/>
+  </p:clrMapOvr>
+</p:sld>
+</file>
+
+<file path=ppt/slides/slide4.xml><?xml version="1.0" encoding="utf-8"?>
+<p:sld xmlns:a="http://schemas.openxmlformats.org/drawingml/2006/main" xmlns:r="http://schemas.openxmlformats.org/officeDocument/2006/relationships" xmlns:p="http://schemas.openxmlformats.org/presentationml/2006/main">
+  <p:cSld>
+    <p:spTree>
+      <p:nvGrpSpPr>
+        <p:cNvPr id="1" name=""/>
+        <p:cNvGrpSpPr/>
+        <p:nvPr/>
+      </p:nvGrpSpPr>
+      <p:grpSpPr>
+        <a:xfrm>
+          <a:off x="0" y="0"/>
+          <a:ext cx="0" cy="0"/>
+          <a:chOff x="0" y="0"/>
+          <a:chExt cx="0" cy="0"/>
+        </a:xfrm>
+      </p:grpSpPr>
       <p:sp>
         <p:nvSpPr>
           <p:cNvPr id="28" name="Abgerundetes Rechteck 27"/>
@@ -5671,18 +7218,7 @@
                 <a:ea typeface="Verdana" charset="0"/>
                 <a:cs typeface="Verdana" charset="0"/>
               </a:rPr>
-              <a:t> </a:t>
-            </a:r>
-            <a:r>
-              <a:rPr lang="de-DE" sz="800" dirty="0" smtClean="0">
-                <a:solidFill>
-                  <a:sysClr val="windowText" lastClr="000000"/>
-                </a:solidFill>
-                <a:latin typeface="Verdana" charset="0"/>
-                <a:ea typeface="Verdana" charset="0"/>
-                <a:cs typeface="Verdana" charset="0"/>
-              </a:rPr>
-              <a:t>&amp; Test</a:t>
+              <a:t> &amp; Test</a:t>
             </a:r>
             <a:endParaRPr lang="de-DE" sz="800" dirty="0">
               <a:solidFill>
@@ -6024,7 +7560,7 @@
 </p:sld>
 </file>
 
-<file path=ppt/slides/slide4.xml><?xml version="1.0" encoding="utf-8"?>
+<file path=ppt/slides/slide5.xml><?xml version="1.0" encoding="utf-8"?>
 <p:sld xmlns:a="http://schemas.openxmlformats.org/drawingml/2006/main" xmlns:r="http://schemas.openxmlformats.org/officeDocument/2006/relationships" xmlns:p="http://schemas.openxmlformats.org/presentationml/2006/main">
   <p:cSld>
     <p:spTree>
@@ -6084,7 +7620,7 @@
     </p:spTree>
     <p:extLst>
       <p:ext uri="{BB962C8B-B14F-4D97-AF65-F5344CB8AC3E}">
-        <p14:creationId xmlns:p14="http://schemas.microsoft.com/office/powerpoint/2010/main" val="1916859560"/>
+        <p14:creationId xmlns:p14="http://schemas.microsoft.com/office/powerpoint/2010/main" val="1054856748"/>
       </p:ext>
     </p:extLst>
   </p:cSld>

</xml_diff>

<commit_message>
Fehlerbehebungsabbildung für SVT ergänzt und Quelle hinzugefügt (65%)
</commit_message>
<xml_diff>
--- a/Abbildungen/Abbildungen.pptx
+++ b/Abbildungen/Abbildungen.pptx
@@ -5,14 +5,15 @@
     <p:sldMasterId id="2147483648" r:id="rId1"/>
   </p:sldMasterIdLst>
   <p:notesMasterIdLst>
-    <p:notesMasterId r:id="rId7"/>
+    <p:notesMasterId r:id="rId8"/>
   </p:notesMasterIdLst>
   <p:sldIdLst>
     <p:sldId id="256" r:id="rId2"/>
     <p:sldId id="257" r:id="rId3"/>
     <p:sldId id="259" r:id="rId4"/>
     <p:sldId id="260" r:id="rId5"/>
-    <p:sldId id="261" r:id="rId6"/>
+    <p:sldId id="263" r:id="rId6"/>
+    <p:sldId id="261" r:id="rId7"/>
   </p:sldIdLst>
   <p:sldSz cx="12192000" cy="6858000"/>
   <p:notesSz cx="6858000" cy="9144000"/>
@@ -168,7 +169,6 @@
           </a:p>
         </c:rich>
       </c:tx>
-      <c:layout/>
       <c:overlay val="0"/>
       <c:spPr>
         <a:noFill/>
@@ -533,11 +533,11 @@
           <c:showBubbleSize val="0"/>
         </c:dLbls>
         <c:smooth val="0"/>
-        <c:axId val="-2108056480"/>
-        <c:axId val="-2110234688"/>
+        <c:axId val="2054927376"/>
+        <c:axId val="2130836224"/>
       </c:lineChart>
       <c:catAx>
-        <c:axId val="-2108056480"/>
+        <c:axId val="2054927376"/>
         <c:scaling>
           <c:orientation val="minMax"/>
         </c:scaling>
@@ -580,7 +580,7 @@
             <a:endParaRPr lang="de-DE"/>
           </a:p>
         </c:txPr>
-        <c:crossAx val="-2110234688"/>
+        <c:crossAx val="2130836224"/>
         <c:crosses val="autoZero"/>
         <c:auto val="1"/>
         <c:lblAlgn val="ctr"/>
@@ -588,7 +588,7 @@
         <c:noMultiLvlLbl val="0"/>
       </c:catAx>
       <c:valAx>
-        <c:axId val="-2110234688"/>
+        <c:axId val="2130836224"/>
         <c:scaling>
           <c:orientation val="minMax"/>
         </c:scaling>
@@ -634,7 +634,7 @@
             <a:endParaRPr lang="de-DE"/>
           </a:p>
         </c:txPr>
-        <c:crossAx val="-2108056480"/>
+        <c:crossAx val="2054927376"/>
         <c:crosses val="autoZero"/>
         <c:crossBetween val="between"/>
       </c:valAx>
@@ -763,7 +763,6 @@
           </a:p>
         </c:txPr>
       </c:legendEntry>
-      <c:layout/>
       <c:overlay val="0"/>
       <c:spPr>
         <a:noFill/>
@@ -793,6 +792,535 @@
         </a:p>
       </c:txPr>
     </c:legend>
+    <c:plotVisOnly val="1"/>
+    <c:dispBlanksAs val="gap"/>
+    <c:showDLblsOverMax val="0"/>
+  </c:chart>
+  <c:spPr>
+    <a:noFill/>
+    <a:ln>
+      <a:noFill/>
+    </a:ln>
+    <a:effectLst/>
+  </c:spPr>
+  <c:txPr>
+    <a:bodyPr/>
+    <a:lstStyle/>
+    <a:p>
+      <a:pPr>
+        <a:defRPr/>
+      </a:pPr>
+      <a:endParaRPr lang="de-DE"/>
+    </a:p>
+  </c:txPr>
+  <c:externalData r:id="rId3">
+    <c:autoUpdate val="0"/>
+  </c:externalData>
+</c:chartSpace>
+</file>
+
+<file path=ppt/charts/chart2.xml><?xml version="1.0" encoding="utf-8"?>
+<c:chartSpace xmlns:c="http://schemas.openxmlformats.org/drawingml/2006/chart" xmlns:a="http://schemas.openxmlformats.org/drawingml/2006/main" xmlns:r="http://schemas.openxmlformats.org/officeDocument/2006/relationships">
+  <c:date1904 val="0"/>
+  <c:lang val="de-DE"/>
+  <c:roundedCorners val="0"/>
+  <mc:AlternateContent xmlns:mc="http://schemas.openxmlformats.org/markup-compatibility/2006">
+    <mc:Choice xmlns:c14="http://schemas.microsoft.com/office/drawing/2007/8/2/chart" Requires="c14">
+      <c14:style val="102"/>
+    </mc:Choice>
+    <mc:Fallback>
+      <c:style val="2"/>
+    </mc:Fallback>
+  </mc:AlternateContent>
+  <c:chart>
+    <c:title>
+      <c:tx>
+        <c:rich>
+          <a:bodyPr rot="0" spcFirstLastPara="1" vertOverflow="ellipsis" vert="horz" wrap="square" anchor="ctr" anchorCtr="1"/>
+          <a:lstStyle/>
+          <a:p>
+            <a:pPr>
+              <a:defRPr sz="1862" b="0" i="0" u="none" strike="noStrike" kern="1200" spc="0" baseline="0">
+                <a:solidFill>
+                  <a:schemeClr val="tx1">
+                    <a:lumMod val="65000"/>
+                    <a:lumOff val="35000"/>
+                  </a:schemeClr>
+                </a:solidFill>
+                <a:latin typeface="+mn-lt"/>
+                <a:ea typeface="+mn-ea"/>
+                <a:cs typeface="+mn-cs"/>
+              </a:defRPr>
+            </a:pPr>
+            <a:r>
+              <a:rPr lang="de-DE" sz="1400" b="1" dirty="0" smtClean="0">
+                <a:latin typeface="Verdana" charset="0"/>
+                <a:ea typeface="Verdana" charset="0"/>
+                <a:cs typeface="Verdana" charset="0"/>
+              </a:rPr>
+              <a:t>Fehlerbehebungskosten</a:t>
+            </a:r>
+            <a:endParaRPr lang="de-DE" sz="1400" b="1" dirty="0">
+              <a:latin typeface="Verdana" charset="0"/>
+              <a:ea typeface="Verdana" charset="0"/>
+              <a:cs typeface="Verdana" charset="0"/>
+            </a:endParaRPr>
+          </a:p>
+        </c:rich>
+      </c:tx>
+      <c:layout>
+        <c:manualLayout>
+          <c:xMode val="edge"/>
+          <c:yMode val="edge"/>
+          <c:x val="0.275026061063244"/>
+          <c:y val="0.0"/>
+        </c:manualLayout>
+      </c:layout>
+      <c:overlay val="0"/>
+      <c:spPr>
+        <a:noFill/>
+        <a:ln>
+          <a:noFill/>
+        </a:ln>
+        <a:effectLst/>
+      </c:spPr>
+      <c:txPr>
+        <a:bodyPr rot="0" spcFirstLastPara="1" vertOverflow="ellipsis" vert="horz" wrap="square" anchor="ctr" anchorCtr="1"/>
+        <a:lstStyle/>
+        <a:p>
+          <a:pPr>
+            <a:defRPr sz="1862" b="0" i="0" u="none" strike="noStrike" kern="1200" spc="0" baseline="0">
+              <a:solidFill>
+                <a:schemeClr val="tx1">
+                  <a:lumMod val="65000"/>
+                  <a:lumOff val="35000"/>
+                </a:schemeClr>
+              </a:solidFill>
+              <a:latin typeface="+mn-lt"/>
+              <a:ea typeface="+mn-ea"/>
+              <a:cs typeface="+mn-cs"/>
+            </a:defRPr>
+          </a:pPr>
+          <a:endParaRPr lang="de-DE"/>
+        </a:p>
+      </c:txPr>
+    </c:title>
+    <c:autoTitleDeleted val="0"/>
+    <c:plotArea>
+      <c:layout>
+        <c:manualLayout>
+          <c:layoutTarget val="inner"/>
+          <c:xMode val="edge"/>
+          <c:yMode val="edge"/>
+          <c:x val="0.0327573775526846"/>
+          <c:y val="0.125397706688094"/>
+          <c:w val="0.934485244894631"/>
+          <c:h val="0.846165111071352"/>
+        </c:manualLayout>
+      </c:layout>
+      <c:lineChart>
+        <c:grouping val="standard"/>
+        <c:varyColors val="0"/>
+        <c:ser>
+          <c:idx val="0"/>
+          <c:order val="0"/>
+          <c:spPr>
+            <a:ln w="28575" cap="rnd">
+              <a:solidFill>
+                <a:srgbClr val="FF0000"/>
+              </a:solidFill>
+              <a:round/>
+            </a:ln>
+            <a:effectLst/>
+          </c:spPr>
+          <c:marker>
+            <c:symbol val="none"/>
+          </c:marker>
+          <c:cat>
+            <c:strRef>
+              <c:f>Tabelle1!$A$1:$F$1</c:f>
+              <c:strCache>
+                <c:ptCount val="6"/>
+                <c:pt idx="0">
+                  <c:v>Anforderung</c:v>
+                </c:pt>
+                <c:pt idx="1">
+                  <c:v>Entwurf</c:v>
+                </c:pt>
+                <c:pt idx="2">
+                  <c:v>Programmierung</c:v>
+                </c:pt>
+                <c:pt idx="3">
+                  <c:v>Entwicklungstest</c:v>
+                </c:pt>
+                <c:pt idx="4">
+                  <c:v>Akzeptanztest</c:v>
+                </c:pt>
+                <c:pt idx="5">
+                  <c:v>Betrieb</c:v>
+                </c:pt>
+              </c:strCache>
+            </c:strRef>
+          </c:cat>
+          <c:val>
+            <c:numRef>
+              <c:f>Tabelle1!$A$2:$F$2</c:f>
+              <c:numCache>
+                <c:formatCode>General</c:formatCode>
+                <c:ptCount val="6"/>
+                <c:pt idx="0">
+                  <c:v>1.0</c:v>
+                </c:pt>
+                <c:pt idx="1">
+                  <c:v>2.0</c:v>
+                </c:pt>
+                <c:pt idx="2">
+                  <c:v>4.0</c:v>
+                </c:pt>
+                <c:pt idx="3">
+                  <c:v>7.0</c:v>
+                </c:pt>
+                <c:pt idx="4">
+                  <c:v>18.0</c:v>
+                </c:pt>
+                <c:pt idx="5">
+                  <c:v>55.0</c:v>
+                </c:pt>
+              </c:numCache>
+            </c:numRef>
+          </c:val>
+          <c:smooth val="1"/>
+        </c:ser>
+        <c:ser>
+          <c:idx val="1"/>
+          <c:order val="1"/>
+          <c:spPr>
+            <a:ln w="28575" cap="rnd">
+              <a:solidFill>
+                <a:schemeClr val="accent2"/>
+              </a:solidFill>
+              <a:round/>
+            </a:ln>
+            <a:effectLst/>
+          </c:spPr>
+          <c:marker>
+            <c:symbol val="none"/>
+          </c:marker>
+          <c:cat>
+            <c:strRef>
+              <c:f>Tabelle1!$A$1:$F$1</c:f>
+              <c:strCache>
+                <c:ptCount val="6"/>
+                <c:pt idx="0">
+                  <c:v>Anforderung</c:v>
+                </c:pt>
+                <c:pt idx="1">
+                  <c:v>Entwurf</c:v>
+                </c:pt>
+                <c:pt idx="2">
+                  <c:v>Programmierung</c:v>
+                </c:pt>
+                <c:pt idx="3">
+                  <c:v>Entwicklungstest</c:v>
+                </c:pt>
+                <c:pt idx="4">
+                  <c:v>Akzeptanztest</c:v>
+                </c:pt>
+                <c:pt idx="5">
+                  <c:v>Betrieb</c:v>
+                </c:pt>
+              </c:strCache>
+            </c:strRef>
+          </c:cat>
+          <c:val>
+            <c:numRef>
+              <c:f>Tabelle1!$A$3:$F$3</c:f>
+              <c:numCache>
+                <c:formatCode>General</c:formatCode>
+                <c:ptCount val="6"/>
+              </c:numCache>
+            </c:numRef>
+          </c:val>
+          <c:smooth val="1"/>
+        </c:ser>
+        <c:ser>
+          <c:idx val="2"/>
+          <c:order val="2"/>
+          <c:spPr>
+            <a:ln w="28575" cap="rnd">
+              <a:solidFill>
+                <a:schemeClr val="accent3"/>
+              </a:solidFill>
+              <a:round/>
+            </a:ln>
+            <a:effectLst/>
+          </c:spPr>
+          <c:marker>
+            <c:symbol val="none"/>
+          </c:marker>
+          <c:cat>
+            <c:strRef>
+              <c:f>Tabelle1!$A$1:$F$1</c:f>
+              <c:strCache>
+                <c:ptCount val="6"/>
+                <c:pt idx="0">
+                  <c:v>Anforderung</c:v>
+                </c:pt>
+                <c:pt idx="1">
+                  <c:v>Entwurf</c:v>
+                </c:pt>
+                <c:pt idx="2">
+                  <c:v>Programmierung</c:v>
+                </c:pt>
+                <c:pt idx="3">
+                  <c:v>Entwicklungstest</c:v>
+                </c:pt>
+                <c:pt idx="4">
+                  <c:v>Akzeptanztest</c:v>
+                </c:pt>
+                <c:pt idx="5">
+                  <c:v>Betrieb</c:v>
+                </c:pt>
+              </c:strCache>
+            </c:strRef>
+          </c:cat>
+          <c:val>
+            <c:numRef>
+              <c:f>Tabelle1!$A$4:$F$4</c:f>
+              <c:numCache>
+                <c:formatCode>General</c:formatCode>
+                <c:ptCount val="6"/>
+              </c:numCache>
+            </c:numRef>
+          </c:val>
+          <c:smooth val="1"/>
+        </c:ser>
+        <c:ser>
+          <c:idx val="3"/>
+          <c:order val="3"/>
+          <c:spPr>
+            <a:ln w="28575" cap="rnd">
+              <a:solidFill>
+                <a:schemeClr val="accent4"/>
+              </a:solidFill>
+              <a:round/>
+            </a:ln>
+            <a:effectLst/>
+          </c:spPr>
+          <c:marker>
+            <c:symbol val="none"/>
+          </c:marker>
+          <c:cat>
+            <c:strRef>
+              <c:f>Tabelle1!$A$1:$F$1</c:f>
+              <c:strCache>
+                <c:ptCount val="6"/>
+                <c:pt idx="0">
+                  <c:v>Anforderung</c:v>
+                </c:pt>
+                <c:pt idx="1">
+                  <c:v>Entwurf</c:v>
+                </c:pt>
+                <c:pt idx="2">
+                  <c:v>Programmierung</c:v>
+                </c:pt>
+                <c:pt idx="3">
+                  <c:v>Entwicklungstest</c:v>
+                </c:pt>
+                <c:pt idx="4">
+                  <c:v>Akzeptanztest</c:v>
+                </c:pt>
+                <c:pt idx="5">
+                  <c:v>Betrieb</c:v>
+                </c:pt>
+              </c:strCache>
+            </c:strRef>
+          </c:cat>
+          <c:val>
+            <c:numRef>
+              <c:f>Tabelle1!$A$5:$F$5</c:f>
+              <c:numCache>
+                <c:formatCode>General</c:formatCode>
+                <c:ptCount val="6"/>
+              </c:numCache>
+            </c:numRef>
+          </c:val>
+          <c:smooth val="1"/>
+        </c:ser>
+        <c:ser>
+          <c:idx val="4"/>
+          <c:order val="4"/>
+          <c:spPr>
+            <a:ln w="28575" cap="rnd">
+              <a:solidFill>
+                <a:schemeClr val="accent5"/>
+              </a:solidFill>
+              <a:round/>
+            </a:ln>
+            <a:effectLst/>
+          </c:spPr>
+          <c:marker>
+            <c:symbol val="none"/>
+          </c:marker>
+          <c:cat>
+            <c:strRef>
+              <c:f>Tabelle1!$A$1:$F$1</c:f>
+              <c:strCache>
+                <c:ptCount val="6"/>
+                <c:pt idx="0">
+                  <c:v>Anforderung</c:v>
+                </c:pt>
+                <c:pt idx="1">
+                  <c:v>Entwurf</c:v>
+                </c:pt>
+                <c:pt idx="2">
+                  <c:v>Programmierung</c:v>
+                </c:pt>
+                <c:pt idx="3">
+                  <c:v>Entwicklungstest</c:v>
+                </c:pt>
+                <c:pt idx="4">
+                  <c:v>Akzeptanztest</c:v>
+                </c:pt>
+                <c:pt idx="5">
+                  <c:v>Betrieb</c:v>
+                </c:pt>
+              </c:strCache>
+            </c:strRef>
+          </c:cat>
+          <c:val>
+            <c:numRef>
+              <c:f>Tabelle1!$A$6:$F$6</c:f>
+              <c:numCache>
+                <c:formatCode>General</c:formatCode>
+                <c:ptCount val="6"/>
+              </c:numCache>
+            </c:numRef>
+          </c:val>
+          <c:smooth val="1"/>
+        </c:ser>
+        <c:dLbls>
+          <c:showLegendKey val="0"/>
+          <c:showVal val="0"/>
+          <c:showCatName val="0"/>
+          <c:showSerName val="0"/>
+          <c:showPercent val="0"/>
+          <c:showBubbleSize val="0"/>
+        </c:dLbls>
+        <c:smooth val="0"/>
+        <c:axId val="2147310912"/>
+        <c:axId val="-2108500496"/>
+      </c:lineChart>
+      <c:catAx>
+        <c:axId val="2147310912"/>
+        <c:scaling>
+          <c:orientation val="minMax"/>
+        </c:scaling>
+        <c:delete val="0"/>
+        <c:axPos val="b"/>
+        <c:numFmt formatCode="General" sourceLinked="1"/>
+        <c:majorTickMark val="none"/>
+        <c:minorTickMark val="none"/>
+        <c:tickLblPos val="nextTo"/>
+        <c:spPr>
+          <a:noFill/>
+          <a:ln w="9525" cap="flat" cmpd="sng" algn="ctr">
+            <a:solidFill>
+              <a:schemeClr val="tx1">
+                <a:lumMod val="15000"/>
+                <a:lumOff val="85000"/>
+              </a:schemeClr>
+            </a:solidFill>
+            <a:round/>
+          </a:ln>
+          <a:effectLst/>
+        </c:spPr>
+        <c:txPr>
+          <a:bodyPr rot="-60000000" spcFirstLastPara="1" vertOverflow="ellipsis" vert="horz" wrap="square" anchor="ctr" anchorCtr="1"/>
+          <a:lstStyle/>
+          <a:p>
+            <a:pPr>
+              <a:defRPr sz="1197" b="0" i="0" u="none" strike="noStrike" kern="1200" baseline="0">
+                <a:solidFill>
+                  <a:schemeClr val="tx1">
+                    <a:lumMod val="65000"/>
+                    <a:lumOff val="35000"/>
+                  </a:schemeClr>
+                </a:solidFill>
+                <a:latin typeface="+mn-lt"/>
+                <a:ea typeface="+mn-ea"/>
+                <a:cs typeface="+mn-cs"/>
+              </a:defRPr>
+            </a:pPr>
+            <a:endParaRPr lang="de-DE"/>
+          </a:p>
+        </c:txPr>
+        <c:crossAx val="-2108500496"/>
+        <c:crosses val="autoZero"/>
+        <c:auto val="1"/>
+        <c:lblAlgn val="ctr"/>
+        <c:lblOffset val="100"/>
+        <c:noMultiLvlLbl val="0"/>
+      </c:catAx>
+      <c:valAx>
+        <c:axId val="-2108500496"/>
+        <c:scaling>
+          <c:orientation val="minMax"/>
+        </c:scaling>
+        <c:delete val="0"/>
+        <c:axPos val="l"/>
+        <c:majorGridlines>
+          <c:spPr>
+            <a:ln w="9525" cap="flat" cmpd="sng" algn="ctr">
+              <a:noFill/>
+              <a:round/>
+            </a:ln>
+            <a:effectLst/>
+          </c:spPr>
+        </c:majorGridlines>
+        <c:numFmt formatCode="General" sourceLinked="1"/>
+        <c:majorTickMark val="none"/>
+        <c:minorTickMark val="none"/>
+        <c:tickLblPos val="none"/>
+        <c:spPr>
+          <a:noFill/>
+          <a:ln>
+            <a:noFill/>
+          </a:ln>
+          <a:effectLst/>
+        </c:spPr>
+        <c:txPr>
+          <a:bodyPr rot="-60000000" spcFirstLastPara="1" vertOverflow="ellipsis" vert="horz" wrap="square" anchor="ctr" anchorCtr="1"/>
+          <a:lstStyle/>
+          <a:p>
+            <a:pPr>
+              <a:defRPr sz="1197" b="0" i="0" u="none" strike="noStrike" kern="1200" baseline="0">
+                <a:solidFill>
+                  <a:schemeClr val="tx1">
+                    <a:lumMod val="65000"/>
+                    <a:lumOff val="35000"/>
+                  </a:schemeClr>
+                </a:solidFill>
+                <a:latin typeface="+mn-lt"/>
+                <a:ea typeface="+mn-ea"/>
+                <a:cs typeface="+mn-cs"/>
+              </a:defRPr>
+            </a:pPr>
+            <a:endParaRPr lang="de-DE"/>
+          </a:p>
+        </c:txPr>
+        <c:crossAx val="2147310912"/>
+        <c:crosses val="autoZero"/>
+        <c:crossBetween val="between"/>
+      </c:valAx>
+      <c:spPr>
+        <a:noFill/>
+        <a:ln>
+          <a:noFill/>
+        </a:ln>
+        <a:effectLst/>
+      </c:spPr>
+    </c:plotArea>
     <c:plotVisOnly val="1"/>
     <c:dispBlanksAs val="gap"/>
     <c:showDLblsOverMax val="0"/>
@@ -860,7 +1388,563 @@
 </cs:colorStyle>
 </file>
 
+<file path=ppt/charts/colors2.xml><?xml version="1.0" encoding="utf-8"?>
+<cs:colorStyle xmlns:cs="http://schemas.microsoft.com/office/drawing/2012/chartStyle" xmlns:a="http://schemas.openxmlformats.org/drawingml/2006/main" meth="cycle" id="10">
+  <a:schemeClr val="accent1"/>
+  <a:schemeClr val="accent2"/>
+  <a:schemeClr val="accent3"/>
+  <a:schemeClr val="accent4"/>
+  <a:schemeClr val="accent5"/>
+  <a:schemeClr val="accent6"/>
+  <cs:variation/>
+  <cs:variation>
+    <a:lumMod val="60000"/>
+  </cs:variation>
+  <cs:variation>
+    <a:lumMod val="80000"/>
+    <a:lumOff val="20000"/>
+  </cs:variation>
+  <cs:variation>
+    <a:lumMod val="80000"/>
+  </cs:variation>
+  <cs:variation>
+    <a:lumMod val="60000"/>
+    <a:lumOff val="40000"/>
+  </cs:variation>
+  <cs:variation>
+    <a:lumMod val="50000"/>
+  </cs:variation>
+  <cs:variation>
+    <a:lumMod val="70000"/>
+    <a:lumOff val="30000"/>
+  </cs:variation>
+  <cs:variation>
+    <a:lumMod val="70000"/>
+  </cs:variation>
+  <cs:variation>
+    <a:lumMod val="50000"/>
+    <a:lumOff val="50000"/>
+  </cs:variation>
+</cs:colorStyle>
+</file>
+
 <file path=ppt/charts/style1.xml><?xml version="1.0" encoding="utf-8"?>
+<cs:chartStyle xmlns:cs="http://schemas.microsoft.com/office/drawing/2012/chartStyle" xmlns:a="http://schemas.openxmlformats.org/drawingml/2006/main" id="227">
+  <cs:axisTitle>
+    <cs:lnRef idx="0"/>
+    <cs:fillRef idx="0"/>
+    <cs:effectRef idx="0"/>
+    <cs:fontRef idx="minor">
+      <a:schemeClr val="tx1">
+        <a:lumMod val="65000"/>
+        <a:lumOff val="35000"/>
+      </a:schemeClr>
+    </cs:fontRef>
+    <cs:defRPr sz="1330" kern="1200"/>
+  </cs:axisTitle>
+  <cs:categoryAxis>
+    <cs:lnRef idx="0"/>
+    <cs:fillRef idx="0"/>
+    <cs:effectRef idx="0"/>
+    <cs:fontRef idx="minor">
+      <a:schemeClr val="tx1">
+        <a:lumMod val="65000"/>
+        <a:lumOff val="35000"/>
+      </a:schemeClr>
+    </cs:fontRef>
+    <cs:spPr>
+      <a:ln w="9525" cap="flat" cmpd="sng" algn="ctr">
+        <a:solidFill>
+          <a:schemeClr val="tx1">
+            <a:lumMod val="15000"/>
+            <a:lumOff val="85000"/>
+          </a:schemeClr>
+        </a:solidFill>
+        <a:round/>
+      </a:ln>
+    </cs:spPr>
+    <cs:defRPr sz="1197" kern="1200"/>
+  </cs:categoryAxis>
+  <cs:chartArea mods="allowNoFillOverride allowNoLineOverride">
+    <cs:lnRef idx="0"/>
+    <cs:fillRef idx="0"/>
+    <cs:effectRef idx="0"/>
+    <cs:fontRef idx="minor">
+      <a:schemeClr val="tx1"/>
+    </cs:fontRef>
+    <cs:spPr>
+      <a:solidFill>
+        <a:schemeClr val="bg1"/>
+      </a:solidFill>
+      <a:ln w="9525" cap="flat" cmpd="sng" algn="ctr">
+        <a:solidFill>
+          <a:schemeClr val="tx1">
+            <a:lumMod val="15000"/>
+            <a:lumOff val="85000"/>
+          </a:schemeClr>
+        </a:solidFill>
+        <a:round/>
+      </a:ln>
+    </cs:spPr>
+    <cs:defRPr sz="1330" kern="1200"/>
+  </cs:chartArea>
+  <cs:dataLabel>
+    <cs:lnRef idx="0"/>
+    <cs:fillRef idx="0"/>
+    <cs:effectRef idx="0"/>
+    <cs:fontRef idx="minor">
+      <a:schemeClr val="tx1">
+        <a:lumMod val="75000"/>
+        <a:lumOff val="25000"/>
+      </a:schemeClr>
+    </cs:fontRef>
+    <cs:defRPr sz="1197" kern="1200"/>
+  </cs:dataLabel>
+  <cs:dataLabelCallout>
+    <cs:lnRef idx="0"/>
+    <cs:fillRef idx="0"/>
+    <cs:effectRef idx="0"/>
+    <cs:fontRef idx="minor">
+      <a:schemeClr val="dk1">
+        <a:lumMod val="65000"/>
+        <a:lumOff val="35000"/>
+      </a:schemeClr>
+    </cs:fontRef>
+    <cs:spPr>
+      <a:solidFill>
+        <a:schemeClr val="lt1"/>
+      </a:solidFill>
+      <a:ln>
+        <a:solidFill>
+          <a:schemeClr val="dk1">
+            <a:lumMod val="25000"/>
+            <a:lumOff val="75000"/>
+          </a:schemeClr>
+        </a:solidFill>
+      </a:ln>
+    </cs:spPr>
+    <cs:defRPr sz="1197" kern="1200"/>
+    <cs:bodyPr rot="0" spcFirstLastPara="1" vertOverflow="clip" horzOverflow="clip" vert="horz" wrap="square" lIns="36576" tIns="18288" rIns="36576" bIns="18288" anchor="ctr" anchorCtr="1">
+      <a:spAutoFit/>
+    </cs:bodyPr>
+  </cs:dataLabelCallout>
+  <cs:dataPoint>
+    <cs:lnRef idx="0"/>
+    <cs:fillRef idx="1">
+      <cs:styleClr val="auto"/>
+    </cs:fillRef>
+    <cs:effectRef idx="0"/>
+    <cs:fontRef idx="minor">
+      <a:schemeClr val="tx1"/>
+    </cs:fontRef>
+    <cs:spPr>
+      <a:solidFill>
+        <a:schemeClr val="phClr"/>
+      </a:solidFill>
+    </cs:spPr>
+  </cs:dataPoint>
+  <cs:dataPoint3D>
+    <cs:lnRef idx="0"/>
+    <cs:fillRef idx="1">
+      <cs:styleClr val="auto"/>
+    </cs:fillRef>
+    <cs:effectRef idx="0"/>
+    <cs:fontRef idx="minor">
+      <a:schemeClr val="tx1"/>
+    </cs:fontRef>
+    <cs:spPr>
+      <a:solidFill>
+        <a:schemeClr val="phClr"/>
+      </a:solidFill>
+    </cs:spPr>
+  </cs:dataPoint3D>
+  <cs:dataPointLine>
+    <cs:lnRef idx="0">
+      <cs:styleClr val="auto"/>
+    </cs:lnRef>
+    <cs:fillRef idx="1"/>
+    <cs:effectRef idx="0"/>
+    <cs:fontRef idx="minor">
+      <a:schemeClr val="tx1"/>
+    </cs:fontRef>
+    <cs:spPr>
+      <a:ln w="28575" cap="rnd">
+        <a:solidFill>
+          <a:schemeClr val="phClr"/>
+        </a:solidFill>
+        <a:round/>
+      </a:ln>
+    </cs:spPr>
+  </cs:dataPointLine>
+  <cs:dataPointMarker>
+    <cs:lnRef idx="0">
+      <cs:styleClr val="auto"/>
+    </cs:lnRef>
+    <cs:fillRef idx="1">
+      <cs:styleClr val="auto"/>
+    </cs:fillRef>
+    <cs:effectRef idx="0"/>
+    <cs:fontRef idx="minor">
+      <a:schemeClr val="tx1"/>
+    </cs:fontRef>
+    <cs:spPr>
+      <a:solidFill>
+        <a:schemeClr val="phClr"/>
+      </a:solidFill>
+      <a:ln w="9525">
+        <a:solidFill>
+          <a:schemeClr val="phClr"/>
+        </a:solidFill>
+      </a:ln>
+    </cs:spPr>
+  </cs:dataPointMarker>
+  <cs:dataPointMarkerLayout symbol="circle" size="5"/>
+  <cs:dataPointWireframe>
+    <cs:lnRef idx="0">
+      <cs:styleClr val="auto"/>
+    </cs:lnRef>
+    <cs:fillRef idx="1"/>
+    <cs:effectRef idx="0"/>
+    <cs:fontRef idx="minor">
+      <a:schemeClr val="tx1"/>
+    </cs:fontRef>
+    <cs:spPr>
+      <a:ln w="9525" cap="rnd">
+        <a:solidFill>
+          <a:schemeClr val="phClr"/>
+        </a:solidFill>
+        <a:round/>
+      </a:ln>
+    </cs:spPr>
+  </cs:dataPointWireframe>
+  <cs:dataTable>
+    <cs:lnRef idx="0"/>
+    <cs:fillRef idx="0"/>
+    <cs:effectRef idx="0"/>
+    <cs:fontRef idx="minor">
+      <a:schemeClr val="tx1">
+        <a:lumMod val="65000"/>
+        <a:lumOff val="35000"/>
+      </a:schemeClr>
+    </cs:fontRef>
+    <cs:spPr>
+      <a:noFill/>
+      <a:ln w="9525" cap="flat" cmpd="sng" algn="ctr">
+        <a:solidFill>
+          <a:schemeClr val="tx1">
+            <a:lumMod val="15000"/>
+            <a:lumOff val="85000"/>
+          </a:schemeClr>
+        </a:solidFill>
+        <a:round/>
+      </a:ln>
+    </cs:spPr>
+    <cs:defRPr sz="1197" kern="1200"/>
+  </cs:dataTable>
+  <cs:downBar>
+    <cs:lnRef idx="0"/>
+    <cs:fillRef idx="0"/>
+    <cs:effectRef idx="0"/>
+    <cs:fontRef idx="minor">
+      <a:schemeClr val="dk1"/>
+    </cs:fontRef>
+    <cs:spPr>
+      <a:solidFill>
+        <a:schemeClr val="dk1">
+          <a:lumMod val="65000"/>
+          <a:lumOff val="35000"/>
+        </a:schemeClr>
+      </a:solidFill>
+      <a:ln w="9525">
+        <a:solidFill>
+          <a:schemeClr val="tx1">
+            <a:lumMod val="65000"/>
+            <a:lumOff val="35000"/>
+          </a:schemeClr>
+        </a:solidFill>
+      </a:ln>
+    </cs:spPr>
+  </cs:downBar>
+  <cs:dropLine>
+    <cs:lnRef idx="0"/>
+    <cs:fillRef idx="0"/>
+    <cs:effectRef idx="0"/>
+    <cs:fontRef idx="minor">
+      <a:schemeClr val="tx1"/>
+    </cs:fontRef>
+    <cs:spPr>
+      <a:ln w="9525" cap="flat" cmpd="sng" algn="ctr">
+        <a:solidFill>
+          <a:schemeClr val="tx1">
+            <a:lumMod val="35000"/>
+            <a:lumOff val="65000"/>
+          </a:schemeClr>
+        </a:solidFill>
+        <a:round/>
+      </a:ln>
+    </cs:spPr>
+  </cs:dropLine>
+  <cs:errorBar>
+    <cs:lnRef idx="0"/>
+    <cs:fillRef idx="0"/>
+    <cs:effectRef idx="0"/>
+    <cs:fontRef idx="minor">
+      <a:schemeClr val="tx1"/>
+    </cs:fontRef>
+    <cs:spPr>
+      <a:ln w="9525" cap="flat" cmpd="sng" algn="ctr">
+        <a:solidFill>
+          <a:schemeClr val="tx1">
+            <a:lumMod val="65000"/>
+            <a:lumOff val="35000"/>
+          </a:schemeClr>
+        </a:solidFill>
+        <a:round/>
+      </a:ln>
+    </cs:spPr>
+  </cs:errorBar>
+  <cs:floor>
+    <cs:lnRef idx="0"/>
+    <cs:fillRef idx="0"/>
+    <cs:effectRef idx="0"/>
+    <cs:fontRef idx="minor">
+      <a:schemeClr val="tx1"/>
+    </cs:fontRef>
+    <cs:spPr>
+      <a:noFill/>
+      <a:ln>
+        <a:noFill/>
+      </a:ln>
+    </cs:spPr>
+  </cs:floor>
+  <cs:gridlineMajor>
+    <cs:lnRef idx="0"/>
+    <cs:fillRef idx="0"/>
+    <cs:effectRef idx="0"/>
+    <cs:fontRef idx="minor">
+      <a:schemeClr val="tx1"/>
+    </cs:fontRef>
+    <cs:spPr>
+      <a:ln w="9525" cap="flat" cmpd="sng" algn="ctr">
+        <a:solidFill>
+          <a:schemeClr val="tx1">
+            <a:lumMod val="15000"/>
+            <a:lumOff val="85000"/>
+          </a:schemeClr>
+        </a:solidFill>
+        <a:round/>
+      </a:ln>
+    </cs:spPr>
+  </cs:gridlineMajor>
+  <cs:gridlineMinor>
+    <cs:lnRef idx="0"/>
+    <cs:fillRef idx="0"/>
+    <cs:effectRef idx="0"/>
+    <cs:fontRef idx="minor">
+      <a:schemeClr val="tx1"/>
+    </cs:fontRef>
+    <cs:spPr>
+      <a:ln w="9525" cap="flat" cmpd="sng" algn="ctr">
+        <a:solidFill>
+          <a:schemeClr val="tx1">
+            <a:lumMod val="5000"/>
+            <a:lumOff val="95000"/>
+          </a:schemeClr>
+        </a:solidFill>
+        <a:round/>
+      </a:ln>
+    </cs:spPr>
+  </cs:gridlineMinor>
+  <cs:hiLoLine>
+    <cs:lnRef idx="0"/>
+    <cs:fillRef idx="0"/>
+    <cs:effectRef idx="0"/>
+    <cs:fontRef idx="minor">
+      <a:schemeClr val="tx1"/>
+    </cs:fontRef>
+    <cs:spPr>
+      <a:ln w="9525" cap="flat" cmpd="sng" algn="ctr">
+        <a:solidFill>
+          <a:schemeClr val="tx1">
+            <a:lumMod val="75000"/>
+            <a:lumOff val="25000"/>
+          </a:schemeClr>
+        </a:solidFill>
+        <a:round/>
+      </a:ln>
+    </cs:spPr>
+  </cs:hiLoLine>
+  <cs:leaderLine>
+    <cs:lnRef idx="0"/>
+    <cs:fillRef idx="0"/>
+    <cs:effectRef idx="0"/>
+    <cs:fontRef idx="minor">
+      <a:schemeClr val="tx1"/>
+    </cs:fontRef>
+    <cs:spPr>
+      <a:ln w="9525" cap="flat" cmpd="sng" algn="ctr">
+        <a:solidFill>
+          <a:schemeClr val="tx1">
+            <a:lumMod val="35000"/>
+            <a:lumOff val="65000"/>
+          </a:schemeClr>
+        </a:solidFill>
+        <a:round/>
+      </a:ln>
+    </cs:spPr>
+  </cs:leaderLine>
+  <cs:legend>
+    <cs:lnRef idx="0"/>
+    <cs:fillRef idx="0"/>
+    <cs:effectRef idx="0"/>
+    <cs:fontRef idx="minor">
+      <a:schemeClr val="tx1">
+        <a:lumMod val="65000"/>
+        <a:lumOff val="35000"/>
+      </a:schemeClr>
+    </cs:fontRef>
+    <cs:defRPr sz="1197" kern="1200"/>
+  </cs:legend>
+  <cs:plotArea mods="allowNoFillOverride allowNoLineOverride">
+    <cs:lnRef idx="0"/>
+    <cs:fillRef idx="0"/>
+    <cs:effectRef idx="0"/>
+    <cs:fontRef idx="minor">
+      <a:schemeClr val="tx1"/>
+    </cs:fontRef>
+  </cs:plotArea>
+  <cs:plotArea3D mods="allowNoFillOverride allowNoLineOverride">
+    <cs:lnRef idx="0"/>
+    <cs:fillRef idx="0"/>
+    <cs:effectRef idx="0"/>
+    <cs:fontRef idx="minor">
+      <a:schemeClr val="tx1"/>
+    </cs:fontRef>
+  </cs:plotArea3D>
+  <cs:seriesAxis>
+    <cs:lnRef idx="0"/>
+    <cs:fillRef idx="0"/>
+    <cs:effectRef idx="0"/>
+    <cs:fontRef idx="minor">
+      <a:schemeClr val="tx1">
+        <a:lumMod val="65000"/>
+        <a:lumOff val="35000"/>
+      </a:schemeClr>
+    </cs:fontRef>
+    <cs:defRPr sz="1197" kern="1200"/>
+  </cs:seriesAxis>
+  <cs:seriesLine>
+    <cs:lnRef idx="0"/>
+    <cs:fillRef idx="0"/>
+    <cs:effectRef idx="0"/>
+    <cs:fontRef idx="minor">
+      <a:schemeClr val="tx1"/>
+    </cs:fontRef>
+    <cs:spPr>
+      <a:ln w="9525" cap="flat" cmpd="sng" algn="ctr">
+        <a:solidFill>
+          <a:schemeClr val="tx1">
+            <a:lumMod val="35000"/>
+            <a:lumOff val="65000"/>
+          </a:schemeClr>
+        </a:solidFill>
+        <a:round/>
+      </a:ln>
+    </cs:spPr>
+  </cs:seriesLine>
+  <cs:title>
+    <cs:lnRef idx="0"/>
+    <cs:fillRef idx="0"/>
+    <cs:effectRef idx="0"/>
+    <cs:fontRef idx="minor">
+      <a:schemeClr val="tx1">
+        <a:lumMod val="65000"/>
+        <a:lumOff val="35000"/>
+      </a:schemeClr>
+    </cs:fontRef>
+    <cs:defRPr sz="1862" b="0" kern="1200" spc="0" baseline="0"/>
+  </cs:title>
+  <cs:trendline>
+    <cs:lnRef idx="0">
+      <cs:styleClr val="auto"/>
+    </cs:lnRef>
+    <cs:fillRef idx="0"/>
+    <cs:effectRef idx="0"/>
+    <cs:fontRef idx="minor">
+      <a:schemeClr val="tx1"/>
+    </cs:fontRef>
+    <cs:spPr>
+      <a:ln w="19050" cap="rnd">
+        <a:solidFill>
+          <a:schemeClr val="phClr"/>
+        </a:solidFill>
+        <a:prstDash val="sysDot"/>
+      </a:ln>
+    </cs:spPr>
+  </cs:trendline>
+  <cs:trendlineLabel>
+    <cs:lnRef idx="0"/>
+    <cs:fillRef idx="0"/>
+    <cs:effectRef idx="0"/>
+    <cs:fontRef idx="minor">
+      <a:schemeClr val="tx1">
+        <a:lumMod val="65000"/>
+        <a:lumOff val="35000"/>
+      </a:schemeClr>
+    </cs:fontRef>
+    <cs:defRPr sz="1197" kern="1200"/>
+  </cs:trendlineLabel>
+  <cs:upBar>
+    <cs:lnRef idx="0"/>
+    <cs:fillRef idx="0"/>
+    <cs:effectRef idx="0"/>
+    <cs:fontRef idx="minor">
+      <a:schemeClr val="dk1"/>
+    </cs:fontRef>
+    <cs:spPr>
+      <a:solidFill>
+        <a:schemeClr val="lt1"/>
+      </a:solidFill>
+      <a:ln w="9525">
+        <a:solidFill>
+          <a:schemeClr val="tx1">
+            <a:lumMod val="15000"/>
+            <a:lumOff val="85000"/>
+          </a:schemeClr>
+        </a:solidFill>
+      </a:ln>
+    </cs:spPr>
+  </cs:upBar>
+  <cs:valueAxis>
+    <cs:lnRef idx="0"/>
+    <cs:fillRef idx="0"/>
+    <cs:effectRef idx="0"/>
+    <cs:fontRef idx="minor">
+      <a:schemeClr val="tx1">
+        <a:lumMod val="65000"/>
+        <a:lumOff val="35000"/>
+      </a:schemeClr>
+    </cs:fontRef>
+    <cs:defRPr sz="1197" kern="1200"/>
+  </cs:valueAxis>
+  <cs:wall>
+    <cs:lnRef idx="0"/>
+    <cs:fillRef idx="0"/>
+    <cs:effectRef idx="0"/>
+    <cs:fontRef idx="minor">
+      <a:schemeClr val="tx1"/>
+    </cs:fontRef>
+    <cs:spPr>
+      <a:noFill/>
+      <a:ln>
+        <a:noFill/>
+      </a:ln>
+    </cs:spPr>
+  </cs:wall>
+</cs:chartStyle>
+</file>
+
+<file path=ppt/charts/style2.xml><?xml version="1.0" encoding="utf-8"?>
 <cs:chartStyle xmlns:cs="http://schemas.microsoft.com/office/drawing/2012/chartStyle" xmlns:a="http://schemas.openxmlformats.org/drawingml/2006/main" id="227">
   <cs:axisTitle>
     <cs:lnRef idx="0"/>
@@ -1458,7 +2542,7 @@
           <a:p>
             <a:fld id="{D6441DEE-3F41-B34E-96C2-26796F10840D}" type="datetimeFigureOut">
               <a:rPr lang="de-DE" smtClean="0"/>
-              <a:t>25.03.16</a:t>
+              <a:t>06.05.16</a:t>
             </a:fld>
             <a:endParaRPr lang="de-DE"/>
           </a:p>
@@ -1941,7 +3025,7 @@
           <a:p>
             <a:fld id="{45C635BA-7AD8-E44A-B5F4-33C1482C67A6}" type="datetimeFigureOut">
               <a:rPr lang="de-DE" smtClean="0"/>
-              <a:t>25.03.16</a:t>
+              <a:t>06.05.16</a:t>
             </a:fld>
             <a:endParaRPr lang="de-DE"/>
           </a:p>
@@ -2111,7 +3195,7 @@
           <a:p>
             <a:fld id="{45C635BA-7AD8-E44A-B5F4-33C1482C67A6}" type="datetimeFigureOut">
               <a:rPr lang="de-DE" smtClean="0"/>
-              <a:t>25.03.16</a:t>
+              <a:t>06.05.16</a:t>
             </a:fld>
             <a:endParaRPr lang="de-DE"/>
           </a:p>
@@ -2291,7 +3375,7 @@
           <a:p>
             <a:fld id="{45C635BA-7AD8-E44A-B5F4-33C1482C67A6}" type="datetimeFigureOut">
               <a:rPr lang="de-DE" smtClean="0"/>
-              <a:t>25.03.16</a:t>
+              <a:t>06.05.16</a:t>
             </a:fld>
             <a:endParaRPr lang="de-DE"/>
           </a:p>
@@ -2461,7 +3545,7 @@
           <a:p>
             <a:fld id="{45C635BA-7AD8-E44A-B5F4-33C1482C67A6}" type="datetimeFigureOut">
               <a:rPr lang="de-DE" smtClean="0"/>
-              <a:t>25.03.16</a:t>
+              <a:t>06.05.16</a:t>
             </a:fld>
             <a:endParaRPr lang="de-DE"/>
           </a:p>
@@ -2707,7 +3791,7 @@
           <a:p>
             <a:fld id="{45C635BA-7AD8-E44A-B5F4-33C1482C67A6}" type="datetimeFigureOut">
               <a:rPr lang="de-DE" smtClean="0"/>
-              <a:t>25.03.16</a:t>
+              <a:t>06.05.16</a:t>
             </a:fld>
             <a:endParaRPr lang="de-DE"/>
           </a:p>
@@ -2939,7 +4023,7 @@
           <a:p>
             <a:fld id="{45C635BA-7AD8-E44A-B5F4-33C1482C67A6}" type="datetimeFigureOut">
               <a:rPr lang="de-DE" smtClean="0"/>
-              <a:t>25.03.16</a:t>
+              <a:t>06.05.16</a:t>
             </a:fld>
             <a:endParaRPr lang="de-DE"/>
           </a:p>
@@ -3306,7 +4390,7 @@
           <a:p>
             <a:fld id="{45C635BA-7AD8-E44A-B5F4-33C1482C67A6}" type="datetimeFigureOut">
               <a:rPr lang="de-DE" smtClean="0"/>
-              <a:t>25.03.16</a:t>
+              <a:t>06.05.16</a:t>
             </a:fld>
             <a:endParaRPr lang="de-DE"/>
           </a:p>
@@ -3424,7 +4508,7 @@
           <a:p>
             <a:fld id="{45C635BA-7AD8-E44A-B5F4-33C1482C67A6}" type="datetimeFigureOut">
               <a:rPr lang="de-DE" smtClean="0"/>
-              <a:t>25.03.16</a:t>
+              <a:t>06.05.16</a:t>
             </a:fld>
             <a:endParaRPr lang="de-DE"/>
           </a:p>
@@ -3519,7 +4603,7 @@
           <a:p>
             <a:fld id="{45C635BA-7AD8-E44A-B5F4-33C1482C67A6}" type="datetimeFigureOut">
               <a:rPr lang="de-DE" smtClean="0"/>
-              <a:t>25.03.16</a:t>
+              <a:t>06.05.16</a:t>
             </a:fld>
             <a:endParaRPr lang="de-DE"/>
           </a:p>
@@ -3796,7 +4880,7 @@
           <a:p>
             <a:fld id="{45C635BA-7AD8-E44A-B5F4-33C1482C67A6}" type="datetimeFigureOut">
               <a:rPr lang="de-DE" smtClean="0"/>
-              <a:t>25.03.16</a:t>
+              <a:t>06.05.16</a:t>
             </a:fld>
             <a:endParaRPr lang="de-DE"/>
           </a:p>
@@ -4049,7 +5133,7 @@
           <a:p>
             <a:fld id="{45C635BA-7AD8-E44A-B5F4-33C1482C67A6}" type="datetimeFigureOut">
               <a:rPr lang="de-DE" smtClean="0"/>
-              <a:t>25.03.16</a:t>
+              <a:t>06.05.16</a:t>
             </a:fld>
             <a:endParaRPr lang="de-DE"/>
           </a:p>
@@ -4262,7 +5346,7 @@
           <a:p>
             <a:fld id="{45C635BA-7AD8-E44A-B5F4-33C1482C67A6}" type="datetimeFigureOut">
               <a:rPr lang="de-DE" smtClean="0"/>
-              <a:t>25.03.16</a:t>
+              <a:t>06.05.16</a:t>
             </a:fld>
             <a:endParaRPr lang="de-DE"/>
           </a:p>
@@ -7577,6 +8661,231 @@
           <a:chExt cx="0" cy="0"/>
         </a:xfrm>
       </p:grpSpPr>
+      <p:graphicFrame>
+        <p:nvGraphicFramePr>
+          <p:cNvPr id="2" name="Diagramm 1"/>
+          <p:cNvGraphicFramePr/>
+          <p:nvPr>
+            <p:extLst>
+              <p:ext uri="{D42A27DB-BD31-4B8C-83A1-F6EECF244321}">
+                <p14:modId xmlns:p14="http://schemas.microsoft.com/office/powerpoint/2010/main" val="1639330348"/>
+              </p:ext>
+            </p:extLst>
+          </p:nvPr>
+        </p:nvGraphicFramePr>
+        <p:xfrm>
+          <a:off x="1056509" y="719667"/>
+          <a:ext cx="5040086" cy="3141134"/>
+        </p:xfrm>
+        <a:graphic>
+          <a:graphicData uri="http://schemas.openxmlformats.org/drawingml/2006/chart">
+            <c:chart xmlns:c="http://schemas.openxmlformats.org/drawingml/2006/chart" xmlns:r="http://schemas.openxmlformats.org/officeDocument/2006/relationships" r:id="rId2"/>
+          </a:graphicData>
+        </a:graphic>
+      </p:graphicFrame>
+      <p:sp>
+        <p:nvSpPr>
+          <p:cNvPr id="3" name="Textfeld 2"/>
+          <p:cNvSpPr txBox="1"/>
+          <p:nvPr/>
+        </p:nvSpPr>
+        <p:spPr>
+          <a:xfrm>
+            <a:off x="1181096" y="800102"/>
+            <a:ext cx="583814" cy="215444"/>
+          </a:xfrm>
+          <a:prstGeom prst="rect">
+            <a:avLst/>
+          </a:prstGeom>
+          <a:noFill/>
+        </p:spPr>
+        <p:txBody>
+          <a:bodyPr wrap="none" rtlCol="0">
+            <a:spAutoFit/>
+          </a:bodyPr>
+          <a:lstStyle/>
+          <a:p>
+            <a:r>
+              <a:rPr lang="de-DE" sz="800" b="1" dirty="0" smtClean="0">
+                <a:solidFill>
+                  <a:schemeClr val="bg1">
+                    <a:lumMod val="75000"/>
+                  </a:schemeClr>
+                </a:solidFill>
+                <a:latin typeface="Verdana" charset="0"/>
+                <a:ea typeface="Verdana" charset="0"/>
+                <a:cs typeface="Verdana" charset="0"/>
+              </a:rPr>
+              <a:t>Kosten</a:t>
+            </a:r>
+            <a:endParaRPr lang="de-DE" sz="800" b="1" dirty="0">
+              <a:solidFill>
+                <a:schemeClr val="bg1">
+                  <a:lumMod val="75000"/>
+                </a:schemeClr>
+              </a:solidFill>
+              <a:latin typeface="Verdana" charset="0"/>
+              <a:ea typeface="Verdana" charset="0"/>
+              <a:cs typeface="Verdana" charset="0"/>
+            </a:endParaRPr>
+          </a:p>
+        </p:txBody>
+      </p:sp>
+      <p:sp>
+        <p:nvSpPr>
+          <p:cNvPr id="5" name="Textfeld 4"/>
+          <p:cNvSpPr txBox="1"/>
+          <p:nvPr/>
+        </p:nvSpPr>
+        <p:spPr>
+          <a:xfrm>
+            <a:off x="5511803" y="2633127"/>
+            <a:ext cx="660400" cy="215444"/>
+          </a:xfrm>
+          <a:prstGeom prst="rect">
+            <a:avLst/>
+          </a:prstGeom>
+          <a:noFill/>
+        </p:spPr>
+        <p:txBody>
+          <a:bodyPr wrap="square" rtlCol="0">
+            <a:spAutoFit/>
+          </a:bodyPr>
+          <a:lstStyle/>
+          <a:p>
+            <a:pPr algn="r"/>
+            <a:r>
+              <a:rPr lang="de-DE" sz="800" b="1" dirty="0" smtClean="0">
+                <a:solidFill>
+                  <a:schemeClr val="bg1">
+                    <a:lumMod val="75000"/>
+                  </a:schemeClr>
+                </a:solidFill>
+                <a:latin typeface="Verdana" charset="0"/>
+                <a:ea typeface="Verdana" charset="0"/>
+                <a:cs typeface="Verdana" charset="0"/>
+              </a:rPr>
+              <a:t>Zeit</a:t>
+            </a:r>
+            <a:endParaRPr lang="de-DE" sz="800" b="1" dirty="0">
+              <a:solidFill>
+                <a:schemeClr val="bg1">
+                  <a:lumMod val="75000"/>
+                </a:schemeClr>
+              </a:solidFill>
+              <a:latin typeface="Verdana" charset="0"/>
+              <a:ea typeface="Verdana" charset="0"/>
+              <a:cs typeface="Verdana" charset="0"/>
+            </a:endParaRPr>
+          </a:p>
+        </p:txBody>
+      </p:sp>
+      <p:cxnSp>
+        <p:nvCxnSpPr>
+          <p:cNvPr id="12" name="Gerade Verbindung mit Pfeil 11"/>
+          <p:cNvCxnSpPr/>
+          <p:nvPr/>
+        </p:nvCxnSpPr>
+        <p:spPr>
+          <a:xfrm flipH="1" flipV="1">
+            <a:off x="1295400" y="973211"/>
+            <a:ext cx="4234" cy="1896527"/>
+          </a:xfrm>
+          <a:prstGeom prst="straightConnector1">
+            <a:avLst/>
+          </a:prstGeom>
+          <a:ln>
+            <a:solidFill>
+              <a:schemeClr val="bg1">
+                <a:lumMod val="85000"/>
+              </a:schemeClr>
+            </a:solidFill>
+            <a:tailEnd type="triangle"/>
+          </a:ln>
+        </p:spPr>
+        <p:style>
+          <a:lnRef idx="1">
+            <a:schemeClr val="accent1"/>
+          </a:lnRef>
+          <a:fillRef idx="0">
+            <a:schemeClr val="accent1"/>
+          </a:fillRef>
+          <a:effectRef idx="0">
+            <a:schemeClr val="accent1"/>
+          </a:effectRef>
+          <a:fontRef idx="minor">
+            <a:schemeClr val="tx1"/>
+          </a:fontRef>
+        </p:style>
+      </p:cxnSp>
+      <p:cxnSp>
+        <p:nvCxnSpPr>
+          <p:cNvPr id="14" name="Gerade Verbindung mit Pfeil 13"/>
+          <p:cNvCxnSpPr/>
+          <p:nvPr/>
+        </p:nvCxnSpPr>
+        <p:spPr>
+          <a:xfrm>
+            <a:off x="5638798" y="2865505"/>
+            <a:ext cx="431800" cy="1"/>
+          </a:xfrm>
+          <a:prstGeom prst="straightConnector1">
+            <a:avLst/>
+          </a:prstGeom>
+          <a:ln>
+            <a:solidFill>
+              <a:schemeClr val="bg1">
+                <a:lumMod val="85000"/>
+              </a:schemeClr>
+            </a:solidFill>
+            <a:tailEnd type="triangle"/>
+          </a:ln>
+        </p:spPr>
+        <p:style>
+          <a:lnRef idx="1">
+            <a:schemeClr val="accent1"/>
+          </a:lnRef>
+          <a:fillRef idx="0">
+            <a:schemeClr val="accent1"/>
+          </a:fillRef>
+          <a:effectRef idx="0">
+            <a:schemeClr val="accent1"/>
+          </a:effectRef>
+          <a:fontRef idx="minor">
+            <a:schemeClr val="tx1"/>
+          </a:fontRef>
+        </p:style>
+      </p:cxnSp>
+    </p:spTree>
+    <p:extLst>
+      <p:ext uri="{BB962C8B-B14F-4D97-AF65-F5344CB8AC3E}">
+        <p14:creationId xmlns:p14="http://schemas.microsoft.com/office/powerpoint/2010/main" val="1654994587"/>
+      </p:ext>
+    </p:extLst>
+  </p:cSld>
+  <p:clrMapOvr>
+    <a:masterClrMapping/>
+  </p:clrMapOvr>
+</p:sld>
+</file>
+
+<file path=ppt/slides/slide6.xml><?xml version="1.0" encoding="utf-8"?>
+<p:sld xmlns:a="http://schemas.openxmlformats.org/drawingml/2006/main" xmlns:r="http://schemas.openxmlformats.org/officeDocument/2006/relationships" xmlns:p="http://schemas.openxmlformats.org/presentationml/2006/main">
+  <p:cSld>
+    <p:spTree>
+      <p:nvGrpSpPr>
+        <p:cNvPr id="1" name=""/>
+        <p:cNvGrpSpPr/>
+        <p:nvPr/>
+      </p:nvGrpSpPr>
+      <p:grpSpPr>
+        <a:xfrm>
+          <a:off x="0" y="0"/>
+          <a:ext cx="0" cy="0"/>
+          <a:chOff x="0" y="0"/>
+          <a:chExt cx="0" cy="0"/>
+        </a:xfrm>
+      </p:grpSpPr>
       <p:sp>
         <p:nvSpPr>
           <p:cNvPr id="4" name="Rechteck 3"/>

</xml_diff>